<commit_message>
FIX: shitty fixes :cool:
</commit_message>
<xml_diff>
--- a/iWannaNote/iHatePresentations/presentation.pptx
+++ b/iWannaNote/iHatePresentations/presentation.pptx
@@ -5,25 +5,26 @@
     <p:sldMasterId id="2147483648" r:id="rId1"/>
   </p:sldMasterIdLst>
   <p:notesMasterIdLst>
-    <p:notesMasterId r:id="rId18"/>
+    <p:notesMasterId r:id="rId19"/>
   </p:notesMasterIdLst>
   <p:sldIdLst>
     <p:sldId id="256" r:id="rId2"/>
     <p:sldId id="257" r:id="rId3"/>
     <p:sldId id="266" r:id="rId4"/>
     <p:sldId id="273" r:id="rId5"/>
-    <p:sldId id="288" r:id="rId6"/>
-    <p:sldId id="275" r:id="rId7"/>
-    <p:sldId id="296" r:id="rId8"/>
-    <p:sldId id="301" r:id="rId9"/>
-    <p:sldId id="276" r:id="rId10"/>
-    <p:sldId id="263" r:id="rId11"/>
-    <p:sldId id="295" r:id="rId12"/>
-    <p:sldId id="292" r:id="rId13"/>
-    <p:sldId id="303" r:id="rId14"/>
-    <p:sldId id="304" r:id="rId15"/>
-    <p:sldId id="284" r:id="rId16"/>
-    <p:sldId id="285" r:id="rId17"/>
+    <p:sldId id="305" r:id="rId6"/>
+    <p:sldId id="288" r:id="rId7"/>
+    <p:sldId id="275" r:id="rId8"/>
+    <p:sldId id="296" r:id="rId9"/>
+    <p:sldId id="301" r:id="rId10"/>
+    <p:sldId id="276" r:id="rId11"/>
+    <p:sldId id="263" r:id="rId12"/>
+    <p:sldId id="295" r:id="rId13"/>
+    <p:sldId id="292" r:id="rId14"/>
+    <p:sldId id="303" r:id="rId15"/>
+    <p:sldId id="304" r:id="rId16"/>
+    <p:sldId id="284" r:id="rId17"/>
+    <p:sldId id="285" r:id="rId18"/>
   </p:sldIdLst>
   <p:sldSz cx="12192000" cy="6858000"/>
   <p:notesSz cx="6858000" cy="9144000"/>
@@ -212,7 +213,7 @@
           <a:p>
             <a:fld id="{9AD2A09B-D952-4383-A48E-27C117CB15C8}" type="datetimeFigureOut">
               <a:rPr lang="ru-RU" smtClean="0"/>
-              <a:t>08.04.2024</a:t>
+              <a:t>19.05.2024</a:t>
             </a:fld>
             <a:endParaRPr lang="ru-RU"/>
           </a:p>
@@ -609,37 +610,8 @@
           <a:p>
             <a:r>
               <a:rPr lang="ru-RU" dirty="0"/>
-              <a:t>Было проведено сравнение алгоритмов построения модели, использующейся в методе, их список Вы можете увидеть на слайде. В качестве методов векторизации были выбраны алгоритмы «Мешок слов» и метод, </a:t>
-            </a:r>
-            <a:r>
-              <a:rPr lang="ru-RU" dirty="0" err="1"/>
-              <a:t>задействующий</a:t>
-            </a:r>
-            <a:r>
-              <a:rPr lang="ru-RU" dirty="0"/>
-              <a:t> модель </a:t>
-            </a:r>
-            <a:r>
-              <a:rPr lang="en-US" dirty="0"/>
-              <a:t>BERT. </a:t>
-            </a:r>
-            <a:r>
-              <a:rPr lang="ru-RU" dirty="0"/>
-              <a:t>Оценка результатов работы производилась по метрикам точности, </a:t>
-            </a:r>
-            <a:r>
-              <a:rPr lang="en-US" dirty="0"/>
-              <a:t>F1-</a:t>
-            </a:r>
-            <a:r>
-              <a:rPr lang="ru-RU" dirty="0"/>
-              <a:t>меры и </a:t>
-            </a:r>
-            <a:r>
-              <a:rPr lang="en-US" dirty="0"/>
-              <a:t>ROC-AUC.</a:t>
-            </a:r>
-            <a:endParaRPr lang="ru-RU" dirty="0"/>
+              <a:t>В системе было определено 4 модуля, все они представлены на слайде. Модуль клиента взаимодействует с модулями анализа и сбора данных, так как от первого он получает данные модели, а от второго – текстовые сообщения для анализа.</a:t>
+            </a:r>
           </a:p>
         </p:txBody>
       </p:sp>
@@ -669,7 +641,7 @@
     </p:spTree>
     <p:extLst>
       <p:ext uri="{BB962C8B-B14F-4D97-AF65-F5344CB8AC3E}">
-        <p14:creationId xmlns:p14="http://schemas.microsoft.com/office/powerpoint/2010/main" val="1181145112"/>
+        <p14:creationId xmlns:p14="http://schemas.microsoft.com/office/powerpoint/2010/main" val="2542268922"/>
       </p:ext>
     </p:extLst>
   </p:cSld>
@@ -723,19 +695,53 @@
           <a:bodyPr/>
           <a:lstStyle/>
           <a:p>
+            <a:pPr marL="0" marR="0" lvl="0" indent="0" algn="l" defTabSz="914400" rtl="0" eaLnBrk="1" fontAlgn="auto" latinLnBrk="0" hangingPunct="1">
+              <a:lnSpc>
+                <a:spcPct val="100000"/>
+              </a:lnSpc>
+              <a:spcBef>
+                <a:spcPts val="0"/>
+              </a:spcBef>
+              <a:spcAft>
+                <a:spcPts val="0"/>
+              </a:spcAft>
+              <a:buClrTx/>
+              <a:buSzTx/>
+              <a:buFontTx/>
+              <a:buNone/>
+              <a:tabLst/>
+              <a:defRPr/>
+            </a:pPr>
             <a:r>
               <a:rPr lang="ru-RU" dirty="0"/>
-              <a:t>Результат исследования представлен на слайде, значения метрик определены средним из 4-х запусков на разных тестовых выборках. Было получено, что лучшим средним показателем всех метрик обладает метод случайного леса с использованием </a:t>
+              <a:t>Было проведено сравнение алгоритмов построения модели, использующихся в методе, их список Вы можете увидеть на слайде. В качестве методов векторизации были выбраны алгоритмы «Мешок слов» и метод, </a:t>
+            </a:r>
+            <a:r>
+              <a:rPr lang="ru-RU" dirty="0" err="1"/>
+              <a:t>задействующий</a:t>
+            </a:r>
+            <a:r>
+              <a:rPr lang="ru-RU" dirty="0"/>
+              <a:t> модель </a:t>
             </a:r>
             <a:r>
               <a:rPr lang="en-US" dirty="0"/>
-              <a:t>BERT-</a:t>
-            </a:r>
-            <a:r>
-              <a:rPr lang="ru-RU" dirty="0"/>
-              <a:t>векторизации, второе место занимает тот же метод, но с использованием векторизации «Мешок слов», а на третьем месте располагается логистическая регрессия.</a:t>
-            </a:r>
-            <a:endParaRPr lang="en-US" dirty="0"/>
+              <a:t>BERT. </a:t>
+            </a:r>
+            <a:r>
+              <a:rPr lang="ru-RU" sz="1200" dirty="0">
+                <a:latin typeface="Times New Roman" panose="02020603050405020304" pitchFamily="18" charset="0"/>
+                <a:cs typeface="Times New Roman" panose="02020603050405020304" pitchFamily="18" charset="0"/>
+              </a:rPr>
+              <a:t>Тестовые данные были разбиты на 4 части, 1 из которых используется в качестве тестовой. Для каждого разбиения строится матрица ошибок, для каждой модели приводится график значений исследуемых метрик.</a:t>
+            </a:r>
+            <a:endParaRPr lang="en-RU" sz="1200" dirty="0">
+              <a:latin typeface="Times New Roman" panose="02020603050405020304" pitchFamily="18" charset="0"/>
+              <a:cs typeface="Times New Roman" panose="02020603050405020304" pitchFamily="18" charset="0"/>
+            </a:endParaRPr>
+          </a:p>
+          <a:p>
+            <a:endParaRPr lang="ru-RU" dirty="0"/>
           </a:p>
         </p:txBody>
       </p:sp>
@@ -765,7 +771,7 @@
     </p:spTree>
     <p:extLst>
       <p:ext uri="{BB962C8B-B14F-4D97-AF65-F5344CB8AC3E}">
-        <p14:creationId xmlns:p14="http://schemas.microsoft.com/office/powerpoint/2010/main" val="2904898411"/>
+        <p14:creationId xmlns:p14="http://schemas.microsoft.com/office/powerpoint/2010/main" val="1181145112"/>
       </p:ext>
     </p:extLst>
   </p:cSld>
@@ -821,7 +827,7 @@
           <a:p>
             <a:r>
               <a:rPr lang="ru-RU" dirty="0"/>
-              <a:t>Метрика точности случайного леса с </a:t>
+              <a:t>Результат исследования представлен на слайде, значения метрик определены средним из 4-х запусков на разных тестовых выборках. Было получено, что лучшим средним показателем всех метрик обладает метод случайного леса с использованием </a:t>
             </a:r>
             <a:r>
               <a:rPr lang="en-US" dirty="0"/>
@@ -829,24 +835,9 @@
             </a:r>
             <a:r>
               <a:rPr lang="ru-RU" dirty="0"/>
-              <a:t>векторизацией достигла значения 0.888</a:t>
-            </a:r>
-            <a:r>
-              <a:rPr lang="en-US" dirty="0"/>
-              <a:t>, F1-</a:t>
-            </a:r>
-            <a:r>
-              <a:rPr lang="ru-RU" dirty="0"/>
-              <a:t>мера – 0.886, </a:t>
-            </a:r>
-            <a:r>
-              <a:rPr lang="en-US" dirty="0"/>
-              <a:t>ROC-AUC – </a:t>
-            </a:r>
-            <a:r>
-              <a:rPr lang="ru-RU" dirty="0"/>
-              <a:t>0.949. Матрица ошибок показывает, что метод в 1.5 раза чаще ошибочно интерпретирует обычные сообщения как суицидальные, но данный факт нельзя интерпретировать как запрет на использования модели, так как ложные срабатывания здесь были бы опасны только в случае более частой интерпретации суицидальных сообщений как обычных.</a:t>
-            </a:r>
+              <a:t>векторизации, второе место занимает тот же метод, но с использованием векторизации «Мешок слов», а на третьем месте располагается логистическая регрессия.</a:t>
+            </a:r>
+            <a:endParaRPr lang="en-US" dirty="0"/>
           </a:p>
         </p:txBody>
       </p:sp>
@@ -876,7 +867,7 @@
     </p:spTree>
     <p:extLst>
       <p:ext uri="{BB962C8B-B14F-4D97-AF65-F5344CB8AC3E}">
-        <p14:creationId xmlns:p14="http://schemas.microsoft.com/office/powerpoint/2010/main" val="1116725367"/>
+        <p14:creationId xmlns:p14="http://schemas.microsoft.com/office/powerpoint/2010/main" val="2904898411"/>
       </p:ext>
     </p:extLst>
   </p:cSld>
@@ -932,7 +923,15 @@
           <a:p>
             <a:r>
               <a:rPr lang="ru-RU" dirty="0"/>
-              <a:t>Метрика точности случайного леса с использованием «мешка слов» достигла значения 0.885</a:t>
+              <a:t>Метрика точности случайного леса с </a:t>
+            </a:r>
+            <a:r>
+              <a:rPr lang="en-US" dirty="0"/>
+              <a:t>BERT-</a:t>
+            </a:r>
+            <a:r>
+              <a:rPr lang="ru-RU" dirty="0"/>
+              <a:t>векторизацией достигла значения 0.888</a:t>
             </a:r>
             <a:r>
               <a:rPr lang="en-US" dirty="0"/>
@@ -940,7 +939,7 @@
             </a:r>
             <a:r>
               <a:rPr lang="ru-RU" dirty="0"/>
-              <a:t>мера – 0.873, </a:t>
+              <a:t>мера – 0.886, </a:t>
             </a:r>
             <a:r>
               <a:rPr lang="en-US" dirty="0"/>
@@ -948,31 +947,7 @@
             </a:r>
             <a:r>
               <a:rPr lang="ru-RU" dirty="0"/>
-              <a:t>0.947. Заметно, что разница по сравнению с предыдущим алгоритмом по точности и </a:t>
-            </a:r>
-            <a:r>
-              <a:rPr lang="en-US" dirty="0"/>
-              <a:t>ROC-AUC </a:t>
-            </a:r>
-            <a:r>
-              <a:rPr lang="ru-RU" dirty="0"/>
-              <a:t>не так велика, однако </a:t>
-            </a:r>
-            <a:r>
-              <a:rPr lang="en-US" dirty="0"/>
-              <a:t>F1-</a:t>
-            </a:r>
-            <a:r>
-              <a:rPr lang="ru-RU" dirty="0"/>
-              <a:t>мера здесь уже примерно на 1.4</a:t>
-            </a:r>
-            <a:r>
-              <a:rPr lang="en-US" dirty="0"/>
-              <a:t>% </a:t>
-            </a:r>
-            <a:r>
-              <a:rPr lang="ru-RU" dirty="0"/>
-              <a:t>ниже.</a:t>
+              <a:t>0.949. Матрица ошибок показывает, что метод в 1.5 раза чаще ошибочно классифицирует обычные сообщения как суицидальные, но данный факт нельзя интерпретировать как запрет на использования модели, так как ложные срабатывания здесь были бы опасны только в случае более частой классификации суицидальных сообщений как обычных.</a:t>
             </a:r>
           </a:p>
         </p:txBody>
@@ -1003,7 +978,7 @@
     </p:spTree>
     <p:extLst>
       <p:ext uri="{BB962C8B-B14F-4D97-AF65-F5344CB8AC3E}">
-        <p14:creationId xmlns:p14="http://schemas.microsoft.com/office/powerpoint/2010/main" val="3985653510"/>
+        <p14:creationId xmlns:p14="http://schemas.microsoft.com/office/powerpoint/2010/main" val="1116725367"/>
       </p:ext>
     </p:extLst>
   </p:cSld>
@@ -1059,19 +1034,7 @@
           <a:p>
             <a:r>
               <a:rPr lang="ru-RU" dirty="0"/>
-              <a:t>Метрика точности логистической регрессии с использованием </a:t>
-            </a:r>
-            <a:r>
-              <a:rPr lang="en-US" dirty="0"/>
-              <a:t>BERT-</a:t>
-            </a:r>
-            <a:r>
-              <a:rPr lang="ru-RU" dirty="0" err="1"/>
-              <a:t>вектоизации</a:t>
-            </a:r>
-            <a:r>
-              <a:rPr lang="ru-RU" dirty="0"/>
-              <a:t> достигла значения 0.874</a:t>
+              <a:t>Метрика точности случайного леса с использованием «мешка слов» достигла значения 0.885</a:t>
             </a:r>
             <a:r>
               <a:rPr lang="en-US" dirty="0"/>
@@ -1079,7 +1042,7 @@
             </a:r>
             <a:r>
               <a:rPr lang="ru-RU" dirty="0"/>
-              <a:t>мера – 0.869, </a:t>
+              <a:t>мера – 0.873, </a:t>
             </a:r>
             <a:r>
               <a:rPr lang="en-US" dirty="0"/>
@@ -1087,52 +1050,31 @@
             </a:r>
             <a:r>
               <a:rPr lang="ru-RU" dirty="0"/>
-              <a:t>0.942. Разница по сравнению с лидирующим алгоритмом по точности и </a:t>
+              <a:t>0.947. Заметно, что разница по сравнению с предыдущим алгоритмом по точности и </a:t>
             </a:r>
             <a:r>
               <a:rPr lang="en-US" dirty="0"/>
-              <a:t>F</a:t>
+              <a:t>ROC-AUC </a:t>
             </a:r>
             <a:r>
               <a:rPr lang="ru-RU" dirty="0"/>
-              <a:t>1</a:t>
+              <a:t>не так велика, однако </a:t>
             </a:r>
             <a:r>
               <a:rPr lang="en-US" dirty="0"/>
-              <a:t>-</a:t>
+              <a:t>F1-</a:t>
             </a:r>
             <a:r>
               <a:rPr lang="ru-RU" dirty="0"/>
-              <a:t>мере уже приближается к 2</a:t>
+              <a:t>мера здесь уже примерно на 1.4</a:t>
             </a:r>
             <a:r>
               <a:rPr lang="en-US" dirty="0"/>
-              <a:t>%.</a:t>
-            </a:r>
-          </a:p>
-          <a:p>
-            <a:endParaRPr lang="en-US" dirty="0"/>
-          </a:p>
-          <a:p>
+              <a:t>% </a:t>
+            </a:r>
             <a:r>
               <a:rPr lang="ru-RU" dirty="0"/>
-              <a:t>Таким образом, в качестве используемой модели в задаче распознавания паттернов суицидального</a:t>
-            </a:r>
-            <a:r>
-              <a:rPr lang="en-US" dirty="0"/>
-              <a:t> </a:t>
-            </a:r>
-            <a:r>
-              <a:rPr lang="ru-RU" dirty="0"/>
-              <a:t>поведения человека рекомендуется использование метода случайного леса с использованием </a:t>
-            </a:r>
-            <a:r>
-              <a:rPr lang="en-US" dirty="0"/>
-              <a:t>BERT-</a:t>
-            </a:r>
-            <a:r>
-              <a:rPr lang="ru-RU" dirty="0"/>
-              <a:t>векторизации.</a:t>
+              <a:t>ниже.</a:t>
             </a:r>
           </a:p>
         </p:txBody>
@@ -1163,7 +1105,7 @@
     </p:spTree>
     <p:extLst>
       <p:ext uri="{BB962C8B-B14F-4D97-AF65-F5344CB8AC3E}">
-        <p14:creationId xmlns:p14="http://schemas.microsoft.com/office/powerpoint/2010/main" val="1291907138"/>
+        <p14:creationId xmlns:p14="http://schemas.microsoft.com/office/powerpoint/2010/main" val="3985653510"/>
       </p:ext>
     </p:extLst>
   </p:cSld>
@@ -1219,7 +1161,76 @@
           <a:p>
             <a:r>
               <a:rPr lang="ru-RU" dirty="0"/>
-              <a:t>В результате был разработан и реализован метод распознавания паттернов суицидального поведения человека по текстовым сообщениям. Все поставленные задачи решены.</a:t>
+              <a:t>Метрика точности логистической регрессии с использованием </a:t>
+            </a:r>
+            <a:r>
+              <a:rPr lang="en-US" dirty="0"/>
+              <a:t>BERT-</a:t>
+            </a:r>
+            <a:r>
+              <a:rPr lang="ru-RU" dirty="0"/>
+              <a:t>векторизации достигла значения 0.874</a:t>
+            </a:r>
+            <a:r>
+              <a:rPr lang="en-US" dirty="0"/>
+              <a:t>, F1-</a:t>
+            </a:r>
+            <a:r>
+              <a:rPr lang="ru-RU" dirty="0"/>
+              <a:t>мера – 0.869, </a:t>
+            </a:r>
+            <a:r>
+              <a:rPr lang="en-US" dirty="0"/>
+              <a:t>ROC-AUC – </a:t>
+            </a:r>
+            <a:r>
+              <a:rPr lang="ru-RU" dirty="0"/>
+              <a:t>0.942. Разница по сравнению с лидирующим алгоритмом по точности и </a:t>
+            </a:r>
+            <a:r>
+              <a:rPr lang="en-US" dirty="0"/>
+              <a:t>F</a:t>
+            </a:r>
+            <a:r>
+              <a:rPr lang="ru-RU" dirty="0"/>
+              <a:t>1</a:t>
+            </a:r>
+            <a:r>
+              <a:rPr lang="en-US" dirty="0"/>
+              <a:t>-</a:t>
+            </a:r>
+            <a:r>
+              <a:rPr lang="ru-RU" dirty="0"/>
+              <a:t>мере уже приближается к 2</a:t>
+            </a:r>
+            <a:r>
+              <a:rPr lang="en-US" dirty="0"/>
+              <a:t>%.</a:t>
+            </a:r>
+          </a:p>
+          <a:p>
+            <a:endParaRPr lang="en-US" dirty="0"/>
+          </a:p>
+          <a:p>
+            <a:r>
+              <a:rPr lang="ru-RU" dirty="0"/>
+              <a:t>Таким образом, в качестве используемой модели в задаче распознавания паттернов суицидального</a:t>
+            </a:r>
+            <a:r>
+              <a:rPr lang="en-US" dirty="0"/>
+              <a:t> </a:t>
+            </a:r>
+            <a:r>
+              <a:rPr lang="ru-RU" dirty="0"/>
+              <a:t>поведения человека рекомендуется использование метода случайного леса с использованием </a:t>
+            </a:r>
+            <a:r>
+              <a:rPr lang="en-US" dirty="0"/>
+              <a:t>BERT-</a:t>
+            </a:r>
+            <a:r>
+              <a:rPr lang="ru-RU" dirty="0"/>
+              <a:t>векторизации.</a:t>
             </a:r>
           </a:p>
         </p:txBody>
@@ -1250,7 +1261,7 @@
     </p:spTree>
     <p:extLst>
       <p:ext uri="{BB962C8B-B14F-4D97-AF65-F5344CB8AC3E}">
-        <p14:creationId xmlns:p14="http://schemas.microsoft.com/office/powerpoint/2010/main" val="546598652"/>
+        <p14:creationId xmlns:p14="http://schemas.microsoft.com/office/powerpoint/2010/main" val="1291907138"/>
       </p:ext>
     </p:extLst>
   </p:cSld>
@@ -1306,38 +1317,8 @@
           <a:p>
             <a:r>
               <a:rPr lang="ru-RU" dirty="0"/>
-              <a:t>В будущем планируется дополнительно провести исследование эффективности использования ансамблевого подхода, а также исследование применимости алгоритмов нечеткой кластеризации в задаче. Требуется расширить </a:t>
-            </a:r>
-            <a:r>
-              <a:rPr lang="ru-RU" dirty="0" err="1"/>
-              <a:t>датасет</a:t>
-            </a:r>
-            <a:r>
-              <a:rPr lang="ru-RU" dirty="0"/>
-              <a:t>, задействовать в нем дополнительные признаки, а затем в качестве расширения системы реализовать средство автоматизированного анализа сообщений пользователей в социальных сетях. Ну и конечно же хотелось бы внедрить программное решение в рабочий процесс.</a:t>
-            </a:r>
-          </a:p>
-          <a:p>
-            <a:endParaRPr lang="ru-RU" dirty="0"/>
-          </a:p>
-          <a:p>
-            <a:r>
-              <a:rPr lang="ru-RU" dirty="0"/>
-              <a:t>По теме представленной работы </a:t>
-            </a:r>
-            <a:r>
-              <a:rPr lang="ru-RU" dirty="0" err="1"/>
-              <a:t>опубликваны</a:t>
-            </a:r>
-            <a:r>
-              <a:rPr lang="ru-RU" dirty="0"/>
-              <a:t> </a:t>
-            </a:r>
-            <a:r>
-              <a:rPr lang="ru-RU"/>
-              <a:t>две статьи.</a:t>
-            </a:r>
-            <a:endParaRPr lang="ru-RU" dirty="0"/>
+              <a:t>В результате был разработан и реализован метод распознавания паттернов суицидального поведения человека по текстовым сообщениям. Все поставленные задачи решены.</a:t>
+            </a:r>
           </a:p>
         </p:txBody>
       </p:sp>
@@ -1359,6 +1340,110 @@
             <a:fld id="{E218A35C-009A-4690-875A-C24C402031AA}" type="slidenum">
               <a:rPr lang="ru-RU" smtClean="0"/>
               <a:t>16</a:t>
+            </a:fld>
+            <a:endParaRPr lang="ru-RU"/>
+          </a:p>
+        </p:txBody>
+      </p:sp>
+    </p:spTree>
+    <p:extLst>
+      <p:ext uri="{BB962C8B-B14F-4D97-AF65-F5344CB8AC3E}">
+        <p14:creationId xmlns:p14="http://schemas.microsoft.com/office/powerpoint/2010/main" val="546598652"/>
+      </p:ext>
+    </p:extLst>
+  </p:cSld>
+  <p:clrMapOvr>
+    <a:masterClrMapping/>
+  </p:clrMapOvr>
+</p:notes>
+</file>
+
+<file path=ppt/notesSlides/notesSlide17.xml><?xml version="1.0" encoding="utf-8"?>
+<p:notes xmlns:a="http://schemas.openxmlformats.org/drawingml/2006/main" xmlns:r="http://schemas.openxmlformats.org/officeDocument/2006/relationships" xmlns:p="http://schemas.openxmlformats.org/presentationml/2006/main">
+  <p:cSld>
+    <p:spTree>
+      <p:nvGrpSpPr>
+        <p:cNvPr id="1" name=""/>
+        <p:cNvGrpSpPr/>
+        <p:nvPr/>
+      </p:nvGrpSpPr>
+      <p:grpSpPr>
+        <a:xfrm>
+          <a:off x="0" y="0"/>
+          <a:ext cx="0" cy="0"/>
+          <a:chOff x="0" y="0"/>
+          <a:chExt cx="0" cy="0"/>
+        </a:xfrm>
+      </p:grpSpPr>
+      <p:sp>
+        <p:nvSpPr>
+          <p:cNvPr id="2" name="Образ слайда 1"/>
+          <p:cNvSpPr>
+            <a:spLocks noGrp="1" noRot="1" noChangeAspect="1"/>
+          </p:cNvSpPr>
+          <p:nvPr>
+            <p:ph type="sldImg"/>
+          </p:nvPr>
+        </p:nvSpPr>
+        <p:spPr/>
+      </p:sp>
+      <p:sp>
+        <p:nvSpPr>
+          <p:cNvPr id="3" name="Заметки 2"/>
+          <p:cNvSpPr>
+            <a:spLocks noGrp="1"/>
+          </p:cNvSpPr>
+          <p:nvPr>
+            <p:ph type="body" idx="1"/>
+          </p:nvPr>
+        </p:nvSpPr>
+        <p:spPr/>
+        <p:txBody>
+          <a:bodyPr/>
+          <a:lstStyle/>
+          <a:p>
+            <a:r>
+              <a:rPr lang="ru-RU" dirty="0"/>
+              <a:t>В будущем планируется дополнительно провести исследование эффективности использования ансамблевого подхода, а также исследование применимости алгоритмов нечеткой кластеризации в задаче. Требуется расширить </a:t>
+            </a:r>
+            <a:r>
+              <a:rPr lang="ru-RU" dirty="0" err="1"/>
+              <a:t>датасет</a:t>
+            </a:r>
+            <a:r>
+              <a:rPr lang="ru-RU" dirty="0"/>
+              <a:t>, задействовать в нем дополнительные признаки, а затем в качестве расширения системы реализовать средство автоматизированного анализа сообщений пользователей в социальных сетях. Ну и конечно же хотелось бы внедрить программное решение в рабочий процесс.</a:t>
+            </a:r>
+          </a:p>
+          <a:p>
+            <a:endParaRPr lang="ru-RU" dirty="0"/>
+          </a:p>
+          <a:p>
+            <a:r>
+              <a:rPr lang="ru-RU" dirty="0"/>
+              <a:t>По теме представленной работы опубликованы две статьи.</a:t>
+            </a:r>
+          </a:p>
+        </p:txBody>
+      </p:sp>
+      <p:sp>
+        <p:nvSpPr>
+          <p:cNvPr id="4" name="Номер слайда 3"/>
+          <p:cNvSpPr>
+            <a:spLocks noGrp="1"/>
+          </p:cNvSpPr>
+          <p:nvPr>
+            <p:ph type="sldNum" sz="quarter" idx="5"/>
+          </p:nvPr>
+        </p:nvSpPr>
+        <p:spPr/>
+        <p:txBody>
+          <a:bodyPr/>
+          <a:lstStyle/>
+          <a:p>
+            <a:fld id="{E218A35C-009A-4690-875A-C24C402031AA}" type="slidenum">
+              <a:rPr lang="ru-RU" smtClean="0"/>
+              <a:t>17</a:t>
             </a:fld>
             <a:endParaRPr lang="ru-RU"/>
           </a:p>
@@ -1426,6 +1511,9 @@
               <a:t>Здравствуйте, уважаемая комиссия, целью моей работы является разработка и реализация метода распознавания паттернов суицидального поведения человека по текстовым сообщениям. Задачи работы представлены на слайде.</a:t>
             </a:r>
           </a:p>
+          <a:p>
+            <a:endParaRPr lang="ru-RU" dirty="0"/>
+          </a:p>
         </p:txBody>
       </p:sp>
       <p:sp>
@@ -1521,6 +1609,20 @@
               <a:t> медицины представляется возможным автоматизировать обнаружение паттернов суицидального поведения.</a:t>
             </a:r>
           </a:p>
+          <a:p>
+            <a:r>
+              <a:rPr lang="ru-RU" dirty="0"/>
+              <a:t>В настоящий момент известно о наличии в некоторых социальных сетях искусственного интеллекта, предназначенного для обнаружения людей с высоким суицидальным риском, однако исходники данного ПО не представлены в открытом доступе, а все наработки по данной теме являются объектом коммерческой тайны. Кроме того, свое распространение получили и средства классификации тональности сообщений, такие как </a:t>
+            </a:r>
+            <a:r>
+              <a:rPr lang="en-US" dirty="0"/>
+              <a:t>Dostoevsky, </a:t>
+            </a:r>
+            <a:r>
+              <a:rPr lang="ru-RU" dirty="0"/>
+              <a:t>однако в данном случае классификация направлена на определение положительной или отрицательной окраски и не может быть задействована в целях диагностики психических заболеваний. (ТУТ МОЖЕТ БЫТЬ ОТДЕЛЬНЫЙ СЛАЙД ПОД ЭТО НУЖЕН??? А ЧТО НА НЕГО ВЫНОСИТЬ, ЕСЛИ НУЖЕН??)</a:t>
+            </a:r>
+          </a:p>
         </p:txBody>
       </p:sp>
       <p:sp>
@@ -1607,6 +1709,10 @@
               <a:rPr lang="ru-RU" dirty="0"/>
               <a:t>Были рассмотрены методы, позволяющие распознавать паттерны суицидального поведения с использованием аудиальных, текстовых, пространственно-временных, визуальных, физиологических и биологических признаков. Каждый признак может быть задействован обособленно, либо в синтезе с другим. Так, например, биологические признаки позволяют сужать область поиска в группах риска.</a:t>
             </a:r>
+            <a:endParaRPr lang="en-US" dirty="0"/>
+          </a:p>
+          <a:p>
+            <a:endParaRPr lang="en-US" dirty="0"/>
           </a:p>
         </p:txBody>
       </p:sp>
@@ -1692,7 +1798,15 @@
           <a:p>
             <a:r>
               <a:rPr lang="ru-RU" dirty="0"/>
-              <a:t>В этапы разработанного метода вошли: сбор примеров суицидальных сообщений, их предобработка, построение модели машинного обучения и предобработка, анализ и вынесение вердикта о наличии суицидальных паттернов в сообщении. </a:t>
+              <a:t>Разработанный метод позволяет определить наличие суицидальных паттернов в текстовом сообщении. В качестве входных данных задействованы данные о </a:t>
+            </a:r>
+            <a:r>
+              <a:rPr lang="ru-RU" dirty="0" err="1"/>
+              <a:t>суицидентах</a:t>
+            </a:r>
+            <a:r>
+              <a:rPr lang="ru-RU" dirty="0"/>
+              <a:t> и текстовое сообщение, а результат работы метода – вердикт о наличии суицидальных паттернов.</a:t>
             </a:r>
           </a:p>
         </p:txBody>
@@ -1723,7 +1837,7 @@
     </p:spTree>
     <p:extLst>
       <p:ext uri="{BB962C8B-B14F-4D97-AF65-F5344CB8AC3E}">
-        <p14:creationId xmlns:p14="http://schemas.microsoft.com/office/powerpoint/2010/main" val="3172517244"/>
+        <p14:creationId xmlns:p14="http://schemas.microsoft.com/office/powerpoint/2010/main" val="611447890"/>
       </p:ext>
     </p:extLst>
   </p:cSld>
@@ -1779,47 +1893,7 @@
           <a:p>
             <a:r>
               <a:rPr lang="ru-RU" dirty="0"/>
-              <a:t>С использованием средства сбора данных было собрано 1000 суицидальных сообщений. В результате </a:t>
-            </a:r>
-            <a:r>
-              <a:rPr lang="ru-RU" dirty="0" err="1"/>
-              <a:t>датасет</a:t>
-            </a:r>
-            <a:r>
-              <a:rPr lang="ru-RU" dirty="0"/>
-              <a:t> включил в себя 2000 сообщений, 1000 </a:t>
-            </a:r>
-            <a:r>
-              <a:rPr lang="ru-RU" dirty="0" err="1"/>
-              <a:t>несуицидальных</a:t>
-            </a:r>
-            <a:r>
-              <a:rPr lang="ru-RU" dirty="0"/>
-              <a:t> из которых были взяты из </a:t>
-            </a:r>
-            <a:r>
-              <a:rPr lang="ru-RU" dirty="0" err="1"/>
-              <a:t>датасета</a:t>
-            </a:r>
-            <a:r>
-              <a:rPr lang="ru-RU" dirty="0"/>
-              <a:t> обнаружения </a:t>
-            </a:r>
-            <a:r>
-              <a:rPr lang="ru-RU" dirty="0" err="1"/>
-              <a:t>пресуицидальных</a:t>
-            </a:r>
-            <a:r>
-              <a:rPr lang="ru-RU" dirty="0"/>
-              <a:t> сигналов. На слайде представлен результат анализа </a:t>
-            </a:r>
-            <a:r>
-              <a:rPr lang="ru-RU" dirty="0" err="1"/>
-              <a:t>сентимента</a:t>
-            </a:r>
-            <a:r>
-              <a:rPr lang="ru-RU" dirty="0"/>
-              <a:t> для каждого класса, в среднем суицидальные сообщения имеют отрицательную эмоциональную окраску в 30% случаев чаще.</a:t>
+              <a:t>В этапы разработанного метода вошли: сбор примеров суицидальных сообщений, их предобработка, построение модели машинного обучения и предобработка, анализ и вынесение вердикта о наличии суицидальных паттернов в сообщении. </a:t>
             </a:r>
           </a:p>
         </p:txBody>
@@ -1850,7 +1924,7 @@
     </p:spTree>
     <p:extLst>
       <p:ext uri="{BB962C8B-B14F-4D97-AF65-F5344CB8AC3E}">
-        <p14:creationId xmlns:p14="http://schemas.microsoft.com/office/powerpoint/2010/main" val="3386379048"/>
+        <p14:creationId xmlns:p14="http://schemas.microsoft.com/office/powerpoint/2010/main" val="3172517244"/>
       </p:ext>
     </p:extLst>
   </p:cSld>
@@ -1904,29 +1978,49 @@
           <a:bodyPr/>
           <a:lstStyle/>
           <a:p>
-            <a:pPr marL="0" marR="0" lvl="0" indent="0" algn="l" defTabSz="914400" rtl="0" eaLnBrk="1" fontAlgn="auto" latinLnBrk="0" hangingPunct="1">
-              <a:lnSpc>
-                <a:spcPct val="100000"/>
-              </a:lnSpc>
-              <a:spcBef>
-                <a:spcPts val="0"/>
-              </a:spcBef>
-              <a:spcAft>
-                <a:spcPts val="0"/>
-              </a:spcAft>
-              <a:buClrTx/>
-              <a:buSzTx/>
-              <a:buFontTx/>
-              <a:buNone/>
-              <a:tabLst/>
-              <a:defRPr/>
-            </a:pPr>
-            <a:r>
-              <a:rPr lang="ru-RU" dirty="0">
-                <a:latin typeface="Times New Roman" panose="02020603050405020304" pitchFamily="18" charset="0"/>
-                <a:cs typeface="Times New Roman" panose="02020603050405020304" pitchFamily="18" charset="0"/>
-              </a:rPr>
-              <a:t>На слайде представлена визуализация собранных данных класса суицидальных сообщений. Чаще всего в суицидальных сообщениях фигурируют слова «жизнь», «хотеть», «человек» и «мочь», каждое не более 600 раз. Стоит обратить внимание на присутствие слов «суицид», «страдать», «депрессия», «смерть» и «ад».</a:t>
+            <a:r>
+              <a:rPr lang="ru-RU" dirty="0"/>
+              <a:t>С использованием средства сбора данных было собрано 1000 суицидальных сообщений. В результате </a:t>
+            </a:r>
+            <a:r>
+              <a:rPr lang="ru-RU" dirty="0" err="1"/>
+              <a:t>датасет</a:t>
+            </a:r>
+            <a:r>
+              <a:rPr lang="ru-RU" dirty="0"/>
+              <a:t> включил в себя 2000 сообщений, 1000 </a:t>
+            </a:r>
+            <a:r>
+              <a:rPr lang="ru-RU" dirty="0" err="1"/>
+              <a:t>несуицидальных</a:t>
+            </a:r>
+            <a:r>
+              <a:rPr lang="ru-RU" dirty="0"/>
+              <a:t> из которых были взяты из </a:t>
+            </a:r>
+            <a:r>
+              <a:rPr lang="ru-RU" dirty="0" err="1"/>
+              <a:t>датасета</a:t>
+            </a:r>
+            <a:r>
+              <a:rPr lang="ru-RU" dirty="0"/>
+              <a:t> обнаружения </a:t>
+            </a:r>
+            <a:r>
+              <a:rPr lang="ru-RU" dirty="0" err="1"/>
+              <a:t>пресуицидальных</a:t>
+            </a:r>
+            <a:r>
+              <a:rPr lang="ru-RU" dirty="0"/>
+              <a:t> сигналов. На слайде представлен результат анализа </a:t>
+            </a:r>
+            <a:r>
+              <a:rPr lang="ru-RU" dirty="0" err="1"/>
+              <a:t>сентимента</a:t>
+            </a:r>
+            <a:r>
+              <a:rPr lang="ru-RU" dirty="0"/>
+              <a:t> для каждого класса, в среднем суицидальные сообщения имеют отрицательную эмоциональную окраску в 30% случаев чаще.</a:t>
             </a:r>
           </a:p>
         </p:txBody>
@@ -1957,7 +2051,7 @@
     </p:spTree>
     <p:extLst>
       <p:ext uri="{BB962C8B-B14F-4D97-AF65-F5344CB8AC3E}">
-        <p14:creationId xmlns:p14="http://schemas.microsoft.com/office/powerpoint/2010/main" val="57781872"/>
+        <p14:creationId xmlns:p14="http://schemas.microsoft.com/office/powerpoint/2010/main" val="3386379048"/>
       </p:ext>
     </p:extLst>
   </p:cSld>
@@ -2033,49 +2127,7 @@
                 <a:latin typeface="Times New Roman" panose="02020603050405020304" pitchFamily="18" charset="0"/>
                 <a:cs typeface="Times New Roman" panose="02020603050405020304" pitchFamily="18" charset="0"/>
               </a:rPr>
-              <a:t>На слайде представлена визуализация собранных данных класса </a:t>
-            </a:r>
-            <a:r>
-              <a:rPr lang="ru-RU" dirty="0" err="1">
-                <a:latin typeface="Times New Roman" panose="02020603050405020304" pitchFamily="18" charset="0"/>
-                <a:cs typeface="Times New Roman" panose="02020603050405020304" pitchFamily="18" charset="0"/>
-              </a:rPr>
-              <a:t>несуицидальных</a:t>
-            </a:r>
-            <a:r>
-              <a:rPr lang="ru-RU" dirty="0">
-                <a:latin typeface="Times New Roman" panose="02020603050405020304" pitchFamily="18" charset="0"/>
-                <a:cs typeface="Times New Roman" panose="02020603050405020304" pitchFamily="18" charset="0"/>
-              </a:rPr>
-              <a:t> сообщений. Чаще всего в таких сообщениях фигурируют слова «хотеть» и «человек». Данный класс более разнообразен, в нем самые </a:t>
-            </a:r>
-            <a:r>
-              <a:rPr lang="ru-RU" dirty="0" err="1">
-                <a:latin typeface="Times New Roman" panose="02020603050405020304" pitchFamily="18" charset="0"/>
-                <a:cs typeface="Times New Roman" panose="02020603050405020304" pitchFamily="18" charset="0"/>
-              </a:rPr>
-              <a:t>частоупотребимые</a:t>
-            </a:r>
-            <a:r>
-              <a:rPr lang="ru-RU" dirty="0">
-                <a:latin typeface="Times New Roman" panose="02020603050405020304" pitchFamily="18" charset="0"/>
-                <a:cs typeface="Times New Roman" panose="02020603050405020304" pitchFamily="18" charset="0"/>
-              </a:rPr>
-              <a:t> слова встречаются не более 200 раз. Кроме того, заметно наличие </a:t>
-            </a:r>
-            <a:r>
-              <a:rPr lang="ru-RU" dirty="0" err="1">
-                <a:latin typeface="Times New Roman" panose="02020603050405020304" pitchFamily="18" charset="0"/>
-                <a:cs typeface="Times New Roman" panose="02020603050405020304" pitchFamily="18" charset="0"/>
-              </a:rPr>
-              <a:t>бОльшего</a:t>
-            </a:r>
-            <a:r>
-              <a:rPr lang="ru-RU" dirty="0">
-                <a:latin typeface="Times New Roman" panose="02020603050405020304" pitchFamily="18" charset="0"/>
-                <a:cs typeface="Times New Roman" panose="02020603050405020304" pitchFamily="18" charset="0"/>
-              </a:rPr>
-              <a:t> количества нецензурной брани.</a:t>
+              <a:t>На слайде представлена визуализация собранных данных класса суицидальных сообщений. Чаще всего в суицидальных сообщениях фигурируют слова «жизнь», «хотеть», «человек» и «мочь», каждое не более 600 раз. Стоит обратить внимание на присутствие слов «суицид», «страдать», «депрессия», «смерть» и «ад».</a:t>
             </a:r>
           </a:p>
         </p:txBody>
@@ -2106,7 +2158,7 @@
     </p:spTree>
     <p:extLst>
       <p:ext uri="{BB962C8B-B14F-4D97-AF65-F5344CB8AC3E}">
-        <p14:creationId xmlns:p14="http://schemas.microsoft.com/office/powerpoint/2010/main" val="1971402196"/>
+        <p14:creationId xmlns:p14="http://schemas.microsoft.com/office/powerpoint/2010/main" val="57781872"/>
       </p:ext>
     </p:extLst>
   </p:cSld>
@@ -2160,9 +2212,71 @@
           <a:bodyPr/>
           <a:lstStyle/>
           <a:p>
-            <a:r>
-              <a:rPr lang="ru-RU" dirty="0"/>
-              <a:t>В системе было определено 4 модуля, все они представлены на слайде. Модуль клиента взаимодействует с модулями анализа и сбора данных, так как от первого он получает данные модели, а от второго – текстовые сообщения для анализа.</a:t>
+            <a:pPr marL="0" marR="0" lvl="0" indent="0" algn="l" defTabSz="914400" rtl="0" eaLnBrk="1" fontAlgn="auto" latinLnBrk="0" hangingPunct="1">
+              <a:lnSpc>
+                <a:spcPct val="100000"/>
+              </a:lnSpc>
+              <a:spcBef>
+                <a:spcPts val="0"/>
+              </a:spcBef>
+              <a:spcAft>
+                <a:spcPts val="0"/>
+              </a:spcAft>
+              <a:buClrTx/>
+              <a:buSzTx/>
+              <a:buFontTx/>
+              <a:buNone/>
+              <a:tabLst/>
+              <a:defRPr/>
+            </a:pPr>
+            <a:r>
+              <a:rPr lang="ru-RU" dirty="0">
+                <a:latin typeface="Times New Roman" panose="02020603050405020304" pitchFamily="18" charset="0"/>
+                <a:cs typeface="Times New Roman" panose="02020603050405020304" pitchFamily="18" charset="0"/>
+              </a:rPr>
+              <a:t>На слайде представлена визуализация собранных данных класса </a:t>
+            </a:r>
+            <a:r>
+              <a:rPr lang="ru-RU" dirty="0" err="1">
+                <a:latin typeface="Times New Roman" panose="02020603050405020304" pitchFamily="18" charset="0"/>
+                <a:cs typeface="Times New Roman" panose="02020603050405020304" pitchFamily="18" charset="0"/>
+              </a:rPr>
+              <a:t>несуицидальных</a:t>
+            </a:r>
+            <a:r>
+              <a:rPr lang="ru-RU" dirty="0">
+                <a:latin typeface="Times New Roman" panose="02020603050405020304" pitchFamily="18" charset="0"/>
+                <a:cs typeface="Times New Roman" panose="02020603050405020304" pitchFamily="18" charset="0"/>
+              </a:rPr>
+              <a:t> сообщений. Чаще всего в таких сообщениях фигурируют слова «хотеть» и «человек». Данный класс более разнообразен, в нем самые </a:t>
+            </a:r>
+            <a:r>
+              <a:rPr lang="ru-RU" dirty="0" err="1">
+                <a:latin typeface="Times New Roman" panose="02020603050405020304" pitchFamily="18" charset="0"/>
+                <a:cs typeface="Times New Roman" panose="02020603050405020304" pitchFamily="18" charset="0"/>
+              </a:rPr>
+              <a:t>частоупотребимые</a:t>
+            </a:r>
+            <a:r>
+              <a:rPr lang="ru-RU" dirty="0">
+                <a:latin typeface="Times New Roman" panose="02020603050405020304" pitchFamily="18" charset="0"/>
+                <a:cs typeface="Times New Roman" panose="02020603050405020304" pitchFamily="18" charset="0"/>
+              </a:rPr>
+              <a:t> слова встречаются не более 200 раз. Кроме того, заметно наличие </a:t>
+            </a:r>
+            <a:r>
+              <a:rPr lang="ru-RU" dirty="0" err="1">
+                <a:latin typeface="Times New Roman" panose="02020603050405020304" pitchFamily="18" charset="0"/>
+                <a:cs typeface="Times New Roman" panose="02020603050405020304" pitchFamily="18" charset="0"/>
+              </a:rPr>
+              <a:t>бОльшего</a:t>
+            </a:r>
+            <a:r>
+              <a:rPr lang="ru-RU" dirty="0">
+                <a:latin typeface="Times New Roman" panose="02020603050405020304" pitchFamily="18" charset="0"/>
+                <a:cs typeface="Times New Roman" panose="02020603050405020304" pitchFamily="18" charset="0"/>
+              </a:rPr>
+              <a:t> количества нецензурной брани.</a:t>
             </a:r>
           </a:p>
         </p:txBody>
@@ -2193,7 +2307,7 @@
     </p:spTree>
     <p:extLst>
       <p:ext uri="{BB962C8B-B14F-4D97-AF65-F5344CB8AC3E}">
-        <p14:creationId xmlns:p14="http://schemas.microsoft.com/office/powerpoint/2010/main" val="2542268922"/>
+        <p14:creationId xmlns:p14="http://schemas.microsoft.com/office/powerpoint/2010/main" val="1971402196"/>
       </p:ext>
     </p:extLst>
   </p:cSld>
@@ -2350,7 +2464,7 @@
           <a:p>
             <a:fld id="{15988D4F-E58D-4CDE-A3D0-F6AD327AEC56}" type="datetime1">
               <a:rPr lang="ru-RU" smtClean="0"/>
-              <a:t>08.04.2024</a:t>
+              <a:t>19.05.2024</a:t>
             </a:fld>
             <a:endParaRPr lang="ru-RU"/>
           </a:p>
@@ -2548,7 +2662,7 @@
           <a:p>
             <a:fld id="{CE1E2A47-57B7-4CF1-A92E-49D63AEE96D5}" type="datetime1">
               <a:rPr lang="ru-RU" smtClean="0"/>
-              <a:t>08.04.2024</a:t>
+              <a:t>19.05.2024</a:t>
             </a:fld>
             <a:endParaRPr lang="ru-RU"/>
           </a:p>
@@ -2756,7 +2870,7 @@
           <a:p>
             <a:fld id="{CA81ACF7-CEE3-4A9F-B718-A470CCA653C5}" type="datetime1">
               <a:rPr lang="ru-RU" smtClean="0"/>
-              <a:t>08.04.2024</a:t>
+              <a:t>19.05.2024</a:t>
             </a:fld>
             <a:endParaRPr lang="ru-RU"/>
           </a:p>
@@ -2954,7 +3068,7 @@
           <a:p>
             <a:fld id="{5E37AE04-DA44-410C-A175-FF6C781BC876}" type="datetime1">
               <a:rPr lang="ru-RU" smtClean="0"/>
-              <a:t>08.04.2024</a:t>
+              <a:t>19.05.2024</a:t>
             </a:fld>
             <a:endParaRPr lang="ru-RU"/>
           </a:p>
@@ -3229,7 +3343,7 @@
           <a:p>
             <a:fld id="{E32C54E3-AF17-448A-9297-44EF357EABC1}" type="datetime1">
               <a:rPr lang="ru-RU" smtClean="0"/>
-              <a:t>08.04.2024</a:t>
+              <a:t>19.05.2024</a:t>
             </a:fld>
             <a:endParaRPr lang="ru-RU"/>
           </a:p>
@@ -3494,7 +3608,7 @@
           <a:p>
             <a:fld id="{6955E014-4D2F-48F0-99F5-18541DD4F253}" type="datetime1">
               <a:rPr lang="ru-RU" smtClean="0"/>
-              <a:t>08.04.2024</a:t>
+              <a:t>19.05.2024</a:t>
             </a:fld>
             <a:endParaRPr lang="ru-RU"/>
           </a:p>
@@ -3906,7 +4020,7 @@
           <a:p>
             <a:fld id="{E7E8D56A-792C-4904-9EB1-6F8EF41EE765}" type="datetime1">
               <a:rPr lang="ru-RU" smtClean="0"/>
-              <a:t>08.04.2024</a:t>
+              <a:t>19.05.2024</a:t>
             </a:fld>
             <a:endParaRPr lang="ru-RU"/>
           </a:p>
@@ -4047,7 +4161,7 @@
           <a:p>
             <a:fld id="{7065F927-12B6-4A7B-B3A2-7352DF6A122F}" type="datetime1">
               <a:rPr lang="ru-RU" smtClean="0"/>
-              <a:t>08.04.2024</a:t>
+              <a:t>19.05.2024</a:t>
             </a:fld>
             <a:endParaRPr lang="ru-RU"/>
           </a:p>
@@ -4160,7 +4274,7 @@
           <a:p>
             <a:fld id="{AAFF6416-B84E-492F-BBC6-38E032565367}" type="datetime1">
               <a:rPr lang="ru-RU" smtClean="0"/>
-              <a:t>08.04.2024</a:t>
+              <a:t>19.05.2024</a:t>
             </a:fld>
             <a:endParaRPr lang="ru-RU"/>
           </a:p>
@@ -4471,7 +4585,7 @@
           <a:p>
             <a:fld id="{F0BD601D-7324-4D41-B3DA-86B4FCF095DB}" type="datetime1">
               <a:rPr lang="ru-RU" smtClean="0"/>
-              <a:t>08.04.2024</a:t>
+              <a:t>19.05.2024</a:t>
             </a:fld>
             <a:endParaRPr lang="ru-RU"/>
           </a:p>
@@ -4759,7 +4873,7 @@
           <a:p>
             <a:fld id="{91160DCC-CAF3-4180-8270-9561E69073DD}" type="datetime1">
               <a:rPr lang="ru-RU" smtClean="0"/>
-              <a:t>08.04.2024</a:t>
+              <a:t>19.05.2024</a:t>
             </a:fld>
             <a:endParaRPr lang="ru-RU"/>
           </a:p>
@@ -5000,7 +5114,7 @@
           <a:p>
             <a:fld id="{A366973F-C059-4909-8C8C-5ED2D1FD3A9E}" type="datetime1">
               <a:rPr lang="ru-RU" smtClean="0"/>
-              <a:t>08.04.2024</a:t>
+              <a:t>19.05.2024</a:t>
             </a:fld>
             <a:endParaRPr lang="ru-RU"/>
           </a:p>
@@ -5436,7 +5550,7 @@
         </p:nvSpPr>
         <p:spPr>
           <a:xfrm>
-            <a:off x="1523997" y="1410606"/>
+            <a:off x="1523997" y="1754366"/>
             <a:ext cx="9144000" cy="3072641"/>
           </a:xfrm>
         </p:spPr>
@@ -5533,8 +5647,8 @@
         </p:nvSpPr>
         <p:spPr>
           <a:xfrm>
-            <a:off x="430694" y="71778"/>
-            <a:ext cx="11330609" cy="1477328"/>
+            <a:off x="430692" y="62912"/>
+            <a:ext cx="11330609" cy="2031325"/>
           </a:xfrm>
           <a:prstGeom prst="rect">
             <a:avLst/>
@@ -5554,6 +5668,30 @@
                 <a:cs typeface="Times New Roman" panose="02020603050405020304" pitchFamily="18" charset="0"/>
               </a:rPr>
               <a:t>МОСКОВСКИЙ ГОСУДАРСТВЕННЫЙ ТЕХНИЧЕСКИЙ УНИВЕРСИТЕТ ИМЕНИ Н.Э. БАУМАНА (НАЦИОНАЛЬНЫЙ ИССЛЕДОВАТЕЛЬСКИЙ УНИВЕРСИТЕТ)</a:t>
+            </a:r>
+            <a:endParaRPr lang="en-US" sz="1800" dirty="0">
+              <a:latin typeface="Times New Roman" panose="02020603050405020304" pitchFamily="18" charset="0"/>
+              <a:cs typeface="Times New Roman" panose="02020603050405020304" pitchFamily="18" charset="0"/>
+            </a:endParaRPr>
+          </a:p>
+          <a:p>
+            <a:pPr algn="ctr"/>
+            <a:r>
+              <a:rPr lang="ru-RU" sz="1800" dirty="0">
+                <a:latin typeface="Times New Roman" panose="02020603050405020304" pitchFamily="18" charset="0"/>
+                <a:cs typeface="Times New Roman" panose="02020603050405020304" pitchFamily="18" charset="0"/>
+              </a:rPr>
+              <a:t>Факультет «Информатика и системы управления»</a:t>
+            </a:r>
+          </a:p>
+          <a:p>
+            <a:pPr algn="ctr"/>
+            <a:r>
+              <a:rPr lang="ru-RU" dirty="0">
+                <a:latin typeface="Times New Roman" panose="02020603050405020304" pitchFamily="18" charset="0"/>
+                <a:cs typeface="Times New Roman" panose="02020603050405020304" pitchFamily="18" charset="0"/>
+              </a:rPr>
+              <a:t>Кафедра «Программное обеспечение ЭВМ и информационные технологии»</a:t>
             </a:r>
             <a:endParaRPr lang="en-US" sz="1800" dirty="0">
               <a:latin typeface="Times New Roman" panose="02020603050405020304" pitchFamily="18" charset="0"/>
@@ -5621,7 +5759,7 @@
           <p:cNvPr id="2" name="Заголовок 1">
             <a:extLst>
               <a:ext uri="{FF2B5EF4-FFF2-40B4-BE49-F238E27FC236}">
-                <a16:creationId xmlns:a16="http://schemas.microsoft.com/office/drawing/2014/main" id="{35BC007D-BFD1-4AFC-A4F4-D7A12CA851E7}"/>
+                <a16:creationId xmlns:a16="http://schemas.microsoft.com/office/drawing/2014/main" id="{A8A78197-F0E5-482A-9DF3-DA7661662131}"/>
               </a:ext>
             </a:extLst>
           </p:cNvPr>
@@ -5634,14 +5772,12 @@
         </p:nvSpPr>
         <p:spPr>
           <a:xfrm>
-            <a:off x="838200" y="257905"/>
+            <a:off x="838200" y="0"/>
             <a:ext cx="10515600" cy="1325563"/>
           </a:xfrm>
         </p:spPr>
         <p:txBody>
-          <a:bodyPr>
-            <a:normAutofit/>
-          </a:bodyPr>
+          <a:bodyPr/>
           <a:lstStyle/>
           <a:p>
             <a:pPr algn="ctr"/>
@@ -5650,17 +5786,17 @@
                 <a:latin typeface="Times New Roman" panose="02020603050405020304" pitchFamily="18" charset="0"/>
                 <a:cs typeface="Times New Roman" panose="02020603050405020304" pitchFamily="18" charset="0"/>
               </a:rPr>
-              <a:t>Исследование применимости моделей</a:t>
+              <a:t>Схема программного обеспечения</a:t>
             </a:r>
           </a:p>
         </p:txBody>
       </p:sp>
       <p:sp>
         <p:nvSpPr>
-          <p:cNvPr id="4" name="Номер слайда 3">
+          <p:cNvPr id="3" name="Номер слайда 2">
             <a:extLst>
               <a:ext uri="{FF2B5EF4-FFF2-40B4-BE49-F238E27FC236}">
-                <a16:creationId xmlns:a16="http://schemas.microsoft.com/office/drawing/2014/main" id="{06243C61-ACEF-4DB7-9CE8-8A27B9491D7C}"/>
+                <a16:creationId xmlns:a16="http://schemas.microsoft.com/office/drawing/2014/main" id="{18D02FDB-6FC5-443A-AD14-3C8B3AC22A63}"/>
               </a:ext>
             </a:extLst>
           </p:cNvPr>
@@ -5676,361 +5812,54 @@
           <a:bodyPr/>
           <a:lstStyle/>
           <a:p>
-            <a:fld id="{356812A1-C132-42AC-87BC-7262BD3AB593}" type="slidenum">
+            <a:fld id="{5AEE0CB1-1A0F-4E9F-8383-D0A68518B020}" type="slidenum">
               <a:rPr lang="ru-RU" smtClean="0"/>
               <a:t>10</a:t>
             </a:fld>
-            <a:endParaRPr lang="ru-RU" dirty="0"/>
+            <a:endParaRPr lang="ru-RU"/>
           </a:p>
         </p:txBody>
       </p:sp>
-      <p:sp>
-        <p:nvSpPr>
-          <p:cNvPr id="11" name="TextBox 10">
+      <p:pic>
+        <p:nvPicPr>
+          <p:cNvPr id="6" name="Picture 5">
             <a:extLst>
               <a:ext uri="{FF2B5EF4-FFF2-40B4-BE49-F238E27FC236}">
-                <a16:creationId xmlns:a16="http://schemas.microsoft.com/office/drawing/2014/main" id="{0B1BC467-2D0A-2849-A180-654D1EF52DCE}"/>
+                <a16:creationId xmlns:a16="http://schemas.microsoft.com/office/drawing/2014/main" id="{F951B97C-B6FC-1048-BADD-7FD650B8246C}"/>
               </a:ext>
             </a:extLst>
           </p:cNvPr>
-          <p:cNvSpPr txBox="1"/>
+          <p:cNvPicPr>
+            <a:picLocks noChangeAspect="1"/>
+          </p:cNvPicPr>
           <p:nvPr/>
-        </p:nvSpPr>
+        </p:nvPicPr>
+        <p:blipFill>
+          <a:blip r:embed="rId3">
+            <a:extLst>
+              <a:ext uri="{28A0092B-C50C-407E-A947-70E740481C1C}">
+                <a14:useLocalDpi xmlns:a14="http://schemas.microsoft.com/office/drawing/2010/main" val="0"/>
+              </a:ext>
+            </a:extLst>
+          </a:blip>
+          <a:stretch>
+            <a:fillRect/>
+          </a:stretch>
+        </p:blipFill>
         <p:spPr>
           <a:xfrm>
-            <a:off x="838200" y="1581537"/>
-            <a:ext cx="4799504" cy="2677656"/>
+            <a:off x="1489235" y="1005631"/>
+            <a:ext cx="9213530" cy="5811229"/>
           </a:xfrm>
           <a:prstGeom prst="rect">
             <a:avLst/>
           </a:prstGeom>
-          <a:noFill/>
         </p:spPr>
-        <p:txBody>
-          <a:bodyPr wrap="square">
-            <a:spAutoFit/>
-          </a:bodyPr>
-          <a:lstStyle/>
-          <a:p>
-            <a:r>
-              <a:rPr lang="ru-RU" sz="2400" dirty="0">
-                <a:latin typeface="Times New Roman" panose="02020603050405020304" pitchFamily="18" charset="0"/>
-                <a:cs typeface="Times New Roman" panose="02020603050405020304" pitchFamily="18" charset="0"/>
-              </a:rPr>
-              <a:t>Рассматриваемые алгоритмы:</a:t>
-            </a:r>
-          </a:p>
-          <a:p>
-            <a:pPr marL="285750" indent="-285750">
-              <a:buFont typeface="Arial" panose="020B0604020202020204" pitchFamily="34" charset="0"/>
-              <a:buChar char="•"/>
-            </a:pPr>
-            <a:r>
-              <a:rPr lang="ru-RU" sz="2400" dirty="0">
-                <a:latin typeface="Times New Roman" panose="02020603050405020304" pitchFamily="18" charset="0"/>
-                <a:cs typeface="Times New Roman" panose="02020603050405020304" pitchFamily="18" charset="0"/>
-              </a:rPr>
-              <a:t>Градиентный </a:t>
-            </a:r>
-            <a:r>
-              <a:rPr lang="ru-RU" sz="2400" dirty="0" err="1">
-                <a:latin typeface="Times New Roman" panose="02020603050405020304" pitchFamily="18" charset="0"/>
-                <a:cs typeface="Times New Roman" panose="02020603050405020304" pitchFamily="18" charset="0"/>
-              </a:rPr>
-              <a:t>бустинг</a:t>
-            </a:r>
-            <a:endParaRPr lang="ru-RU" sz="2400" dirty="0">
-              <a:latin typeface="Times New Roman" panose="02020603050405020304" pitchFamily="18" charset="0"/>
-              <a:cs typeface="Times New Roman" panose="02020603050405020304" pitchFamily="18" charset="0"/>
-            </a:endParaRPr>
-          </a:p>
-          <a:p>
-            <a:pPr marL="285750" indent="-285750">
-              <a:buFont typeface="Arial" panose="020B0604020202020204" pitchFamily="34" charset="0"/>
-              <a:buChar char="•"/>
-            </a:pPr>
-            <a:r>
-              <a:rPr lang="ru-RU" sz="2400" dirty="0">
-                <a:latin typeface="Times New Roman" panose="02020603050405020304" pitchFamily="18" charset="0"/>
-                <a:cs typeface="Times New Roman" panose="02020603050405020304" pitchFamily="18" charset="0"/>
-              </a:rPr>
-              <a:t>Случайный лес</a:t>
-            </a:r>
-          </a:p>
-          <a:p>
-            <a:pPr marL="285750" indent="-285750">
-              <a:buFont typeface="Arial" panose="020B0604020202020204" pitchFamily="34" charset="0"/>
-              <a:buChar char="•"/>
-            </a:pPr>
-            <a:r>
-              <a:rPr lang="ru-RU" sz="2400" dirty="0">
-                <a:latin typeface="Times New Roman" panose="02020603050405020304" pitchFamily="18" charset="0"/>
-                <a:cs typeface="Times New Roman" panose="02020603050405020304" pitchFamily="18" charset="0"/>
-              </a:rPr>
-              <a:t>Метод опорных векторов</a:t>
-            </a:r>
-          </a:p>
-          <a:p>
-            <a:pPr marL="285750" indent="-285750">
-              <a:buFont typeface="Arial" panose="020B0604020202020204" pitchFamily="34" charset="0"/>
-              <a:buChar char="•"/>
-            </a:pPr>
-            <a:r>
-              <a:rPr lang="ru-RU" sz="2400" dirty="0">
-                <a:latin typeface="Times New Roman" panose="02020603050405020304" pitchFamily="18" charset="0"/>
-                <a:cs typeface="Times New Roman" panose="02020603050405020304" pitchFamily="18" charset="0"/>
-              </a:rPr>
-              <a:t>К-ближайших соседей</a:t>
-            </a:r>
-          </a:p>
-          <a:p>
-            <a:pPr marL="285750" indent="-285750">
-              <a:buFont typeface="Arial" panose="020B0604020202020204" pitchFamily="34" charset="0"/>
-              <a:buChar char="•"/>
-            </a:pPr>
-            <a:r>
-              <a:rPr lang="ru-RU" sz="2400" dirty="0">
-                <a:latin typeface="Times New Roman" panose="02020603050405020304" pitchFamily="18" charset="0"/>
-                <a:cs typeface="Times New Roman" panose="02020603050405020304" pitchFamily="18" charset="0"/>
-              </a:rPr>
-              <a:t>Логистическая регрессия</a:t>
-            </a:r>
-          </a:p>
-          <a:p>
-            <a:pPr marL="285750" indent="-285750">
-              <a:buFont typeface="Arial" panose="020B0604020202020204" pitchFamily="34" charset="0"/>
-              <a:buChar char="•"/>
-            </a:pPr>
-            <a:r>
-              <a:rPr lang="ru-RU" sz="2400" dirty="0" err="1">
-                <a:latin typeface="Times New Roman" panose="02020603050405020304" pitchFamily="18" charset="0"/>
-                <a:cs typeface="Times New Roman" panose="02020603050405020304" pitchFamily="18" charset="0"/>
-              </a:rPr>
-              <a:t>Перцептрон</a:t>
-            </a:r>
-            <a:endParaRPr lang="en-RU" sz="2400" dirty="0">
-              <a:latin typeface="Times New Roman" panose="02020603050405020304" pitchFamily="18" charset="0"/>
-              <a:cs typeface="Times New Roman" panose="02020603050405020304" pitchFamily="18" charset="0"/>
-            </a:endParaRPr>
-          </a:p>
-        </p:txBody>
-      </p:sp>
-      <p:sp>
-        <p:nvSpPr>
-          <p:cNvPr id="15" name="TextBox 14">
-            <a:extLst>
-              <a:ext uri="{FF2B5EF4-FFF2-40B4-BE49-F238E27FC236}">
-                <a16:creationId xmlns:a16="http://schemas.microsoft.com/office/drawing/2014/main" id="{180837C2-92F3-C248-B734-138E38623658}"/>
-              </a:ext>
-            </a:extLst>
-          </p:cNvPr>
-          <p:cNvSpPr txBox="1"/>
-          <p:nvPr/>
-        </p:nvSpPr>
-        <p:spPr>
-          <a:xfrm>
-            <a:off x="7298205" y="1581537"/>
-            <a:ext cx="3905935" cy="1569660"/>
-          </a:xfrm>
-          <a:prstGeom prst="rect">
-            <a:avLst/>
-          </a:prstGeom>
-          <a:noFill/>
-        </p:spPr>
-        <p:txBody>
-          <a:bodyPr wrap="square">
-            <a:spAutoFit/>
-          </a:bodyPr>
-          <a:lstStyle/>
-          <a:p>
-            <a:r>
-              <a:rPr lang="ru-RU" sz="2400" dirty="0">
-                <a:latin typeface="Times New Roman" panose="02020603050405020304" pitchFamily="18" charset="0"/>
-                <a:cs typeface="Times New Roman" panose="02020603050405020304" pitchFamily="18" charset="0"/>
-              </a:rPr>
-              <a:t>Сравниваемые методы векторизации:</a:t>
-            </a:r>
-          </a:p>
-          <a:p>
-            <a:pPr marL="342900" indent="-342900">
-              <a:buFont typeface="Arial" panose="020B0604020202020204" pitchFamily="34" charset="0"/>
-              <a:buChar char="•"/>
-            </a:pPr>
-            <a:r>
-              <a:rPr lang="en-US" sz="2400" dirty="0">
-                <a:latin typeface="Times New Roman" panose="02020603050405020304" pitchFamily="18" charset="0"/>
-                <a:cs typeface="Times New Roman" panose="02020603050405020304" pitchFamily="18" charset="0"/>
-              </a:rPr>
-              <a:t>”</a:t>
-            </a:r>
-            <a:r>
-              <a:rPr lang="ru-RU" sz="2400" dirty="0">
-                <a:latin typeface="Times New Roman" panose="02020603050405020304" pitchFamily="18" charset="0"/>
-                <a:cs typeface="Times New Roman" panose="02020603050405020304" pitchFamily="18" charset="0"/>
-              </a:rPr>
-              <a:t>Мешок слов</a:t>
-            </a:r>
-            <a:r>
-              <a:rPr lang="en-US" sz="2400" dirty="0">
-                <a:latin typeface="Times New Roman" panose="02020603050405020304" pitchFamily="18" charset="0"/>
-                <a:cs typeface="Times New Roman" panose="02020603050405020304" pitchFamily="18" charset="0"/>
-              </a:rPr>
-              <a:t>”</a:t>
-            </a:r>
-            <a:endParaRPr lang="ru-RU" sz="2400" dirty="0">
-              <a:latin typeface="Times New Roman" panose="02020603050405020304" pitchFamily="18" charset="0"/>
-              <a:cs typeface="Times New Roman" panose="02020603050405020304" pitchFamily="18" charset="0"/>
-            </a:endParaRPr>
-          </a:p>
-          <a:p>
-            <a:pPr marL="342900" indent="-342900">
-              <a:buFont typeface="Arial" panose="020B0604020202020204" pitchFamily="34" charset="0"/>
-              <a:buChar char="•"/>
-            </a:pPr>
-            <a:r>
-              <a:rPr lang="en-US" sz="2400" dirty="0">
-                <a:latin typeface="Times New Roman" panose="02020603050405020304" pitchFamily="18" charset="0"/>
-                <a:cs typeface="Times New Roman" panose="02020603050405020304" pitchFamily="18" charset="0"/>
-              </a:rPr>
-              <a:t>BERT</a:t>
-            </a:r>
-            <a:endParaRPr lang="ru-RU" sz="2400" dirty="0">
-              <a:latin typeface="Times New Roman" panose="02020603050405020304" pitchFamily="18" charset="0"/>
-              <a:cs typeface="Times New Roman" panose="02020603050405020304" pitchFamily="18" charset="0"/>
-            </a:endParaRPr>
-          </a:p>
-        </p:txBody>
-      </p:sp>
-      <p:sp>
-        <p:nvSpPr>
-          <p:cNvPr id="16" name="TextBox 15">
-            <a:extLst>
-              <a:ext uri="{FF2B5EF4-FFF2-40B4-BE49-F238E27FC236}">
-                <a16:creationId xmlns:a16="http://schemas.microsoft.com/office/drawing/2014/main" id="{D251EA11-C00C-9B4E-A278-86A22E18AB50}"/>
-              </a:ext>
-            </a:extLst>
-          </p:cNvPr>
-          <p:cNvSpPr txBox="1"/>
-          <p:nvPr/>
-        </p:nvSpPr>
-        <p:spPr>
-          <a:xfrm>
-            <a:off x="7298204" y="3429000"/>
-            <a:ext cx="3905935" cy="1569660"/>
-          </a:xfrm>
-          <a:prstGeom prst="rect">
-            <a:avLst/>
-          </a:prstGeom>
-          <a:noFill/>
-        </p:spPr>
-        <p:txBody>
-          <a:bodyPr wrap="square">
-            <a:spAutoFit/>
-          </a:bodyPr>
-          <a:lstStyle/>
-          <a:p>
-            <a:r>
-              <a:rPr lang="ru-RU" sz="2400" dirty="0">
-                <a:latin typeface="Times New Roman" panose="02020603050405020304" pitchFamily="18" charset="0"/>
-                <a:cs typeface="Times New Roman" panose="02020603050405020304" pitchFamily="18" charset="0"/>
-              </a:rPr>
-              <a:t>Исследуемые метрики:</a:t>
-            </a:r>
-          </a:p>
-          <a:p>
-            <a:pPr marL="285750" indent="-285750">
-              <a:buFont typeface="Arial" panose="020B0604020202020204" pitchFamily="34" charset="0"/>
-              <a:buChar char="•"/>
-            </a:pPr>
-            <a:r>
-              <a:rPr lang="ru-RU" sz="2400" dirty="0">
-                <a:latin typeface="Times New Roman" panose="02020603050405020304" pitchFamily="18" charset="0"/>
-                <a:cs typeface="Times New Roman" panose="02020603050405020304" pitchFamily="18" charset="0"/>
-              </a:rPr>
-              <a:t>Точность</a:t>
-            </a:r>
-          </a:p>
-          <a:p>
-            <a:pPr marL="285750" indent="-285750">
-              <a:buFont typeface="Arial" panose="020B0604020202020204" pitchFamily="34" charset="0"/>
-              <a:buChar char="•"/>
-            </a:pPr>
-            <a:r>
-              <a:rPr lang="en-US" sz="2400" dirty="0">
-                <a:latin typeface="Times New Roman" panose="02020603050405020304" pitchFamily="18" charset="0"/>
-                <a:cs typeface="Times New Roman" panose="02020603050405020304" pitchFamily="18" charset="0"/>
-              </a:rPr>
-              <a:t>F1-</a:t>
-            </a:r>
-            <a:r>
-              <a:rPr lang="ru-RU" sz="2400" dirty="0">
-                <a:latin typeface="Times New Roman" panose="02020603050405020304" pitchFamily="18" charset="0"/>
-                <a:cs typeface="Times New Roman" panose="02020603050405020304" pitchFamily="18" charset="0"/>
-              </a:rPr>
-              <a:t>мера</a:t>
-            </a:r>
-          </a:p>
-          <a:p>
-            <a:pPr marL="285750" indent="-285750">
-              <a:buFont typeface="Arial" panose="020B0604020202020204" pitchFamily="34" charset="0"/>
-              <a:buChar char="•"/>
-            </a:pPr>
-            <a:r>
-              <a:rPr lang="en-US" sz="2400" dirty="0">
-                <a:latin typeface="Times New Roman" panose="02020603050405020304" pitchFamily="18" charset="0"/>
-                <a:cs typeface="Times New Roman" panose="02020603050405020304" pitchFamily="18" charset="0"/>
-              </a:rPr>
-              <a:t>ROC-AUC</a:t>
-            </a:r>
-          </a:p>
-        </p:txBody>
-      </p:sp>
-      <p:sp>
-        <p:nvSpPr>
-          <p:cNvPr id="20" name="TextBox 19">
-            <a:extLst>
-              <a:ext uri="{FF2B5EF4-FFF2-40B4-BE49-F238E27FC236}">
-                <a16:creationId xmlns:a16="http://schemas.microsoft.com/office/drawing/2014/main" id="{E6124A8D-0844-9F42-A336-B9283FF8E82D}"/>
-              </a:ext>
-            </a:extLst>
-          </p:cNvPr>
-          <p:cNvSpPr txBox="1"/>
-          <p:nvPr/>
-        </p:nvSpPr>
-        <p:spPr>
-          <a:xfrm>
-            <a:off x="838200" y="4417358"/>
-            <a:ext cx="6094902" cy="1938992"/>
-          </a:xfrm>
-          <a:prstGeom prst="rect">
-            <a:avLst/>
-          </a:prstGeom>
-          <a:noFill/>
-        </p:spPr>
-        <p:txBody>
-          <a:bodyPr wrap="square">
-            <a:spAutoFit/>
-          </a:bodyPr>
-          <a:lstStyle/>
-          <a:p>
-            <a:r>
-              <a:rPr lang="ru-RU" sz="2400" dirty="0">
-                <a:latin typeface="Times New Roman" panose="02020603050405020304" pitchFamily="18" charset="0"/>
-                <a:cs typeface="Times New Roman" panose="02020603050405020304" pitchFamily="18" charset="0"/>
-              </a:rPr>
-              <a:t>Разбиение данных на 4 части, 1 из которых используется в качестве тестовой. Для каждого разбиения строится матрица ошибок, для каждой модели приводится график значений исследуемых метрик.</a:t>
-            </a:r>
-            <a:endParaRPr lang="en-RU" sz="2400" dirty="0">
-              <a:latin typeface="Times New Roman" panose="02020603050405020304" pitchFamily="18" charset="0"/>
-              <a:cs typeface="Times New Roman" panose="02020603050405020304" pitchFamily="18" charset="0"/>
-            </a:endParaRPr>
-          </a:p>
-        </p:txBody>
-      </p:sp>
+      </p:pic>
     </p:spTree>
     <p:extLst>
       <p:ext uri="{BB962C8B-B14F-4D97-AF65-F5344CB8AC3E}">
-        <p14:creationId xmlns:p14="http://schemas.microsoft.com/office/powerpoint/2010/main" val="3699967751"/>
+        <p14:creationId xmlns:p14="http://schemas.microsoft.com/office/powerpoint/2010/main" val="3624538576"/>
       </p:ext>
     </p:extLst>
   </p:cSld>
@@ -6062,6 +5891,405 @@
           <p:cNvPr id="2" name="Заголовок 1">
             <a:extLst>
               <a:ext uri="{FF2B5EF4-FFF2-40B4-BE49-F238E27FC236}">
+                <a16:creationId xmlns:a16="http://schemas.microsoft.com/office/drawing/2014/main" id="{35BC007D-BFD1-4AFC-A4F4-D7A12CA851E7}"/>
+              </a:ext>
+            </a:extLst>
+          </p:cNvPr>
+          <p:cNvSpPr>
+            <a:spLocks noGrp="1"/>
+          </p:cNvSpPr>
+          <p:nvPr>
+            <p:ph type="title"/>
+          </p:nvPr>
+        </p:nvSpPr>
+        <p:spPr>
+          <a:xfrm>
+            <a:off x="838200" y="257905"/>
+            <a:ext cx="10515600" cy="1325563"/>
+          </a:xfrm>
+        </p:spPr>
+        <p:txBody>
+          <a:bodyPr>
+            <a:normAutofit/>
+          </a:bodyPr>
+          <a:lstStyle/>
+          <a:p>
+            <a:pPr algn="ctr"/>
+            <a:r>
+              <a:rPr lang="ru-RU" dirty="0">
+                <a:latin typeface="Times New Roman" panose="02020603050405020304" pitchFamily="18" charset="0"/>
+                <a:cs typeface="Times New Roman" panose="02020603050405020304" pitchFamily="18" charset="0"/>
+              </a:rPr>
+              <a:t>Исследование применимости моделей</a:t>
+            </a:r>
+          </a:p>
+        </p:txBody>
+      </p:sp>
+      <p:sp>
+        <p:nvSpPr>
+          <p:cNvPr id="4" name="Номер слайда 3">
+            <a:extLst>
+              <a:ext uri="{FF2B5EF4-FFF2-40B4-BE49-F238E27FC236}">
+                <a16:creationId xmlns:a16="http://schemas.microsoft.com/office/drawing/2014/main" id="{06243C61-ACEF-4DB7-9CE8-8A27B9491D7C}"/>
+              </a:ext>
+            </a:extLst>
+          </p:cNvPr>
+          <p:cNvSpPr>
+            <a:spLocks noGrp="1"/>
+          </p:cNvSpPr>
+          <p:nvPr>
+            <p:ph type="sldNum" sz="quarter" idx="12"/>
+          </p:nvPr>
+        </p:nvSpPr>
+        <p:spPr/>
+        <p:txBody>
+          <a:bodyPr/>
+          <a:lstStyle/>
+          <a:p>
+            <a:fld id="{356812A1-C132-42AC-87BC-7262BD3AB593}" type="slidenum">
+              <a:rPr lang="ru-RU" smtClean="0"/>
+              <a:t>11</a:t>
+            </a:fld>
+            <a:endParaRPr lang="ru-RU" dirty="0"/>
+          </a:p>
+        </p:txBody>
+      </p:sp>
+      <p:sp>
+        <p:nvSpPr>
+          <p:cNvPr id="11" name="TextBox 10">
+            <a:extLst>
+              <a:ext uri="{FF2B5EF4-FFF2-40B4-BE49-F238E27FC236}">
+                <a16:creationId xmlns:a16="http://schemas.microsoft.com/office/drawing/2014/main" id="{0B1BC467-2D0A-2849-A180-654D1EF52DCE}"/>
+              </a:ext>
+            </a:extLst>
+          </p:cNvPr>
+          <p:cNvSpPr txBox="1"/>
+          <p:nvPr/>
+        </p:nvSpPr>
+        <p:spPr>
+          <a:xfrm>
+            <a:off x="838200" y="2090172"/>
+            <a:ext cx="4799504" cy="2677656"/>
+          </a:xfrm>
+          <a:prstGeom prst="rect">
+            <a:avLst/>
+          </a:prstGeom>
+          <a:noFill/>
+        </p:spPr>
+        <p:txBody>
+          <a:bodyPr wrap="square">
+            <a:spAutoFit/>
+          </a:bodyPr>
+          <a:lstStyle/>
+          <a:p>
+            <a:r>
+              <a:rPr lang="ru-RU" sz="2400" dirty="0">
+                <a:latin typeface="Times New Roman" panose="02020603050405020304" pitchFamily="18" charset="0"/>
+                <a:cs typeface="Times New Roman" panose="02020603050405020304" pitchFamily="18" charset="0"/>
+              </a:rPr>
+              <a:t>Рассматриваемые алгоритмы:</a:t>
+            </a:r>
+          </a:p>
+          <a:p>
+            <a:pPr marL="285750" indent="-285750">
+              <a:buFont typeface="Arial" panose="020B0604020202020204" pitchFamily="34" charset="0"/>
+              <a:buChar char="•"/>
+            </a:pPr>
+            <a:r>
+              <a:rPr lang="ru-RU" sz="2400" dirty="0">
+                <a:latin typeface="Times New Roman" panose="02020603050405020304" pitchFamily="18" charset="0"/>
+                <a:cs typeface="Times New Roman" panose="02020603050405020304" pitchFamily="18" charset="0"/>
+              </a:rPr>
+              <a:t>градиентный </a:t>
+            </a:r>
+            <a:r>
+              <a:rPr lang="ru-RU" sz="2400" dirty="0" err="1">
+                <a:latin typeface="Times New Roman" panose="02020603050405020304" pitchFamily="18" charset="0"/>
+                <a:cs typeface="Times New Roman" panose="02020603050405020304" pitchFamily="18" charset="0"/>
+              </a:rPr>
+              <a:t>бустинг</a:t>
+            </a:r>
+            <a:endParaRPr lang="ru-RU" sz="2400" dirty="0">
+              <a:latin typeface="Times New Roman" panose="02020603050405020304" pitchFamily="18" charset="0"/>
+              <a:cs typeface="Times New Roman" panose="02020603050405020304" pitchFamily="18" charset="0"/>
+            </a:endParaRPr>
+          </a:p>
+          <a:p>
+            <a:pPr marL="285750" indent="-285750">
+              <a:buFont typeface="Arial" panose="020B0604020202020204" pitchFamily="34" charset="0"/>
+              <a:buChar char="•"/>
+            </a:pPr>
+            <a:r>
+              <a:rPr lang="ru-RU" sz="2400" dirty="0">
+                <a:latin typeface="Times New Roman" panose="02020603050405020304" pitchFamily="18" charset="0"/>
+                <a:cs typeface="Times New Roman" panose="02020603050405020304" pitchFamily="18" charset="0"/>
+              </a:rPr>
+              <a:t>случайный лес</a:t>
+            </a:r>
+          </a:p>
+          <a:p>
+            <a:pPr marL="285750" indent="-285750">
+              <a:buFont typeface="Arial" panose="020B0604020202020204" pitchFamily="34" charset="0"/>
+              <a:buChar char="•"/>
+            </a:pPr>
+            <a:r>
+              <a:rPr lang="ru-RU" sz="2400" dirty="0">
+                <a:latin typeface="Times New Roman" panose="02020603050405020304" pitchFamily="18" charset="0"/>
+                <a:cs typeface="Times New Roman" panose="02020603050405020304" pitchFamily="18" charset="0"/>
+              </a:rPr>
+              <a:t>метод опорных векторов</a:t>
+            </a:r>
+          </a:p>
+          <a:p>
+            <a:pPr marL="285750" indent="-285750">
+              <a:buFont typeface="Arial" panose="020B0604020202020204" pitchFamily="34" charset="0"/>
+              <a:buChar char="•"/>
+            </a:pPr>
+            <a:r>
+              <a:rPr lang="ru-RU" sz="2400" dirty="0">
+                <a:latin typeface="Times New Roman" panose="02020603050405020304" pitchFamily="18" charset="0"/>
+                <a:cs typeface="Times New Roman" panose="02020603050405020304" pitchFamily="18" charset="0"/>
+              </a:rPr>
+              <a:t>к-ближайших соседей</a:t>
+            </a:r>
+          </a:p>
+          <a:p>
+            <a:pPr marL="285750" indent="-285750">
+              <a:buFont typeface="Arial" panose="020B0604020202020204" pitchFamily="34" charset="0"/>
+              <a:buChar char="•"/>
+            </a:pPr>
+            <a:r>
+              <a:rPr lang="ru-RU" sz="2400" dirty="0">
+                <a:latin typeface="Times New Roman" panose="02020603050405020304" pitchFamily="18" charset="0"/>
+                <a:cs typeface="Times New Roman" panose="02020603050405020304" pitchFamily="18" charset="0"/>
+              </a:rPr>
+              <a:t>логистическая регрессия</a:t>
+            </a:r>
+          </a:p>
+          <a:p>
+            <a:pPr marL="285750" indent="-285750">
+              <a:buFont typeface="Arial" panose="020B0604020202020204" pitchFamily="34" charset="0"/>
+              <a:buChar char="•"/>
+            </a:pPr>
+            <a:r>
+              <a:rPr lang="ru-RU" sz="2400" dirty="0" err="1">
+                <a:latin typeface="Times New Roman" panose="02020603050405020304" pitchFamily="18" charset="0"/>
+                <a:cs typeface="Times New Roman" panose="02020603050405020304" pitchFamily="18" charset="0"/>
+              </a:rPr>
+              <a:t>перцептрон</a:t>
+            </a:r>
+            <a:endParaRPr lang="en-RU" sz="2400" dirty="0">
+              <a:latin typeface="Times New Roman" panose="02020603050405020304" pitchFamily="18" charset="0"/>
+              <a:cs typeface="Times New Roman" panose="02020603050405020304" pitchFamily="18" charset="0"/>
+            </a:endParaRPr>
+          </a:p>
+        </p:txBody>
+      </p:sp>
+      <p:sp>
+        <p:nvSpPr>
+          <p:cNvPr id="15" name="TextBox 14">
+            <a:extLst>
+              <a:ext uri="{FF2B5EF4-FFF2-40B4-BE49-F238E27FC236}">
+                <a16:creationId xmlns:a16="http://schemas.microsoft.com/office/drawing/2014/main" id="{180837C2-92F3-C248-B734-138E38623658}"/>
+              </a:ext>
+            </a:extLst>
+          </p:cNvPr>
+          <p:cNvSpPr txBox="1"/>
+          <p:nvPr/>
+        </p:nvSpPr>
+        <p:spPr>
+          <a:xfrm>
+            <a:off x="6975070" y="1583468"/>
+            <a:ext cx="5420893" cy="1200329"/>
+          </a:xfrm>
+          <a:prstGeom prst="rect">
+            <a:avLst/>
+          </a:prstGeom>
+          <a:noFill/>
+        </p:spPr>
+        <p:txBody>
+          <a:bodyPr wrap="square">
+            <a:spAutoFit/>
+          </a:bodyPr>
+          <a:lstStyle/>
+          <a:p>
+            <a:r>
+              <a:rPr lang="ru-RU" sz="2400" dirty="0">
+                <a:latin typeface="Times New Roman" panose="02020603050405020304" pitchFamily="18" charset="0"/>
+                <a:cs typeface="Times New Roman" panose="02020603050405020304" pitchFamily="18" charset="0"/>
+              </a:rPr>
+              <a:t>Сравниваемые методы векторизации:</a:t>
+            </a:r>
+          </a:p>
+          <a:p>
+            <a:pPr marL="342900" indent="-342900">
+              <a:buFont typeface="Arial" panose="020B0604020202020204" pitchFamily="34" charset="0"/>
+              <a:buChar char="•"/>
+            </a:pPr>
+            <a:r>
+              <a:rPr lang="en-US" sz="2400" dirty="0">
+                <a:latin typeface="Times New Roman" panose="02020603050405020304" pitchFamily="18" charset="0"/>
+                <a:cs typeface="Times New Roman" panose="02020603050405020304" pitchFamily="18" charset="0"/>
+              </a:rPr>
+              <a:t>”</a:t>
+            </a:r>
+            <a:r>
+              <a:rPr lang="ru-RU" sz="2400" dirty="0">
+                <a:latin typeface="Times New Roman" panose="02020603050405020304" pitchFamily="18" charset="0"/>
+                <a:cs typeface="Times New Roman" panose="02020603050405020304" pitchFamily="18" charset="0"/>
+              </a:rPr>
+              <a:t>Мешок слов</a:t>
+            </a:r>
+            <a:r>
+              <a:rPr lang="en-US" sz="2400" dirty="0">
+                <a:latin typeface="Times New Roman" panose="02020603050405020304" pitchFamily="18" charset="0"/>
+                <a:cs typeface="Times New Roman" panose="02020603050405020304" pitchFamily="18" charset="0"/>
+              </a:rPr>
+              <a:t>”</a:t>
+            </a:r>
+            <a:endParaRPr lang="ru-RU" sz="2400" dirty="0">
+              <a:latin typeface="Times New Roman" panose="02020603050405020304" pitchFamily="18" charset="0"/>
+              <a:cs typeface="Times New Roman" panose="02020603050405020304" pitchFamily="18" charset="0"/>
+            </a:endParaRPr>
+          </a:p>
+          <a:p>
+            <a:pPr marL="342900" indent="-342900">
+              <a:buFont typeface="Arial" panose="020B0604020202020204" pitchFamily="34" charset="0"/>
+              <a:buChar char="•"/>
+            </a:pPr>
+            <a:r>
+              <a:rPr lang="en-US" sz="2400" dirty="0">
+                <a:latin typeface="Times New Roman" panose="02020603050405020304" pitchFamily="18" charset="0"/>
+                <a:cs typeface="Times New Roman" panose="02020603050405020304" pitchFamily="18" charset="0"/>
+              </a:rPr>
+              <a:t>BERT</a:t>
+            </a:r>
+            <a:endParaRPr lang="ru-RU" sz="2400" dirty="0">
+              <a:latin typeface="Times New Roman" panose="02020603050405020304" pitchFamily="18" charset="0"/>
+              <a:cs typeface="Times New Roman" panose="02020603050405020304" pitchFamily="18" charset="0"/>
+            </a:endParaRPr>
+          </a:p>
+        </p:txBody>
+      </p:sp>
+      <p:sp>
+        <p:nvSpPr>
+          <p:cNvPr id="16" name="TextBox 15">
+            <a:extLst>
+              <a:ext uri="{FF2B5EF4-FFF2-40B4-BE49-F238E27FC236}">
+                <a16:creationId xmlns:a16="http://schemas.microsoft.com/office/drawing/2014/main" id="{D251EA11-C00C-9B4E-A278-86A22E18AB50}"/>
+              </a:ext>
+            </a:extLst>
+          </p:cNvPr>
+          <p:cNvSpPr txBox="1"/>
+          <p:nvPr/>
+        </p:nvSpPr>
+        <p:spPr>
+          <a:xfrm>
+            <a:off x="6975070" y="3429000"/>
+            <a:ext cx="3905935" cy="1569660"/>
+          </a:xfrm>
+          <a:prstGeom prst="rect">
+            <a:avLst/>
+          </a:prstGeom>
+          <a:noFill/>
+        </p:spPr>
+        <p:txBody>
+          <a:bodyPr wrap="square">
+            <a:spAutoFit/>
+          </a:bodyPr>
+          <a:lstStyle/>
+          <a:p>
+            <a:r>
+              <a:rPr lang="ru-RU" sz="2400" dirty="0">
+                <a:latin typeface="Times New Roman" panose="02020603050405020304" pitchFamily="18" charset="0"/>
+                <a:cs typeface="Times New Roman" panose="02020603050405020304" pitchFamily="18" charset="0"/>
+              </a:rPr>
+              <a:t>Исследуемые метрики:</a:t>
+            </a:r>
+          </a:p>
+          <a:p>
+            <a:pPr marL="285750" indent="-285750">
+              <a:buFont typeface="Arial" panose="020B0604020202020204" pitchFamily="34" charset="0"/>
+              <a:buChar char="•"/>
+            </a:pPr>
+            <a:r>
+              <a:rPr lang="ru-RU" sz="2400" dirty="0">
+                <a:latin typeface="Times New Roman" panose="02020603050405020304" pitchFamily="18" charset="0"/>
+                <a:cs typeface="Times New Roman" panose="02020603050405020304" pitchFamily="18" charset="0"/>
+              </a:rPr>
+              <a:t>точность</a:t>
+            </a:r>
+          </a:p>
+          <a:p>
+            <a:pPr marL="285750" indent="-285750">
+              <a:buFont typeface="Arial" panose="020B0604020202020204" pitchFamily="34" charset="0"/>
+              <a:buChar char="•"/>
+            </a:pPr>
+            <a:r>
+              <a:rPr lang="en-US" sz="2400" dirty="0">
+                <a:latin typeface="Times New Roman" panose="02020603050405020304" pitchFamily="18" charset="0"/>
+                <a:cs typeface="Times New Roman" panose="02020603050405020304" pitchFamily="18" charset="0"/>
+              </a:rPr>
+              <a:t>F1-</a:t>
+            </a:r>
+            <a:r>
+              <a:rPr lang="ru-RU" sz="2400" dirty="0">
+                <a:latin typeface="Times New Roman" panose="02020603050405020304" pitchFamily="18" charset="0"/>
+                <a:cs typeface="Times New Roman" panose="02020603050405020304" pitchFamily="18" charset="0"/>
+              </a:rPr>
+              <a:t>мера</a:t>
+            </a:r>
+          </a:p>
+          <a:p>
+            <a:pPr marL="285750" indent="-285750">
+              <a:buFont typeface="Arial" panose="020B0604020202020204" pitchFamily="34" charset="0"/>
+              <a:buChar char="•"/>
+            </a:pPr>
+            <a:r>
+              <a:rPr lang="en-US" sz="2400" dirty="0">
+                <a:latin typeface="Times New Roman" panose="02020603050405020304" pitchFamily="18" charset="0"/>
+                <a:cs typeface="Times New Roman" panose="02020603050405020304" pitchFamily="18" charset="0"/>
+              </a:rPr>
+              <a:t>ROC-AUC</a:t>
+            </a:r>
+          </a:p>
+        </p:txBody>
+      </p:sp>
+    </p:spTree>
+    <p:extLst>
+      <p:ext uri="{BB962C8B-B14F-4D97-AF65-F5344CB8AC3E}">
+        <p14:creationId xmlns:p14="http://schemas.microsoft.com/office/powerpoint/2010/main" val="3699967751"/>
+      </p:ext>
+    </p:extLst>
+  </p:cSld>
+  <p:clrMapOvr>
+    <a:masterClrMapping/>
+  </p:clrMapOvr>
+</p:sld>
+</file>
+
+<file path=ppt/slides/slide12.xml><?xml version="1.0" encoding="utf-8"?>
+<p:sld xmlns:a="http://schemas.openxmlformats.org/drawingml/2006/main" xmlns:r="http://schemas.openxmlformats.org/officeDocument/2006/relationships" xmlns:p="http://schemas.openxmlformats.org/presentationml/2006/main">
+  <p:cSld>
+    <p:spTree>
+      <p:nvGrpSpPr>
+        <p:cNvPr id="1" name=""/>
+        <p:cNvGrpSpPr/>
+        <p:nvPr/>
+      </p:nvGrpSpPr>
+      <p:grpSpPr>
+        <a:xfrm>
+          <a:off x="0" y="0"/>
+          <a:ext cx="0" cy="0"/>
+          <a:chOff x="0" y="0"/>
+          <a:chExt cx="0" cy="0"/>
+        </a:xfrm>
+      </p:grpSpPr>
+      <p:sp>
+        <p:nvSpPr>
+          <p:cNvPr id="2" name="Заголовок 1">
+            <a:extLst>
+              <a:ext uri="{FF2B5EF4-FFF2-40B4-BE49-F238E27FC236}">
                 <a16:creationId xmlns:a16="http://schemas.microsoft.com/office/drawing/2014/main" id="{A8A78197-F0E5-482A-9DF3-DA7661662131}"/>
               </a:ext>
             </a:extLst>
@@ -6119,7 +6347,7 @@
           <a:p>
             <a:fld id="{5AEE0CB1-1A0F-4E9F-8383-D0A68518B020}" type="slidenum">
               <a:rPr lang="ru-RU" smtClean="0"/>
-              <a:t>11</a:t>
+              <a:t>12</a:t>
             </a:fld>
             <a:endParaRPr lang="ru-RU"/>
           </a:p>
@@ -6140,14 +6368,14 @@
           <p:nvPr>
             <p:extLst>
               <p:ext uri="{D42A27DB-BD31-4B8C-83A1-F6EECF244321}">
-                <p14:modId xmlns:p14="http://schemas.microsoft.com/office/powerpoint/2010/main" val="899629017"/>
+                <p14:modId xmlns:p14="http://schemas.microsoft.com/office/powerpoint/2010/main" val="2113554656"/>
               </p:ext>
             </p:extLst>
           </p:nvPr>
         </p:nvGraphicFramePr>
         <p:xfrm>
-          <a:off x="2031999" y="1006498"/>
-          <a:ext cx="8269800" cy="5750154"/>
+          <a:off x="1732309" y="1006493"/>
+          <a:ext cx="8727381" cy="5714982"/>
         </p:xfrm>
         <a:graphic>
           <a:graphicData uri="http://schemas.openxmlformats.org/drawingml/2006/table">
@@ -6163,7 +6391,7 @@
                 <a:tableStyleId>{5940675A-B579-460E-94D1-54222C63F5DA}</a:tableStyleId>
               </a:tblPr>
               <a:tblGrid>
-                <a:gridCol w="1653960">
+                <a:gridCol w="2111541">
                   <a:extLst>
                     <a:ext uri="{9D8B030D-6E8A-4147-A177-3AD203B41FA5}">
                       <a16:colId xmlns:a16="http://schemas.microsoft.com/office/drawing/2014/main" val="1365924639"/>
@@ -7065,9 +7293,7 @@
                       <a:headEnd type="none" w="med" len="med"/>
                       <a:tailEnd type="none" w="med" len="med"/>
                     </a:lnB>
-                    <a:solidFill>
-                      <a:srgbClr val="92D050"/>
-                    </a:solidFill>
+                    <a:noFill/>
                   </a:tcPr>
                 </a:tc>
                 <a:tc>
@@ -7077,6 +7303,9 @@
                     <a:p>
                       <a:r>
                         <a:rPr lang="en-RU" dirty="0">
+                          <a:highlight>
+                            <a:srgbClr val="FFFF00"/>
+                          </a:highlight>
                           <a:latin typeface="Times New Roman" panose="02020603050405020304" pitchFamily="18" charset="0"/>
                           <a:cs typeface="Times New Roman" panose="02020603050405020304" pitchFamily="18" charset="0"/>
                         </a:rPr>
@@ -7084,6 +7313,9 @@
                       </a:r>
                       <a:r>
                         <a:rPr lang="ru-RU" dirty="0">
+                          <a:highlight>
+                            <a:srgbClr val="FFFF00"/>
+                          </a:highlight>
                           <a:latin typeface="Times New Roman" panose="02020603050405020304" pitchFamily="18" charset="0"/>
                           <a:cs typeface="Times New Roman" panose="02020603050405020304" pitchFamily="18" charset="0"/>
                         </a:rPr>
@@ -7091,6 +7323,9 @@
                       </a:r>
                       <a:r>
                         <a:rPr lang="en-RU" dirty="0">
+                          <a:highlight>
+                            <a:srgbClr val="FFFF00"/>
+                          </a:highlight>
                           <a:latin typeface="Times New Roman" panose="02020603050405020304" pitchFamily="18" charset="0"/>
                           <a:cs typeface="Times New Roman" panose="02020603050405020304" pitchFamily="18" charset="0"/>
                         </a:rPr>
@@ -7117,6 +7352,9 @@
                       <a:headEnd type="none" w="med" len="med"/>
                       <a:tailEnd type="none" w="med" len="med"/>
                     </a:lnB>
+                    <a:solidFill>
+                      <a:srgbClr val="FFFF00"/>
+                    </a:solidFill>
                   </a:tcPr>
                 </a:tc>
                 <a:tc>
@@ -7147,6 +7385,9 @@
                             <a:schemeClr val="tx1"/>
                           </a:solidFill>
                           <a:effectLst/>
+                          <a:highlight>
+                            <a:srgbClr val="FFFF00"/>
+                          </a:highlight>
                           <a:latin typeface="Times New Roman" panose="02020603050405020304" pitchFamily="18" charset="0"/>
                           <a:ea typeface="+mn-ea"/>
                           <a:cs typeface="Times New Roman" panose="02020603050405020304" pitchFamily="18" charset="0"/>
@@ -7159,6 +7400,9 @@
                             <a:schemeClr val="tx1"/>
                           </a:solidFill>
                           <a:effectLst/>
+                          <a:highlight>
+                            <a:srgbClr val="FFFF00"/>
+                          </a:highlight>
                           <a:latin typeface="Times New Roman" panose="02020603050405020304" pitchFamily="18" charset="0"/>
                           <a:ea typeface="+mn-ea"/>
                           <a:cs typeface="Times New Roman" panose="02020603050405020304" pitchFamily="18" charset="0"/>
@@ -7166,6 +7410,9 @@
                         <a:t>85</a:t>
                       </a:r>
                       <a:endParaRPr lang="en-RU" dirty="0">
+                        <a:highlight>
+                          <a:srgbClr val="FFFF00"/>
+                        </a:highlight>
                         <a:latin typeface="Times New Roman" panose="02020603050405020304" pitchFamily="18" charset="0"/>
                         <a:cs typeface="Times New Roman" panose="02020603050405020304" pitchFamily="18" charset="0"/>
                       </a:endParaRPr>
@@ -7190,6 +7437,9 @@
                       <a:headEnd type="none" w="med" len="med"/>
                       <a:tailEnd type="none" w="med" len="med"/>
                     </a:lnB>
+                    <a:solidFill>
+                      <a:srgbClr val="FFFF00"/>
+                    </a:solidFill>
                   </a:tcPr>
                 </a:tc>
                 <a:tc>
@@ -7220,6 +7470,9 @@
                             <a:schemeClr val="tx1"/>
                           </a:solidFill>
                           <a:effectLst/>
+                          <a:highlight>
+                            <a:srgbClr val="FFFF00"/>
+                          </a:highlight>
                           <a:latin typeface="Times New Roman" panose="02020603050405020304" pitchFamily="18" charset="0"/>
                           <a:ea typeface="+mn-ea"/>
                           <a:cs typeface="Times New Roman" panose="02020603050405020304" pitchFamily="18" charset="0"/>
@@ -7232,6 +7485,9 @@
                             <a:schemeClr val="tx1"/>
                           </a:solidFill>
                           <a:effectLst/>
+                          <a:highlight>
+                            <a:srgbClr val="FFFF00"/>
+                          </a:highlight>
                           <a:latin typeface="Times New Roman" panose="02020603050405020304" pitchFamily="18" charset="0"/>
                           <a:ea typeface="+mn-ea"/>
                           <a:cs typeface="Times New Roman" panose="02020603050405020304" pitchFamily="18" charset="0"/>
@@ -7239,6 +7495,9 @@
                         <a:t>3</a:t>
                       </a:r>
                       <a:endParaRPr lang="en-RU" dirty="0">
+                        <a:highlight>
+                          <a:srgbClr val="FFFF00"/>
+                        </a:highlight>
                         <a:latin typeface="Times New Roman" panose="02020603050405020304" pitchFamily="18" charset="0"/>
                         <a:cs typeface="Times New Roman" panose="02020603050405020304" pitchFamily="18" charset="0"/>
                       </a:endParaRPr>
@@ -7263,6 +7522,9 @@
                       <a:headEnd type="none" w="med" len="med"/>
                       <a:tailEnd type="none" w="med" len="med"/>
                     </a:lnB>
+                    <a:solidFill>
+                      <a:srgbClr val="FFFF00"/>
+                    </a:solidFill>
                   </a:tcPr>
                 </a:tc>
                 <a:tc>
@@ -7293,6 +7555,9 @@
                             <a:schemeClr val="tx1"/>
                           </a:solidFill>
                           <a:effectLst/>
+                          <a:highlight>
+                            <a:srgbClr val="FFFF00"/>
+                          </a:highlight>
                           <a:latin typeface="Times New Roman" panose="02020603050405020304" pitchFamily="18" charset="0"/>
                           <a:ea typeface="+mn-ea"/>
                           <a:cs typeface="Times New Roman" panose="02020603050405020304" pitchFamily="18" charset="0"/>
@@ -7300,6 +7565,9 @@
                         <a:t>0.947</a:t>
                       </a:r>
                       <a:endParaRPr lang="en-RU" dirty="0">
+                        <a:highlight>
+                          <a:srgbClr val="FFFF00"/>
+                        </a:highlight>
                         <a:latin typeface="Times New Roman" panose="02020603050405020304" pitchFamily="18" charset="0"/>
                         <a:cs typeface="Times New Roman" panose="02020603050405020304" pitchFamily="18" charset="0"/>
                       </a:endParaRPr>
@@ -7333,6 +7601,9 @@
                       <a:headEnd type="none" w="med" len="med"/>
                       <a:tailEnd type="none" w="med" len="med"/>
                     </a:lnB>
+                    <a:solidFill>
+                      <a:srgbClr val="FFFF00"/>
+                    </a:solidFill>
                   </a:tcPr>
                 </a:tc>
                 <a:extLst>
@@ -8767,9 +9038,7 @@
                       <a:headEnd type="none" w="med" len="med"/>
                       <a:tailEnd type="none" w="med" len="med"/>
                     </a:lnB>
-                    <a:solidFill>
-                      <a:srgbClr val="FFFF00"/>
-                    </a:solidFill>
+                    <a:noFill/>
                   </a:tcPr>
                 </a:tc>
                 <a:tc>
@@ -9068,7 +9337,7 @@
                       <a:tailEnd type="none" w="med" len="med"/>
                     </a:lnB>
                     <a:solidFill>
-                      <a:srgbClr val="FFFF00"/>
+                      <a:srgbClr val="FFC000"/>
                     </a:solidFill>
                   </a:tcPr>
                 </a:tc>
@@ -9132,7 +9401,7 @@
                       <a:tailEnd type="none" w="med" len="med"/>
                     </a:lnB>
                     <a:solidFill>
-                      <a:srgbClr val="FFFF00"/>
+                      <a:srgbClr val="FFC000"/>
                     </a:solidFill>
                   </a:tcPr>
                 </a:tc>
@@ -9196,7 +9465,7 @@
                       <a:tailEnd type="none" w="med" len="med"/>
                     </a:lnB>
                     <a:solidFill>
-                      <a:srgbClr val="FFFF00"/>
+                      <a:srgbClr val="FFC000"/>
                     </a:solidFill>
                   </a:tcPr>
                 </a:tc>
@@ -9269,7 +9538,7 @@
                       <a:tailEnd type="none" w="med" len="med"/>
                     </a:lnB>
                     <a:solidFill>
-                      <a:srgbClr val="FFFF00"/>
+                      <a:srgbClr val="FFC000"/>
                     </a:solidFill>
                   </a:tcPr>
                 </a:tc>
@@ -9827,6 +10096,123 @@
           </a:graphicData>
         </a:graphic>
       </p:graphicFrame>
+      <p:sp>
+        <p:nvSpPr>
+          <p:cNvPr id="6" name="TextBox 5">
+            <a:extLst>
+              <a:ext uri="{FF2B5EF4-FFF2-40B4-BE49-F238E27FC236}">
+                <a16:creationId xmlns:a16="http://schemas.microsoft.com/office/drawing/2014/main" id="{83D87DE8-D667-1A43-A50F-5016952C485C}"/>
+              </a:ext>
+            </a:extLst>
+          </p:cNvPr>
+          <p:cNvSpPr txBox="1"/>
+          <p:nvPr/>
+        </p:nvSpPr>
+        <p:spPr>
+          <a:xfrm>
+            <a:off x="10459691" y="2332056"/>
+            <a:ext cx="464984" cy="369332"/>
+          </a:xfrm>
+          <a:prstGeom prst="rect">
+            <a:avLst/>
+          </a:prstGeom>
+          <a:noFill/>
+        </p:spPr>
+        <p:txBody>
+          <a:bodyPr wrap="square">
+            <a:spAutoFit/>
+          </a:bodyPr>
+          <a:lstStyle/>
+          <a:p>
+            <a:r>
+              <a:rPr lang="ru-RU" i="1" dirty="0">
+                <a:latin typeface="Times New Roman" panose="02020603050405020304" pitchFamily="18" charset="0"/>
+                <a:cs typeface="Times New Roman" panose="02020603050405020304" pitchFamily="18" charset="0"/>
+              </a:rPr>
+              <a:t>(2)</a:t>
+            </a:r>
+            <a:endParaRPr lang="en-RU" dirty="0"/>
+          </a:p>
+        </p:txBody>
+      </p:sp>
+      <p:sp>
+        <p:nvSpPr>
+          <p:cNvPr id="8" name="TextBox 7">
+            <a:extLst>
+              <a:ext uri="{FF2B5EF4-FFF2-40B4-BE49-F238E27FC236}">
+                <a16:creationId xmlns:a16="http://schemas.microsoft.com/office/drawing/2014/main" id="{0B0053C1-30A9-1147-82CE-1D3CE3995E86}"/>
+              </a:ext>
+            </a:extLst>
+          </p:cNvPr>
+          <p:cNvSpPr txBox="1"/>
+          <p:nvPr/>
+        </p:nvSpPr>
+        <p:spPr>
+          <a:xfrm>
+            <a:off x="10459690" y="2782116"/>
+            <a:ext cx="6094854" cy="369332"/>
+          </a:xfrm>
+          <a:prstGeom prst="rect">
+            <a:avLst/>
+          </a:prstGeom>
+          <a:noFill/>
+        </p:spPr>
+        <p:txBody>
+          <a:bodyPr wrap="square">
+            <a:spAutoFit/>
+          </a:bodyPr>
+          <a:lstStyle/>
+          <a:p>
+            <a:r>
+              <a:rPr lang="ru-RU" i="1" dirty="0">
+                <a:latin typeface="Times New Roman" panose="02020603050405020304" pitchFamily="18" charset="0"/>
+                <a:cs typeface="Times New Roman" panose="02020603050405020304" pitchFamily="18" charset="0"/>
+              </a:rPr>
+              <a:t>(1)</a:t>
+            </a:r>
+            <a:endParaRPr lang="en-RU" dirty="0"/>
+          </a:p>
+        </p:txBody>
+      </p:sp>
+      <p:sp>
+        <p:nvSpPr>
+          <p:cNvPr id="10" name="TextBox 9">
+            <a:extLst>
+              <a:ext uri="{FF2B5EF4-FFF2-40B4-BE49-F238E27FC236}">
+                <a16:creationId xmlns:a16="http://schemas.microsoft.com/office/drawing/2014/main" id="{7C4AD307-3033-204D-A0F7-9CBB60785BF5}"/>
+              </a:ext>
+            </a:extLst>
+          </p:cNvPr>
+          <p:cNvSpPr txBox="1"/>
+          <p:nvPr/>
+        </p:nvSpPr>
+        <p:spPr>
+          <a:xfrm>
+            <a:off x="10459690" y="5413423"/>
+            <a:ext cx="8277726" cy="369332"/>
+          </a:xfrm>
+          <a:prstGeom prst="rect">
+            <a:avLst/>
+          </a:prstGeom>
+          <a:noFill/>
+        </p:spPr>
+        <p:txBody>
+          <a:bodyPr wrap="square">
+            <a:spAutoFit/>
+          </a:bodyPr>
+          <a:lstStyle/>
+          <a:p>
+            <a:r>
+              <a:rPr lang="ru-RU" i="1" dirty="0">
+                <a:latin typeface="Times New Roman" panose="02020603050405020304" pitchFamily="18" charset="0"/>
+                <a:cs typeface="Times New Roman" panose="02020603050405020304" pitchFamily="18" charset="0"/>
+              </a:rPr>
+              <a:t>(3)</a:t>
+            </a:r>
+            <a:endParaRPr lang="en-RU" dirty="0"/>
+          </a:p>
+        </p:txBody>
+      </p:sp>
     </p:spTree>
     <p:extLst>
       <p:ext uri="{BB962C8B-B14F-4D97-AF65-F5344CB8AC3E}">
@@ -9840,7 +10226,7 @@
 </p:sld>
 </file>
 
-<file path=ppt/slides/slide12.xml><?xml version="1.0" encoding="utf-8"?>
+<file path=ppt/slides/slide13.xml><?xml version="1.0" encoding="utf-8"?>
 <p:sld xmlns:a="http://schemas.openxmlformats.org/drawingml/2006/main" xmlns:r="http://schemas.openxmlformats.org/officeDocument/2006/relationships" xmlns:p="http://schemas.openxmlformats.org/presentationml/2006/main">
   <p:cSld>
     <p:spTree>
@@ -9875,7 +10261,7 @@
         </p:nvSpPr>
         <p:spPr>
           <a:xfrm>
-            <a:off x="838200" y="0"/>
+            <a:off x="838200" y="-48127"/>
             <a:ext cx="10515600" cy="1325563"/>
           </a:xfrm>
         </p:spPr>
@@ -9930,7 +10316,7 @@
           <a:p>
             <a:fld id="{5AEE0CB1-1A0F-4E9F-8383-D0A68518B020}" type="slidenum">
               <a:rPr lang="ru-RU" smtClean="0"/>
-              <a:t>12</a:t>
+              <a:t>13</a:t>
             </a:fld>
             <a:endParaRPr lang="ru-RU"/>
           </a:p>
@@ -10121,7 +10507,7 @@
 </p:sld>
 </file>
 
-<file path=ppt/slides/slide13.xml><?xml version="1.0" encoding="utf-8"?>
+<file path=ppt/slides/slide14.xml><?xml version="1.0" encoding="utf-8"?>
 <p:sld xmlns:a="http://schemas.openxmlformats.org/drawingml/2006/main" xmlns:r="http://schemas.openxmlformats.org/officeDocument/2006/relationships" xmlns:p="http://schemas.openxmlformats.org/presentationml/2006/main">
   <p:cSld>
     <p:spTree>
@@ -10286,7 +10672,7 @@
           <a:p>
             <a:fld id="{5AEE0CB1-1A0F-4E9F-8383-D0A68518B020}" type="slidenum">
               <a:rPr lang="ru-RU" smtClean="0"/>
-              <a:t>13</a:t>
+              <a:t>14</a:t>
             </a:fld>
             <a:endParaRPr lang="ru-RU"/>
           </a:p>
@@ -10405,7 +10791,7 @@
 </p:sld>
 </file>
 
-<file path=ppt/slides/slide14.xml><?xml version="1.0" encoding="utf-8"?>
+<file path=ppt/slides/slide15.xml><?xml version="1.0" encoding="utf-8"?>
 <p:sld xmlns:a="http://schemas.openxmlformats.org/drawingml/2006/main" xmlns:r="http://schemas.openxmlformats.org/officeDocument/2006/relationships" xmlns:p="http://schemas.openxmlformats.org/presentationml/2006/main">
   <p:cSld>
     <p:spTree>
@@ -10531,7 +10917,7 @@
           <a:p>
             <a:fld id="{5AEE0CB1-1A0F-4E9F-8383-D0A68518B020}" type="slidenum">
               <a:rPr lang="ru-RU" smtClean="0"/>
-              <a:t>14</a:t>
+              <a:t>15</a:t>
             </a:fld>
             <a:endParaRPr lang="ru-RU"/>
           </a:p>
@@ -10686,305 +11072,6 @@
 </p:sld>
 </file>
 
-<file path=ppt/slides/slide15.xml><?xml version="1.0" encoding="utf-8"?>
-<p:sld xmlns:a="http://schemas.openxmlformats.org/drawingml/2006/main" xmlns:r="http://schemas.openxmlformats.org/officeDocument/2006/relationships" xmlns:p="http://schemas.openxmlformats.org/presentationml/2006/main">
-  <p:cSld>
-    <p:spTree>
-      <p:nvGrpSpPr>
-        <p:cNvPr id="1" name=""/>
-        <p:cNvGrpSpPr/>
-        <p:nvPr/>
-      </p:nvGrpSpPr>
-      <p:grpSpPr>
-        <a:xfrm>
-          <a:off x="0" y="0"/>
-          <a:ext cx="0" cy="0"/>
-          <a:chOff x="0" y="0"/>
-          <a:chExt cx="0" cy="0"/>
-        </a:xfrm>
-      </p:grpSpPr>
-      <p:sp>
-        <p:nvSpPr>
-          <p:cNvPr id="2" name="Заголовок 1">
-            <a:extLst>
-              <a:ext uri="{FF2B5EF4-FFF2-40B4-BE49-F238E27FC236}">
-                <a16:creationId xmlns:a16="http://schemas.microsoft.com/office/drawing/2014/main" id="{A8A78197-F0E5-482A-9DF3-DA7661662131}"/>
-              </a:ext>
-            </a:extLst>
-          </p:cNvPr>
-          <p:cNvSpPr>
-            <a:spLocks noGrp="1"/>
-          </p:cNvSpPr>
-          <p:nvPr>
-            <p:ph type="title"/>
-          </p:nvPr>
-        </p:nvSpPr>
-        <p:spPr>
-          <a:xfrm>
-            <a:off x="838200" y="0"/>
-            <a:ext cx="10515600" cy="1325563"/>
-          </a:xfrm>
-        </p:spPr>
-        <p:txBody>
-          <a:bodyPr/>
-          <a:lstStyle/>
-          <a:p>
-            <a:pPr algn="ctr"/>
-            <a:r>
-              <a:rPr lang="ru-RU" dirty="0">
-                <a:latin typeface="Times New Roman" panose="02020603050405020304" pitchFamily="18" charset="0"/>
-                <a:cs typeface="Times New Roman" panose="02020603050405020304" pitchFamily="18" charset="0"/>
-              </a:rPr>
-              <a:t>Заключение</a:t>
-            </a:r>
-          </a:p>
-        </p:txBody>
-      </p:sp>
-      <p:sp>
-        <p:nvSpPr>
-          <p:cNvPr id="6" name="Объект 2">
-            <a:extLst>
-              <a:ext uri="{FF2B5EF4-FFF2-40B4-BE49-F238E27FC236}">
-                <a16:creationId xmlns:a16="http://schemas.microsoft.com/office/drawing/2014/main" id="{6D24A5E1-8270-4877-AF66-EC2D6888AE6B}"/>
-              </a:ext>
-            </a:extLst>
-          </p:cNvPr>
-          <p:cNvSpPr>
-            <a:spLocks noGrp="1"/>
-          </p:cNvSpPr>
-          <p:nvPr>
-            <p:ph idx="1"/>
-          </p:nvPr>
-        </p:nvSpPr>
-        <p:spPr>
-          <a:xfrm>
-            <a:off x="838200" y="1325563"/>
-            <a:ext cx="10515600" cy="5117570"/>
-          </a:xfrm>
-        </p:spPr>
-        <p:txBody>
-          <a:bodyPr>
-            <a:normAutofit fontScale="85000" lnSpcReduction="10000"/>
-          </a:bodyPr>
-          <a:lstStyle/>
-          <a:p>
-            <a:pPr marL="0" indent="0" algn="just">
-              <a:buNone/>
-            </a:pPr>
-            <a:r>
-              <a:rPr lang="ru-RU" dirty="0">
-                <a:latin typeface="Times New Roman" panose="02020603050405020304" pitchFamily="18" charset="0"/>
-                <a:cs typeface="Times New Roman" panose="02020603050405020304" pitchFamily="18" charset="0"/>
-              </a:rPr>
-              <a:t>Был разработан и реализован метод распознавания паттернов суицидального поведения человека по текстовым сообщениям.</a:t>
-            </a:r>
-          </a:p>
-          <a:p>
-            <a:pPr marL="0" indent="0" algn="just">
-              <a:buNone/>
-            </a:pPr>
-            <a:endParaRPr lang="ru-RU" b="1" dirty="0">
-              <a:latin typeface="Times New Roman" panose="02020603050405020304" pitchFamily="18" charset="0"/>
-              <a:cs typeface="Times New Roman" panose="02020603050405020304" pitchFamily="18" charset="0"/>
-            </a:endParaRPr>
-          </a:p>
-          <a:p>
-            <a:pPr marL="0" indent="0" algn="just">
-              <a:buNone/>
-            </a:pPr>
-            <a:r>
-              <a:rPr lang="ru-RU" dirty="0">
-                <a:latin typeface="Times New Roman" panose="02020603050405020304" pitchFamily="18" charset="0"/>
-                <a:cs typeface="Times New Roman" panose="02020603050405020304" pitchFamily="18" charset="0"/>
-              </a:rPr>
-              <a:t>Были решены следующие задачи:</a:t>
-            </a:r>
-          </a:p>
-          <a:p>
-            <a:pPr algn="just"/>
-            <a:r>
-              <a:rPr lang="ru-RU" sz="2800" dirty="0">
-                <a:latin typeface="Times New Roman" panose="02020603050405020304" pitchFamily="18" charset="0"/>
-                <a:cs typeface="Times New Roman" panose="02020603050405020304" pitchFamily="18" charset="0"/>
-              </a:rPr>
-              <a:t>Проведен анализ действий и характеристик, позволяющих распознать паттерны суицидального поведения</a:t>
-            </a:r>
-            <a:r>
-              <a:rPr lang="en-US" sz="2800" dirty="0">
-                <a:latin typeface="Times New Roman" panose="02020603050405020304" pitchFamily="18" charset="0"/>
-                <a:cs typeface="Times New Roman" panose="02020603050405020304" pitchFamily="18" charset="0"/>
-              </a:rPr>
-              <a:t>;</a:t>
-            </a:r>
-          </a:p>
-          <a:p>
-            <a:pPr algn="just"/>
-            <a:r>
-              <a:rPr lang="ru-RU" sz="2800" dirty="0">
-                <a:latin typeface="Times New Roman" panose="02020603050405020304" pitchFamily="18" charset="0"/>
-                <a:cs typeface="Times New Roman" panose="02020603050405020304" pitchFamily="18" charset="0"/>
-              </a:rPr>
-              <a:t>Классифицированы признаки паттернов суицидального поведения человека</a:t>
-            </a:r>
-            <a:r>
-              <a:rPr lang="en-US" sz="2800" dirty="0">
-                <a:latin typeface="Times New Roman" panose="02020603050405020304" pitchFamily="18" charset="0"/>
-                <a:cs typeface="Times New Roman" panose="02020603050405020304" pitchFamily="18" charset="0"/>
-              </a:rPr>
-              <a:t>;</a:t>
-            </a:r>
-            <a:endParaRPr lang="ru-RU" sz="2800" dirty="0">
-              <a:latin typeface="Times New Roman" panose="02020603050405020304" pitchFamily="18" charset="0"/>
-              <a:cs typeface="Times New Roman" panose="02020603050405020304" pitchFamily="18" charset="0"/>
-            </a:endParaRPr>
-          </a:p>
-          <a:p>
-            <a:pPr algn="just"/>
-            <a:r>
-              <a:rPr lang="ru-RU" sz="2800" dirty="0">
-                <a:latin typeface="Times New Roman" panose="02020603050405020304" pitchFamily="18" charset="0"/>
-                <a:cs typeface="Times New Roman" panose="02020603050405020304" pitchFamily="18" charset="0"/>
-              </a:rPr>
-              <a:t>Определен метод сбора данных суицидального поведения</a:t>
-            </a:r>
-            <a:r>
-              <a:rPr lang="en-US" sz="2800" dirty="0">
-                <a:latin typeface="Times New Roman" panose="02020603050405020304" pitchFamily="18" charset="0"/>
-                <a:cs typeface="Times New Roman" panose="02020603050405020304" pitchFamily="18" charset="0"/>
-              </a:rPr>
-              <a:t>;</a:t>
-            </a:r>
-          </a:p>
-          <a:p>
-            <a:pPr algn="just"/>
-            <a:r>
-              <a:rPr lang="ru-RU" sz="2800" dirty="0">
-                <a:latin typeface="Times New Roman" panose="02020603050405020304" pitchFamily="18" charset="0"/>
-                <a:cs typeface="Times New Roman" panose="02020603050405020304" pitchFamily="18" charset="0"/>
-              </a:rPr>
-              <a:t>Разработан метод распознавания паттернов суицидального поведения</a:t>
-            </a:r>
-            <a:r>
-              <a:rPr lang="en-US" sz="2800" dirty="0">
-                <a:latin typeface="Times New Roman" panose="02020603050405020304" pitchFamily="18" charset="0"/>
-                <a:cs typeface="Times New Roman" panose="02020603050405020304" pitchFamily="18" charset="0"/>
-              </a:rPr>
-              <a:t>;</a:t>
-            </a:r>
-          </a:p>
-          <a:p>
-            <a:pPr algn="just"/>
-            <a:r>
-              <a:rPr lang="ru-RU" sz="2800" dirty="0">
-                <a:latin typeface="Times New Roman" panose="02020603050405020304" pitchFamily="18" charset="0"/>
-                <a:cs typeface="Times New Roman" panose="02020603050405020304" pitchFamily="18" charset="0"/>
-              </a:rPr>
-              <a:t>Разработанный метод реализован</a:t>
-            </a:r>
-            <a:r>
-              <a:rPr lang="en-US" sz="2800" dirty="0">
-                <a:latin typeface="Times New Roman" panose="02020603050405020304" pitchFamily="18" charset="0"/>
-                <a:cs typeface="Times New Roman" panose="02020603050405020304" pitchFamily="18" charset="0"/>
-              </a:rPr>
-              <a:t>;</a:t>
-            </a:r>
-            <a:endParaRPr lang="ru-RU" sz="2800" dirty="0">
-              <a:latin typeface="Times New Roman" panose="02020603050405020304" pitchFamily="18" charset="0"/>
-              <a:cs typeface="Times New Roman" panose="02020603050405020304" pitchFamily="18" charset="0"/>
-            </a:endParaRPr>
-          </a:p>
-          <a:p>
-            <a:pPr algn="just"/>
-            <a:r>
-              <a:rPr lang="ru-RU" sz="2800" dirty="0">
-                <a:latin typeface="Times New Roman" panose="02020603050405020304" pitchFamily="18" charset="0"/>
-                <a:cs typeface="Times New Roman" panose="02020603050405020304" pitchFamily="18" charset="0"/>
-              </a:rPr>
-              <a:t>Проведено сравнительное исследование задействованных в методе алгоритмов машинного обучения</a:t>
-            </a:r>
-            <a:r>
-              <a:rPr lang="en-US" sz="2800" dirty="0">
-                <a:latin typeface="Times New Roman" panose="02020603050405020304" pitchFamily="18" charset="0"/>
-                <a:cs typeface="Times New Roman" panose="02020603050405020304" pitchFamily="18" charset="0"/>
-              </a:rPr>
-              <a:t>;</a:t>
-            </a:r>
-          </a:p>
-          <a:p>
-            <a:pPr algn="just"/>
-            <a:r>
-              <a:rPr lang="ru-RU" sz="2800" dirty="0">
-                <a:latin typeface="Times New Roman" panose="02020603050405020304" pitchFamily="18" charset="0"/>
-                <a:cs typeface="Times New Roman" panose="02020603050405020304" pitchFamily="18" charset="0"/>
-              </a:rPr>
-              <a:t>Да</a:t>
-            </a:r>
-            <a:r>
-              <a:rPr lang="ru-RU" dirty="0">
-                <a:latin typeface="Times New Roman" panose="02020603050405020304" pitchFamily="18" charset="0"/>
-                <a:cs typeface="Times New Roman" panose="02020603050405020304" pitchFamily="18" charset="0"/>
-              </a:rPr>
-              <a:t>ны</a:t>
-            </a:r>
-            <a:r>
-              <a:rPr lang="ru-RU" sz="2800" dirty="0">
-                <a:latin typeface="Times New Roman" panose="02020603050405020304" pitchFamily="18" charset="0"/>
-                <a:cs typeface="Times New Roman" panose="02020603050405020304" pitchFamily="18" charset="0"/>
-              </a:rPr>
-              <a:t> рекомендации о применимости реализованного метода.</a:t>
-            </a:r>
-            <a:r>
-              <a:rPr lang="ru-RU" b="1" dirty="0">
-                <a:latin typeface="Times New Roman" panose="02020603050405020304" pitchFamily="18" charset="0"/>
-                <a:cs typeface="Times New Roman" panose="02020603050405020304" pitchFamily="18" charset="0"/>
-              </a:rPr>
-              <a:t> </a:t>
-            </a:r>
-          </a:p>
-        </p:txBody>
-      </p:sp>
-      <p:sp>
-        <p:nvSpPr>
-          <p:cNvPr id="3" name="Номер слайда 2">
-            <a:extLst>
-              <a:ext uri="{FF2B5EF4-FFF2-40B4-BE49-F238E27FC236}">
-                <a16:creationId xmlns:a16="http://schemas.microsoft.com/office/drawing/2014/main" id="{18D02FDB-6FC5-443A-AD14-3C8B3AC22A63}"/>
-              </a:ext>
-            </a:extLst>
-          </p:cNvPr>
-          <p:cNvSpPr>
-            <a:spLocks noGrp="1"/>
-          </p:cNvSpPr>
-          <p:nvPr>
-            <p:ph type="sldNum" sz="quarter" idx="12"/>
-          </p:nvPr>
-        </p:nvSpPr>
-        <p:spPr/>
-        <p:txBody>
-          <a:bodyPr/>
-          <a:lstStyle/>
-          <a:p>
-            <a:fld id="{5AEE0CB1-1A0F-4E9F-8383-D0A68518B020}" type="slidenum">
-              <a:rPr lang="ru-RU" smtClean="0"/>
-              <a:t>15</a:t>
-            </a:fld>
-            <a:endParaRPr lang="ru-RU"/>
-          </a:p>
-        </p:txBody>
-      </p:sp>
-    </p:spTree>
-    <p:extLst>
-      <p:ext uri="{BB962C8B-B14F-4D97-AF65-F5344CB8AC3E}">
-        <p14:creationId xmlns:p14="http://schemas.microsoft.com/office/powerpoint/2010/main" val="1284806075"/>
-      </p:ext>
-    </p:extLst>
-  </p:cSld>
-  <p:clrMapOvr>
-    <a:masterClrMapping/>
-  </p:clrMapOvr>
-</p:sld>
-</file>
-
 <file path=ppt/slides/slide16.xml><?xml version="1.0" encoding="utf-8"?>
 <p:sld xmlns:a="http://schemas.openxmlformats.org/drawingml/2006/main" xmlns:r="http://schemas.openxmlformats.org/officeDocument/2006/relationships" xmlns:p="http://schemas.openxmlformats.org/presentationml/2006/main">
   <p:cSld>
@@ -11034,6 +11121,247 @@
                 <a:latin typeface="Times New Roman" panose="02020603050405020304" pitchFamily="18" charset="0"/>
                 <a:cs typeface="Times New Roman" panose="02020603050405020304" pitchFamily="18" charset="0"/>
               </a:rPr>
+              <a:t>Заключение</a:t>
+            </a:r>
+          </a:p>
+        </p:txBody>
+      </p:sp>
+      <p:sp>
+        <p:nvSpPr>
+          <p:cNvPr id="6" name="Объект 2">
+            <a:extLst>
+              <a:ext uri="{FF2B5EF4-FFF2-40B4-BE49-F238E27FC236}">
+                <a16:creationId xmlns:a16="http://schemas.microsoft.com/office/drawing/2014/main" id="{6D24A5E1-8270-4877-AF66-EC2D6888AE6B}"/>
+              </a:ext>
+            </a:extLst>
+          </p:cNvPr>
+          <p:cNvSpPr>
+            <a:spLocks noGrp="1"/>
+          </p:cNvSpPr>
+          <p:nvPr>
+            <p:ph idx="1"/>
+          </p:nvPr>
+        </p:nvSpPr>
+        <p:spPr>
+          <a:xfrm>
+            <a:off x="838200" y="1325563"/>
+            <a:ext cx="10515600" cy="5117570"/>
+          </a:xfrm>
+        </p:spPr>
+        <p:txBody>
+          <a:bodyPr>
+            <a:normAutofit fontScale="92500"/>
+          </a:bodyPr>
+          <a:lstStyle/>
+          <a:p>
+            <a:pPr marL="0" indent="0" algn="just">
+              <a:buNone/>
+            </a:pPr>
+            <a:r>
+              <a:rPr lang="ru-RU" dirty="0">
+                <a:latin typeface="Times New Roman" panose="02020603050405020304" pitchFamily="18" charset="0"/>
+                <a:cs typeface="Times New Roman" panose="02020603050405020304" pitchFamily="18" charset="0"/>
+              </a:rPr>
+              <a:t>Был разработан и реализован метод распознавания паттернов суицидального поведения человека по текстовым сообщениям.</a:t>
+            </a:r>
+          </a:p>
+          <a:p>
+            <a:pPr marL="0" indent="0" algn="just">
+              <a:buNone/>
+            </a:pPr>
+            <a:endParaRPr lang="ru-RU" b="1" dirty="0">
+              <a:latin typeface="Times New Roman" panose="02020603050405020304" pitchFamily="18" charset="0"/>
+              <a:cs typeface="Times New Roman" panose="02020603050405020304" pitchFamily="18" charset="0"/>
+            </a:endParaRPr>
+          </a:p>
+          <a:p>
+            <a:pPr marL="0" indent="0" algn="just">
+              <a:buNone/>
+            </a:pPr>
+            <a:r>
+              <a:rPr lang="ru-RU" dirty="0">
+                <a:latin typeface="Times New Roman" panose="02020603050405020304" pitchFamily="18" charset="0"/>
+                <a:cs typeface="Times New Roman" panose="02020603050405020304" pitchFamily="18" charset="0"/>
+              </a:rPr>
+              <a:t>Были решены следующие задачи:</a:t>
+            </a:r>
+          </a:p>
+          <a:p>
+            <a:pPr algn="just"/>
+            <a:r>
+              <a:rPr lang="ru-RU" sz="2800" dirty="0">
+                <a:latin typeface="Times New Roman" panose="02020603050405020304" pitchFamily="18" charset="0"/>
+                <a:cs typeface="Times New Roman" panose="02020603050405020304" pitchFamily="18" charset="0"/>
+              </a:rPr>
+              <a:t>проведен анализ действий и характеристик, позволяющих распознать паттерны суицидального поведения</a:t>
+            </a:r>
+            <a:r>
+              <a:rPr lang="en-US" sz="2800" dirty="0">
+                <a:latin typeface="Times New Roman" panose="02020603050405020304" pitchFamily="18" charset="0"/>
+                <a:cs typeface="Times New Roman" panose="02020603050405020304" pitchFamily="18" charset="0"/>
+              </a:rPr>
+              <a:t>, </a:t>
+            </a:r>
+            <a:r>
+              <a:rPr lang="ru-RU" sz="2800" dirty="0">
+                <a:latin typeface="Times New Roman" panose="02020603050405020304" pitchFamily="18" charset="0"/>
+                <a:cs typeface="Times New Roman" panose="02020603050405020304" pitchFamily="18" charset="0"/>
+              </a:rPr>
+              <a:t>и классифицировать их</a:t>
+            </a:r>
+            <a:r>
+              <a:rPr lang="en-US" sz="2800" dirty="0">
+                <a:latin typeface="Times New Roman" panose="02020603050405020304" pitchFamily="18" charset="0"/>
+                <a:cs typeface="Times New Roman" panose="02020603050405020304" pitchFamily="18" charset="0"/>
+              </a:rPr>
+              <a:t>; </a:t>
+            </a:r>
+            <a:endParaRPr lang="ru-RU" sz="2800" dirty="0">
+              <a:latin typeface="Times New Roman" panose="02020603050405020304" pitchFamily="18" charset="0"/>
+              <a:cs typeface="Times New Roman" panose="02020603050405020304" pitchFamily="18" charset="0"/>
+            </a:endParaRPr>
+          </a:p>
+          <a:p>
+            <a:pPr algn="just"/>
+            <a:r>
+              <a:rPr lang="ru-RU" sz="2800" dirty="0">
+                <a:latin typeface="Times New Roman" panose="02020603050405020304" pitchFamily="18" charset="0"/>
+                <a:cs typeface="Times New Roman" panose="02020603050405020304" pitchFamily="18" charset="0"/>
+              </a:rPr>
+              <a:t>разработан метод распознавания паттернов суицидального поведения</a:t>
+            </a:r>
+            <a:r>
+              <a:rPr lang="en-US" sz="2800" dirty="0">
+                <a:latin typeface="Times New Roman" panose="02020603050405020304" pitchFamily="18" charset="0"/>
+                <a:cs typeface="Times New Roman" panose="02020603050405020304" pitchFamily="18" charset="0"/>
+              </a:rPr>
+              <a:t>;</a:t>
+            </a:r>
+          </a:p>
+          <a:p>
+            <a:pPr algn="just"/>
+            <a:r>
+              <a:rPr lang="ru-RU" sz="2800" dirty="0">
+                <a:latin typeface="Times New Roman" panose="02020603050405020304" pitchFamily="18" charset="0"/>
+                <a:cs typeface="Times New Roman" panose="02020603050405020304" pitchFamily="18" charset="0"/>
+              </a:rPr>
+              <a:t>реализован разработанный метод</a:t>
+            </a:r>
+            <a:r>
+              <a:rPr lang="en-US" sz="2800" dirty="0">
+                <a:latin typeface="Times New Roman" panose="02020603050405020304" pitchFamily="18" charset="0"/>
+                <a:cs typeface="Times New Roman" panose="02020603050405020304" pitchFamily="18" charset="0"/>
+              </a:rPr>
+              <a:t>;</a:t>
+            </a:r>
+            <a:endParaRPr lang="ru-RU" sz="2800" dirty="0">
+              <a:latin typeface="Times New Roman" panose="02020603050405020304" pitchFamily="18" charset="0"/>
+              <a:cs typeface="Times New Roman" panose="02020603050405020304" pitchFamily="18" charset="0"/>
+            </a:endParaRPr>
+          </a:p>
+          <a:p>
+            <a:pPr algn="just"/>
+            <a:r>
+              <a:rPr lang="ru-RU" sz="2800" dirty="0">
+                <a:latin typeface="Times New Roman" panose="02020603050405020304" pitchFamily="18" charset="0"/>
+                <a:cs typeface="Times New Roman" panose="02020603050405020304" pitchFamily="18" charset="0"/>
+              </a:rPr>
+              <a:t>проведено сравнительное исследование задействованных в методе алгоритмов машинного обучения и даны рекомендации о применимости реализованного метода.</a:t>
+            </a:r>
+          </a:p>
+        </p:txBody>
+      </p:sp>
+      <p:sp>
+        <p:nvSpPr>
+          <p:cNvPr id="3" name="Номер слайда 2">
+            <a:extLst>
+              <a:ext uri="{FF2B5EF4-FFF2-40B4-BE49-F238E27FC236}">
+                <a16:creationId xmlns:a16="http://schemas.microsoft.com/office/drawing/2014/main" id="{18D02FDB-6FC5-443A-AD14-3C8B3AC22A63}"/>
+              </a:ext>
+            </a:extLst>
+          </p:cNvPr>
+          <p:cNvSpPr>
+            <a:spLocks noGrp="1"/>
+          </p:cNvSpPr>
+          <p:nvPr>
+            <p:ph type="sldNum" sz="quarter" idx="12"/>
+          </p:nvPr>
+        </p:nvSpPr>
+        <p:spPr/>
+        <p:txBody>
+          <a:bodyPr/>
+          <a:lstStyle/>
+          <a:p>
+            <a:fld id="{5AEE0CB1-1A0F-4E9F-8383-D0A68518B020}" type="slidenum">
+              <a:rPr lang="ru-RU" smtClean="0"/>
+              <a:t>16</a:t>
+            </a:fld>
+            <a:endParaRPr lang="ru-RU"/>
+          </a:p>
+        </p:txBody>
+      </p:sp>
+    </p:spTree>
+    <p:extLst>
+      <p:ext uri="{BB962C8B-B14F-4D97-AF65-F5344CB8AC3E}">
+        <p14:creationId xmlns:p14="http://schemas.microsoft.com/office/powerpoint/2010/main" val="1284806075"/>
+      </p:ext>
+    </p:extLst>
+  </p:cSld>
+  <p:clrMapOvr>
+    <a:masterClrMapping/>
+  </p:clrMapOvr>
+</p:sld>
+</file>
+
+<file path=ppt/slides/slide17.xml><?xml version="1.0" encoding="utf-8"?>
+<p:sld xmlns:a="http://schemas.openxmlformats.org/drawingml/2006/main" xmlns:r="http://schemas.openxmlformats.org/officeDocument/2006/relationships" xmlns:p="http://schemas.openxmlformats.org/presentationml/2006/main">
+  <p:cSld>
+    <p:spTree>
+      <p:nvGrpSpPr>
+        <p:cNvPr id="1" name=""/>
+        <p:cNvGrpSpPr/>
+        <p:nvPr/>
+      </p:nvGrpSpPr>
+      <p:grpSpPr>
+        <a:xfrm>
+          <a:off x="0" y="0"/>
+          <a:ext cx="0" cy="0"/>
+          <a:chOff x="0" y="0"/>
+          <a:chExt cx="0" cy="0"/>
+        </a:xfrm>
+      </p:grpSpPr>
+      <p:sp>
+        <p:nvSpPr>
+          <p:cNvPr id="2" name="Заголовок 1">
+            <a:extLst>
+              <a:ext uri="{FF2B5EF4-FFF2-40B4-BE49-F238E27FC236}">
+                <a16:creationId xmlns:a16="http://schemas.microsoft.com/office/drawing/2014/main" id="{A8A78197-F0E5-482A-9DF3-DA7661662131}"/>
+              </a:ext>
+            </a:extLst>
+          </p:cNvPr>
+          <p:cNvSpPr>
+            <a:spLocks noGrp="1"/>
+          </p:cNvSpPr>
+          <p:nvPr>
+            <p:ph type="title"/>
+          </p:nvPr>
+        </p:nvSpPr>
+        <p:spPr>
+          <a:xfrm>
+            <a:off x="838200" y="0"/>
+            <a:ext cx="10515600" cy="1325563"/>
+          </a:xfrm>
+        </p:spPr>
+        <p:txBody>
+          <a:bodyPr/>
+          <a:lstStyle/>
+          <a:p>
+            <a:pPr algn="ctr"/>
+            <a:r>
+              <a:rPr lang="ru-RU" dirty="0">
+                <a:latin typeface="Times New Roman" panose="02020603050405020304" pitchFamily="18" charset="0"/>
+                <a:cs typeface="Times New Roman" panose="02020603050405020304" pitchFamily="18" charset="0"/>
+              </a:rPr>
               <a:t>Дальнейшее развитие</a:t>
             </a:r>
           </a:p>
@@ -11202,7 +11530,7 @@
           <a:p>
             <a:fld id="{5AEE0CB1-1A0F-4E9F-8383-D0A68518B020}" type="slidenum">
               <a:rPr lang="ru-RU" smtClean="0"/>
-              <a:t>16</a:t>
+              <a:t>17</a:t>
             </a:fld>
             <a:endParaRPr lang="ru-RU"/>
           </a:p>
@@ -11294,7 +11622,7 @@
         </p:spPr>
         <p:txBody>
           <a:bodyPr anchor="ctr">
-            <a:normAutofit lnSpcReduction="10000"/>
+            <a:normAutofit/>
           </a:bodyPr>
           <a:lstStyle/>
           <a:p>
@@ -11346,7 +11674,42 @@
                 <a:latin typeface="Times New Roman" panose="02020603050405020304" pitchFamily="18" charset="0"/>
                 <a:cs typeface="Times New Roman" panose="02020603050405020304" pitchFamily="18" charset="0"/>
               </a:rPr>
-              <a:t>Провести анализ действий и характеристик, позволяющих распознать паттерны суицидального поведения</a:t>
+              <a:t>провести анализ действий и характеристик, позволяющих распознать паттерны суицидального поведения</a:t>
+            </a:r>
+            <a:r>
+              <a:rPr lang="en-US" sz="2400" dirty="0">
+                <a:latin typeface="Times New Roman" panose="02020603050405020304" pitchFamily="18" charset="0"/>
+                <a:cs typeface="Times New Roman" panose="02020603050405020304" pitchFamily="18" charset="0"/>
+              </a:rPr>
+              <a:t>, </a:t>
+            </a:r>
+            <a:r>
+              <a:rPr lang="ru-RU" sz="2400" dirty="0">
+                <a:latin typeface="Times New Roman" panose="02020603050405020304" pitchFamily="18" charset="0"/>
+                <a:cs typeface="Times New Roman" panose="02020603050405020304" pitchFamily="18" charset="0"/>
+              </a:rPr>
+              <a:t>и классифицировать их</a:t>
+            </a:r>
+            <a:r>
+              <a:rPr lang="en-US" sz="2400" dirty="0">
+                <a:latin typeface="Times New Roman" panose="02020603050405020304" pitchFamily="18" charset="0"/>
+                <a:cs typeface="Times New Roman" panose="02020603050405020304" pitchFamily="18" charset="0"/>
+              </a:rPr>
+              <a:t>; </a:t>
+            </a:r>
+            <a:endParaRPr lang="ru-RU" sz="2400" dirty="0">
+              <a:latin typeface="Times New Roman" panose="02020603050405020304" pitchFamily="18" charset="0"/>
+              <a:cs typeface="Times New Roman" panose="02020603050405020304" pitchFamily="18" charset="0"/>
+            </a:endParaRPr>
+          </a:p>
+          <a:p>
+            <a:pPr algn="just"/>
+            <a:r>
+              <a:rPr lang="ru-RU" sz="2400" dirty="0">
+                <a:latin typeface="Times New Roman" panose="02020603050405020304" pitchFamily="18" charset="0"/>
+                <a:cs typeface="Times New Roman" panose="02020603050405020304" pitchFamily="18" charset="0"/>
+              </a:rPr>
+              <a:t>разработать метод распознавания паттернов суицидального поведения</a:t>
             </a:r>
             <a:r>
               <a:rPr lang="en-US" sz="2400" dirty="0">
@@ -11363,7 +11726,7 @@
                 <a:latin typeface="Times New Roman" panose="02020603050405020304" pitchFamily="18" charset="0"/>
                 <a:cs typeface="Times New Roman" panose="02020603050405020304" pitchFamily="18" charset="0"/>
               </a:rPr>
-              <a:t>Классифицировать признаки паттернов суицидального поведения человека</a:t>
+              <a:t>реализовать разработанный метод</a:t>
             </a:r>
             <a:r>
               <a:rPr lang="en-US" sz="2400" dirty="0">
@@ -11384,79 +11747,7 @@
                 <a:latin typeface="Times New Roman" panose="02020603050405020304" pitchFamily="18" charset="0"/>
                 <a:cs typeface="Times New Roman" panose="02020603050405020304" pitchFamily="18" charset="0"/>
               </a:rPr>
-              <a:t>Определить метод сбора данных суицидального поведения</a:t>
-            </a:r>
-            <a:r>
-              <a:rPr lang="en-US" sz="2400" dirty="0">
-                <a:latin typeface="Times New Roman" panose="02020603050405020304" pitchFamily="18" charset="0"/>
-                <a:cs typeface="Times New Roman" panose="02020603050405020304" pitchFamily="18" charset="0"/>
-              </a:rPr>
-              <a:t>;</a:t>
-            </a:r>
-          </a:p>
-          <a:p>
-            <a:pPr algn="just"/>
-            <a:r>
-              <a:rPr lang="ru-RU" sz="2400" dirty="0">
-                <a:latin typeface="Times New Roman" panose="02020603050405020304" pitchFamily="18" charset="0"/>
-                <a:cs typeface="Times New Roman" panose="02020603050405020304" pitchFamily="18" charset="0"/>
-              </a:rPr>
-              <a:t>Разработать метод распознавания паттернов суицидального поведения</a:t>
-            </a:r>
-            <a:r>
-              <a:rPr lang="en-US" sz="2400" dirty="0">
-                <a:latin typeface="Times New Roman" panose="02020603050405020304" pitchFamily="18" charset="0"/>
-                <a:cs typeface="Times New Roman" panose="02020603050405020304" pitchFamily="18" charset="0"/>
-              </a:rPr>
-              <a:t>;</a:t>
-            </a:r>
-          </a:p>
-          <a:p>
-            <a:pPr algn="just"/>
-            <a:r>
-              <a:rPr lang="ru-RU" sz="2400" dirty="0">
-                <a:latin typeface="Times New Roman" panose="02020603050405020304" pitchFamily="18" charset="0"/>
-                <a:cs typeface="Times New Roman" panose="02020603050405020304" pitchFamily="18" charset="0"/>
-              </a:rPr>
-              <a:t>Реализовать разработанный метод</a:t>
-            </a:r>
-            <a:r>
-              <a:rPr lang="en-US" sz="2400" dirty="0">
-                <a:latin typeface="Times New Roman" panose="02020603050405020304" pitchFamily="18" charset="0"/>
-                <a:cs typeface="Times New Roman" panose="02020603050405020304" pitchFamily="18" charset="0"/>
-              </a:rPr>
-              <a:t>;</a:t>
-            </a:r>
-            <a:endParaRPr lang="ru-RU" sz="2400" dirty="0">
-              <a:latin typeface="Times New Roman" panose="02020603050405020304" pitchFamily="18" charset="0"/>
-              <a:cs typeface="Times New Roman" panose="02020603050405020304" pitchFamily="18" charset="0"/>
-            </a:endParaRPr>
-          </a:p>
-          <a:p>
-            <a:pPr algn="just"/>
-            <a:r>
-              <a:rPr lang="ru-RU" sz="2400" dirty="0">
-                <a:latin typeface="Times New Roman" panose="02020603050405020304" pitchFamily="18" charset="0"/>
-                <a:cs typeface="Times New Roman" panose="02020603050405020304" pitchFamily="18" charset="0"/>
-              </a:rPr>
-              <a:t>Провести сравнительное исследование задействованных в методе алгоритмов машинного обучения</a:t>
-            </a:r>
-            <a:r>
-              <a:rPr lang="en-US" sz="2400" dirty="0">
-                <a:latin typeface="Times New Roman" panose="02020603050405020304" pitchFamily="18" charset="0"/>
-                <a:cs typeface="Times New Roman" panose="02020603050405020304" pitchFamily="18" charset="0"/>
-              </a:rPr>
-              <a:t>;</a:t>
-            </a:r>
-          </a:p>
-          <a:p>
-            <a:pPr algn="just"/>
-            <a:r>
-              <a:rPr lang="ru-RU" sz="2400" dirty="0">
-                <a:latin typeface="Times New Roman" panose="02020603050405020304" pitchFamily="18" charset="0"/>
-                <a:cs typeface="Times New Roman" panose="02020603050405020304" pitchFamily="18" charset="0"/>
-              </a:rPr>
-              <a:t>Дать рекомендации о применимости реализованного метода.</a:t>
+              <a:t>провести сравнительное исследование задействованных в методе алгоритмов машинного обучения и дать рекомендации о применимости реализованного метода.</a:t>
             </a:r>
           </a:p>
         </p:txBody>
@@ -13665,6 +13956,151 @@
           <a:chExt cx="0" cy="0"/>
         </a:xfrm>
       </p:grpSpPr>
+      <p:sp>
+        <p:nvSpPr>
+          <p:cNvPr id="2" name="Заголовок 1">
+            <a:extLst>
+              <a:ext uri="{FF2B5EF4-FFF2-40B4-BE49-F238E27FC236}">
+                <a16:creationId xmlns:a16="http://schemas.microsoft.com/office/drawing/2014/main" id="{A8A78197-F0E5-482A-9DF3-DA7661662131}"/>
+              </a:ext>
+            </a:extLst>
+          </p:cNvPr>
+          <p:cNvSpPr>
+            <a:spLocks noGrp="1"/>
+          </p:cNvSpPr>
+          <p:nvPr>
+            <p:ph type="title"/>
+          </p:nvPr>
+        </p:nvSpPr>
+        <p:spPr>
+          <a:xfrm>
+            <a:off x="838200" y="263465"/>
+            <a:ext cx="10515600" cy="1325563"/>
+          </a:xfrm>
+        </p:spPr>
+        <p:txBody>
+          <a:bodyPr>
+            <a:normAutofit fontScale="90000"/>
+          </a:bodyPr>
+          <a:lstStyle/>
+          <a:p>
+            <a:pPr algn="ctr"/>
+            <a:r>
+              <a:rPr lang="ru-RU" dirty="0">
+                <a:latin typeface="Times New Roman" panose="02020603050405020304" pitchFamily="18" charset="0"/>
+                <a:cs typeface="Times New Roman" panose="02020603050405020304" pitchFamily="18" charset="0"/>
+              </a:rPr>
+              <a:t>Метод </a:t>
+            </a:r>
+            <a:r>
+              <a:rPr lang="ru-RU" sz="4400" dirty="0">
+                <a:latin typeface="Times New Roman" panose="02020603050405020304" pitchFamily="18" charset="0"/>
+                <a:cs typeface="Times New Roman" panose="02020603050405020304" pitchFamily="18" charset="0"/>
+              </a:rPr>
+              <a:t>распознавания паттернов суицидального поведения человека по текстовым сообщениям</a:t>
+            </a:r>
+            <a:endParaRPr lang="ru-RU" dirty="0">
+              <a:latin typeface="Times New Roman" panose="02020603050405020304" pitchFamily="18" charset="0"/>
+              <a:cs typeface="Times New Roman" panose="02020603050405020304" pitchFamily="18" charset="0"/>
+            </a:endParaRPr>
+          </a:p>
+        </p:txBody>
+      </p:sp>
+      <p:sp>
+        <p:nvSpPr>
+          <p:cNvPr id="3" name="Номер слайда 2">
+            <a:extLst>
+              <a:ext uri="{FF2B5EF4-FFF2-40B4-BE49-F238E27FC236}">
+                <a16:creationId xmlns:a16="http://schemas.microsoft.com/office/drawing/2014/main" id="{18D02FDB-6FC5-443A-AD14-3C8B3AC22A63}"/>
+              </a:ext>
+            </a:extLst>
+          </p:cNvPr>
+          <p:cNvSpPr>
+            <a:spLocks noGrp="1"/>
+          </p:cNvSpPr>
+          <p:nvPr>
+            <p:ph type="sldNum" sz="quarter" idx="12"/>
+          </p:nvPr>
+        </p:nvSpPr>
+        <p:spPr/>
+        <p:txBody>
+          <a:bodyPr/>
+          <a:lstStyle/>
+          <a:p>
+            <a:fld id="{5AEE0CB1-1A0F-4E9F-8383-D0A68518B020}" type="slidenum">
+              <a:rPr lang="ru-RU" smtClean="0"/>
+              <a:t>5</a:t>
+            </a:fld>
+            <a:endParaRPr lang="ru-RU"/>
+          </a:p>
+        </p:txBody>
+      </p:sp>
+      <p:pic>
+        <p:nvPicPr>
+          <p:cNvPr id="5" name="Picture 4">
+            <a:extLst>
+              <a:ext uri="{FF2B5EF4-FFF2-40B4-BE49-F238E27FC236}">
+                <a16:creationId xmlns:a16="http://schemas.microsoft.com/office/drawing/2014/main" id="{A5533952-7417-F845-A4AD-5617C37DA31D}"/>
+              </a:ext>
+            </a:extLst>
+          </p:cNvPr>
+          <p:cNvPicPr>
+            <a:picLocks noChangeAspect="1"/>
+          </p:cNvPicPr>
+          <p:nvPr/>
+        </p:nvPicPr>
+        <p:blipFill>
+          <a:blip r:embed="rId3">
+            <a:extLst>
+              <a:ext uri="{28A0092B-C50C-407E-A947-70E740481C1C}">
+                <a14:useLocalDpi xmlns:a14="http://schemas.microsoft.com/office/drawing/2010/main" val="0"/>
+              </a:ext>
+            </a:extLst>
+          </a:blip>
+          <a:stretch>
+            <a:fillRect/>
+          </a:stretch>
+        </p:blipFill>
+        <p:spPr>
+          <a:xfrm>
+            <a:off x="2590800" y="1720850"/>
+            <a:ext cx="7010400" cy="4635500"/>
+          </a:xfrm>
+          <a:prstGeom prst="rect">
+            <a:avLst/>
+          </a:prstGeom>
+        </p:spPr>
+      </p:pic>
+    </p:spTree>
+    <p:extLst>
+      <p:ext uri="{BB962C8B-B14F-4D97-AF65-F5344CB8AC3E}">
+        <p14:creationId xmlns:p14="http://schemas.microsoft.com/office/powerpoint/2010/main" val="2892305806"/>
+      </p:ext>
+    </p:extLst>
+  </p:cSld>
+  <p:clrMapOvr>
+    <a:masterClrMapping/>
+  </p:clrMapOvr>
+</p:sld>
+</file>
+
+<file path=ppt/slides/slide6.xml><?xml version="1.0" encoding="utf-8"?>
+<p:sld xmlns:a="http://schemas.openxmlformats.org/drawingml/2006/main" xmlns:r="http://schemas.openxmlformats.org/officeDocument/2006/relationships" xmlns:p="http://schemas.openxmlformats.org/presentationml/2006/main">
+  <p:cSld>
+    <p:spTree>
+      <p:nvGrpSpPr>
+        <p:cNvPr id="1" name=""/>
+        <p:cNvGrpSpPr/>
+        <p:nvPr/>
+      </p:nvGrpSpPr>
+      <p:grpSpPr>
+        <a:xfrm>
+          <a:off x="0" y="0"/>
+          <a:ext cx="0" cy="0"/>
+          <a:chOff x="0" y="0"/>
+          <a:chExt cx="0" cy="0"/>
+        </a:xfrm>
+      </p:grpSpPr>
       <p:pic>
         <p:nvPicPr>
           <p:cNvPr id="10" name="Picture 9">
@@ -13773,7 +14209,7 @@
           <a:p>
             <a:fld id="{5AEE0CB1-1A0F-4E9F-8383-D0A68518B020}" type="slidenum">
               <a:rPr lang="ru-RU" smtClean="0"/>
-              <a:t>5</a:t>
+              <a:t>6</a:t>
             </a:fld>
             <a:endParaRPr lang="ru-RU"/>
           </a:p>
@@ -13792,7 +14228,7 @@
 </p:sld>
 </file>
 
-<file path=ppt/slides/slide6.xml><?xml version="1.0" encoding="utf-8"?>
+<file path=ppt/slides/slide7.xml><?xml version="1.0" encoding="utf-8"?>
 <p:sld xmlns:a="http://schemas.openxmlformats.org/drawingml/2006/main" xmlns:r="http://schemas.openxmlformats.org/officeDocument/2006/relationships" xmlns:p="http://schemas.openxmlformats.org/presentationml/2006/main">
   <p:cSld>
     <p:spTree>
@@ -13916,7 +14352,7 @@
           <a:p>
             <a:fld id="{5AEE0CB1-1A0F-4E9F-8383-D0A68518B020}" type="slidenum">
               <a:rPr lang="ru-RU" smtClean="0"/>
-              <a:t>6</a:t>
+              <a:t>7</a:t>
             </a:fld>
             <a:endParaRPr lang="ru-RU"/>
           </a:p>
@@ -14358,157 +14794,6 @@
 </p:sld>
 </file>
 
-<file path=ppt/slides/slide7.xml><?xml version="1.0" encoding="utf-8"?>
-<p:sld xmlns:a="http://schemas.openxmlformats.org/drawingml/2006/main" xmlns:r="http://schemas.openxmlformats.org/officeDocument/2006/relationships" xmlns:p="http://schemas.openxmlformats.org/presentationml/2006/main">
-  <p:cSld>
-    <p:spTree>
-      <p:nvGrpSpPr>
-        <p:cNvPr id="1" name=""/>
-        <p:cNvGrpSpPr/>
-        <p:nvPr/>
-      </p:nvGrpSpPr>
-      <p:grpSpPr>
-        <a:xfrm>
-          <a:off x="0" y="0"/>
-          <a:ext cx="0" cy="0"/>
-          <a:chOff x="0" y="0"/>
-          <a:chExt cx="0" cy="0"/>
-        </a:xfrm>
-      </p:grpSpPr>
-      <p:pic>
-        <p:nvPicPr>
-          <p:cNvPr id="10" name="Picture 9">
-            <a:extLst>
-              <a:ext uri="{FF2B5EF4-FFF2-40B4-BE49-F238E27FC236}">
-                <a16:creationId xmlns:a16="http://schemas.microsoft.com/office/drawing/2014/main" id="{0C02C336-5E7C-FC45-BFBC-ABA2B309FDC4}"/>
-              </a:ext>
-            </a:extLst>
-          </p:cNvPr>
-          <p:cNvPicPr>
-            <a:picLocks noChangeAspect="1"/>
-          </p:cNvPicPr>
-          <p:nvPr/>
-        </p:nvPicPr>
-        <p:blipFill rotWithShape="1">
-          <a:blip r:embed="rId3">
-            <a:extLst>
-              <a:ext uri="{28A0092B-C50C-407E-A947-70E740481C1C}">
-                <a14:useLocalDpi xmlns:a14="http://schemas.microsoft.com/office/drawing/2010/main" val="0"/>
-              </a:ext>
-            </a:extLst>
-          </a:blip>
-          <a:srcRect l="12734" t="11879" r="10270" b="10854"/>
-          <a:stretch/>
-        </p:blipFill>
-        <p:spPr>
-          <a:xfrm>
-            <a:off x="838200" y="1325563"/>
-            <a:ext cx="10292776" cy="5164420"/>
-          </a:xfrm>
-          <a:prstGeom prst="rect">
-            <a:avLst/>
-          </a:prstGeom>
-        </p:spPr>
-      </p:pic>
-      <p:sp>
-        <p:nvSpPr>
-          <p:cNvPr id="2" name="Заголовок 1">
-            <a:extLst>
-              <a:ext uri="{FF2B5EF4-FFF2-40B4-BE49-F238E27FC236}">
-                <a16:creationId xmlns:a16="http://schemas.microsoft.com/office/drawing/2014/main" id="{A8A78197-F0E5-482A-9DF3-DA7661662131}"/>
-              </a:ext>
-            </a:extLst>
-          </p:cNvPr>
-          <p:cNvSpPr>
-            <a:spLocks noGrp="1"/>
-          </p:cNvSpPr>
-          <p:nvPr>
-            <p:ph type="title"/>
-          </p:nvPr>
-        </p:nvSpPr>
-        <p:spPr>
-          <a:xfrm>
-            <a:off x="838200" y="0"/>
-            <a:ext cx="10515600" cy="1325563"/>
-          </a:xfrm>
-        </p:spPr>
-        <p:txBody>
-          <a:bodyPr/>
-          <a:lstStyle/>
-          <a:p>
-            <a:pPr algn="ctr"/>
-            <a:r>
-              <a:rPr lang="ru-RU" dirty="0">
-                <a:latin typeface="Times New Roman" panose="02020603050405020304" pitchFamily="18" charset="0"/>
-                <a:cs typeface="Times New Roman" panose="02020603050405020304" pitchFamily="18" charset="0"/>
-              </a:rPr>
-              <a:t>Анализ собранных данных,</a:t>
-            </a:r>
-            <a:br>
-              <a:rPr lang="ru-RU" dirty="0">
-                <a:latin typeface="Times New Roman" panose="02020603050405020304" pitchFamily="18" charset="0"/>
-                <a:cs typeface="Times New Roman" panose="02020603050405020304" pitchFamily="18" charset="0"/>
-              </a:rPr>
-            </a:br>
-            <a:r>
-              <a:rPr lang="ru-RU" dirty="0" err="1">
-                <a:latin typeface="Times New Roman" panose="02020603050405020304" pitchFamily="18" charset="0"/>
-                <a:cs typeface="Times New Roman" panose="02020603050405020304" pitchFamily="18" charset="0"/>
-              </a:rPr>
-              <a:t>несуицидальные</a:t>
-            </a:r>
-            <a:r>
-              <a:rPr lang="ru-RU" dirty="0">
-                <a:latin typeface="Times New Roman" panose="02020603050405020304" pitchFamily="18" charset="0"/>
-                <a:cs typeface="Times New Roman" panose="02020603050405020304" pitchFamily="18" charset="0"/>
-              </a:rPr>
-              <a:t> сообщения</a:t>
-            </a:r>
-          </a:p>
-        </p:txBody>
-      </p:sp>
-      <p:sp>
-        <p:nvSpPr>
-          <p:cNvPr id="3" name="Номер слайда 2">
-            <a:extLst>
-              <a:ext uri="{FF2B5EF4-FFF2-40B4-BE49-F238E27FC236}">
-                <a16:creationId xmlns:a16="http://schemas.microsoft.com/office/drawing/2014/main" id="{18D02FDB-6FC5-443A-AD14-3C8B3AC22A63}"/>
-              </a:ext>
-            </a:extLst>
-          </p:cNvPr>
-          <p:cNvSpPr>
-            <a:spLocks noGrp="1"/>
-          </p:cNvSpPr>
-          <p:nvPr>
-            <p:ph type="sldNum" sz="quarter" idx="12"/>
-          </p:nvPr>
-        </p:nvSpPr>
-        <p:spPr/>
-        <p:txBody>
-          <a:bodyPr/>
-          <a:lstStyle/>
-          <a:p>
-            <a:fld id="{5AEE0CB1-1A0F-4E9F-8383-D0A68518B020}" type="slidenum">
-              <a:rPr lang="ru-RU" smtClean="0"/>
-              <a:t>7</a:t>
-            </a:fld>
-            <a:endParaRPr lang="ru-RU"/>
-          </a:p>
-        </p:txBody>
-      </p:sp>
-    </p:spTree>
-    <p:extLst>
-      <p:ext uri="{BB962C8B-B14F-4D97-AF65-F5344CB8AC3E}">
-        <p14:creationId xmlns:p14="http://schemas.microsoft.com/office/powerpoint/2010/main" val="1123937863"/>
-      </p:ext>
-    </p:extLst>
-  </p:cSld>
-  <p:clrMapOvr>
-    <a:masterClrMapping/>
-  </p:clrMapOvr>
-</p:sld>
-</file>
-
 <file path=ppt/slides/slide8.xml><?xml version="1.0" encoding="utf-8"?>
 <p:sld xmlns:a="http://schemas.openxmlformats.org/drawingml/2006/main" xmlns:r="http://schemas.openxmlformats.org/officeDocument/2006/relationships" xmlns:p="http://schemas.openxmlformats.org/presentationml/2006/main">
   <p:cSld>
@@ -14558,7 +14843,7 @@
                 <a:latin typeface="Times New Roman" panose="02020603050405020304" pitchFamily="18" charset="0"/>
                 <a:cs typeface="Times New Roman" panose="02020603050405020304" pitchFamily="18" charset="0"/>
               </a:rPr>
-              <a:t>Анализ собранных данных, </a:t>
+              <a:t>Анализ собранных данных,</a:t>
             </a:r>
             <a:br>
               <a:rPr lang="ru-RU" dirty="0">
@@ -14607,10 +14892,10 @@
       </p:sp>
       <p:pic>
         <p:nvPicPr>
-          <p:cNvPr id="8" name="Picture 7">
+          <p:cNvPr id="5" name="Picture 4">
             <a:extLst>
               <a:ext uri="{FF2B5EF4-FFF2-40B4-BE49-F238E27FC236}">
-                <a16:creationId xmlns:a16="http://schemas.microsoft.com/office/drawing/2014/main" id="{5EC7F5C9-B468-5749-88C3-DAD0B3C7C4C7}"/>
+                <a16:creationId xmlns:a16="http://schemas.microsoft.com/office/drawing/2014/main" id="{4FAF52CD-6C61-544C-A80E-3BCCBD5584D8}"/>
               </a:ext>
             </a:extLst>
           </p:cNvPr>
@@ -14643,7 +14928,7 @@
     </p:spTree>
     <p:extLst>
       <p:ext uri="{BB962C8B-B14F-4D97-AF65-F5344CB8AC3E}">
-        <p14:creationId xmlns:p14="http://schemas.microsoft.com/office/powerpoint/2010/main" val="3623760049"/>
+        <p14:creationId xmlns:p14="http://schemas.microsoft.com/office/powerpoint/2010/main" val="1123937863"/>
       </p:ext>
     </p:extLst>
   </p:cSld>
@@ -14670,6 +14955,41 @@
           <a:chExt cx="0" cy="0"/>
         </a:xfrm>
       </p:grpSpPr>
+      <p:pic>
+        <p:nvPicPr>
+          <p:cNvPr id="5" name="Picture 4">
+            <a:extLst>
+              <a:ext uri="{FF2B5EF4-FFF2-40B4-BE49-F238E27FC236}">
+                <a16:creationId xmlns:a16="http://schemas.microsoft.com/office/drawing/2014/main" id="{6CB4D1BA-EE1D-E946-B0C6-0199E3CAD63D}"/>
+              </a:ext>
+            </a:extLst>
+          </p:cNvPr>
+          <p:cNvPicPr>
+            <a:picLocks noChangeAspect="1"/>
+          </p:cNvPicPr>
+          <p:nvPr/>
+        </p:nvPicPr>
+        <p:blipFill rotWithShape="1">
+          <a:blip r:embed="rId3">
+            <a:extLst>
+              <a:ext uri="{28A0092B-C50C-407E-A947-70E740481C1C}">
+                <a14:useLocalDpi xmlns:a14="http://schemas.microsoft.com/office/drawing/2010/main" val="0"/>
+              </a:ext>
+            </a:extLst>
+          </a:blip>
+          <a:srcRect l="12734" t="11879" r="10270" b="10854"/>
+          <a:stretch/>
+        </p:blipFill>
+        <p:spPr>
+          <a:xfrm>
+            <a:off x="838200" y="1325563"/>
+            <a:ext cx="10292776" cy="5164420"/>
+          </a:xfrm>
+          <a:prstGeom prst="rect">
+            <a:avLst/>
+          </a:prstGeom>
+        </p:spPr>
+      </p:pic>
       <p:sp>
         <p:nvSpPr>
           <p:cNvPr id="2" name="Заголовок 1">
@@ -14702,7 +15022,27 @@
                 <a:latin typeface="Times New Roman" panose="02020603050405020304" pitchFamily="18" charset="0"/>
                 <a:cs typeface="Times New Roman" panose="02020603050405020304" pitchFamily="18" charset="0"/>
               </a:rPr>
-              <a:t>Схема программного обеспечения</a:t>
+              <a:t>Анализ собранных данных, </a:t>
+            </a:r>
+            <a:br>
+              <a:rPr lang="ru-RU" dirty="0">
+                <a:latin typeface="Times New Roman" panose="02020603050405020304" pitchFamily="18" charset="0"/>
+                <a:cs typeface="Times New Roman" panose="02020603050405020304" pitchFamily="18" charset="0"/>
+              </a:rPr>
+            </a:br>
+            <a:r>
+              <a:rPr lang="ru-RU" dirty="0" err="1">
+                <a:latin typeface="Times New Roman" panose="02020603050405020304" pitchFamily="18" charset="0"/>
+                <a:cs typeface="Times New Roman" panose="02020603050405020304" pitchFamily="18" charset="0"/>
+              </a:rPr>
+              <a:t>несуицидальные</a:t>
+            </a:r>
+            <a:r>
+              <a:rPr lang="ru-RU" dirty="0">
+                <a:latin typeface="Times New Roman" panose="02020603050405020304" pitchFamily="18" charset="0"/>
+                <a:cs typeface="Times New Roman" panose="02020603050405020304" pitchFamily="18" charset="0"/>
+              </a:rPr>
+              <a:t> сообщения</a:t>
             </a:r>
           </a:p>
         </p:txBody>
@@ -14736,46 +15076,10 @@
           </a:p>
         </p:txBody>
       </p:sp>
-      <p:pic>
-        <p:nvPicPr>
-          <p:cNvPr id="6" name="Picture 5">
-            <a:extLst>
-              <a:ext uri="{FF2B5EF4-FFF2-40B4-BE49-F238E27FC236}">
-                <a16:creationId xmlns:a16="http://schemas.microsoft.com/office/drawing/2014/main" id="{F951B97C-B6FC-1048-BADD-7FD650B8246C}"/>
-              </a:ext>
-            </a:extLst>
-          </p:cNvPr>
-          <p:cNvPicPr>
-            <a:picLocks noChangeAspect="1"/>
-          </p:cNvPicPr>
-          <p:nvPr/>
-        </p:nvPicPr>
-        <p:blipFill>
-          <a:blip r:embed="rId3">
-            <a:extLst>
-              <a:ext uri="{28A0092B-C50C-407E-A947-70E740481C1C}">
-                <a14:useLocalDpi xmlns:a14="http://schemas.microsoft.com/office/drawing/2010/main" val="0"/>
-              </a:ext>
-            </a:extLst>
-          </a:blip>
-          <a:stretch>
-            <a:fillRect/>
-          </a:stretch>
-        </p:blipFill>
-        <p:spPr>
-          <a:xfrm>
-            <a:off x="1489235" y="1005631"/>
-            <a:ext cx="9213530" cy="5811229"/>
-          </a:xfrm>
-          <a:prstGeom prst="rect">
-            <a:avLst/>
-          </a:prstGeom>
-        </p:spPr>
-      </p:pic>
     </p:spTree>
     <p:extLst>
       <p:ext uri="{BB962C8B-B14F-4D97-AF65-F5344CB8AC3E}">
-        <p14:creationId xmlns:p14="http://schemas.microsoft.com/office/powerpoint/2010/main" val="3624538576"/>
+        <p14:creationId xmlns:p14="http://schemas.microsoft.com/office/powerpoint/2010/main" val="3623760049"/>
       </p:ext>
     </p:extLst>
   </p:cSld>

</xml_diff>

<commit_message>
ADD: I HAVE STOMACH
</commit_message>
<xml_diff>
--- a/iWannaNote/iHatePresentations/presentation.pptx
+++ b/iWannaNote/iHatePresentations/presentation.pptx
@@ -13326,58 +13326,6 @@
                 <a:latin typeface="Times New Roman" panose="02020603050405020304" pitchFamily="18" charset="0"/>
                 <a:cs typeface="Times New Roman" panose="02020603050405020304" pitchFamily="18" charset="0"/>
               </a:rPr>
-              <a:t>Искусственный интеллект и </a:t>
-            </a:r>
-            <a:r>
-              <a:rPr lang="ru-RU" dirty="0" err="1">
-                <a:latin typeface="Times New Roman" panose="02020603050405020304" pitchFamily="18" charset="0"/>
-                <a:cs typeface="Times New Roman" panose="02020603050405020304" pitchFamily="18" charset="0"/>
-              </a:rPr>
-              <a:t>суицидология</a:t>
-            </a:r>
-            <a:endParaRPr lang="ru-RU" dirty="0">
-              <a:latin typeface="Times New Roman" panose="02020603050405020304" pitchFamily="18" charset="0"/>
-              <a:cs typeface="Times New Roman" panose="02020603050405020304" pitchFamily="18" charset="0"/>
-            </a:endParaRPr>
-          </a:p>
-        </p:txBody>
-      </p:sp>
-      <p:sp>
-        <p:nvSpPr>
-          <p:cNvPr id="3" name="Объект 2">
-            <a:extLst>
-              <a:ext uri="{FF2B5EF4-FFF2-40B4-BE49-F238E27FC236}">
-                <a16:creationId xmlns:a16="http://schemas.microsoft.com/office/drawing/2014/main" id="{4326DA48-DB22-4385-B4DB-57824046568A}"/>
-              </a:ext>
-            </a:extLst>
-          </p:cNvPr>
-          <p:cNvSpPr>
-            <a:spLocks noGrp="1"/>
-          </p:cNvSpPr>
-          <p:nvPr>
-            <p:ph idx="1"/>
-          </p:nvPr>
-        </p:nvSpPr>
-        <p:spPr>
-          <a:xfrm>
-            <a:off x="838200" y="1825625"/>
-            <a:ext cx="6512442" cy="4351338"/>
-          </a:xfrm>
-        </p:spPr>
-        <p:txBody>
-          <a:bodyPr>
-            <a:normAutofit/>
-          </a:bodyPr>
-          <a:lstStyle/>
-          <a:p>
-            <a:pPr marL="0" indent="0" algn="just">
-              <a:buNone/>
-            </a:pPr>
-            <a:r>
-              <a:rPr lang="ru-RU" dirty="0">
-                <a:latin typeface="Times New Roman" panose="02020603050405020304" pitchFamily="18" charset="0"/>
-                <a:cs typeface="Times New Roman" panose="02020603050405020304" pitchFamily="18" charset="0"/>
-              </a:rPr>
               <a:t>Разработки, задействованные в сфере </a:t>
             </a:r>
             <a:r>
@@ -13387,58 +13335,6 @@
               </a:rPr>
               <a:t>суицидологии</a:t>
             </a:r>
-            <a:r>
-              <a:rPr lang="ru-RU" dirty="0">
-                <a:latin typeface="Times New Roman" panose="02020603050405020304" pitchFamily="18" charset="0"/>
-                <a:cs typeface="Times New Roman" panose="02020603050405020304" pitchFamily="18" charset="0"/>
-              </a:rPr>
-              <a:t>:</a:t>
-            </a:r>
-          </a:p>
-          <a:p>
-            <a:pPr marL="514350" indent="-514350" algn="just">
-              <a:buAutoNum type="arabicPeriod"/>
-            </a:pPr>
-            <a:r>
-              <a:rPr lang="en-US" dirty="0">
-                <a:latin typeface="Times New Roman" panose="02020603050405020304" pitchFamily="18" charset="0"/>
-                <a:cs typeface="Times New Roman" panose="02020603050405020304" pitchFamily="18" charset="0"/>
-              </a:rPr>
-              <a:t>Facebook AI</a:t>
-            </a:r>
-          </a:p>
-          <a:p>
-            <a:pPr marL="514350" indent="-514350" algn="just">
-              <a:buAutoNum type="arabicPeriod"/>
-            </a:pPr>
-            <a:r>
-              <a:rPr lang="en-US" dirty="0">
-                <a:latin typeface="Times New Roman" panose="02020603050405020304" pitchFamily="18" charset="0"/>
-                <a:cs typeface="Times New Roman" panose="02020603050405020304" pitchFamily="18" charset="0"/>
-              </a:rPr>
-              <a:t>Dostoevsky</a:t>
-            </a:r>
-          </a:p>
-          <a:p>
-            <a:pPr marL="514350" indent="-514350" algn="just">
-              <a:buAutoNum type="arabicPeriod"/>
-            </a:pPr>
-            <a:r>
-              <a:rPr lang="en-US" dirty="0" err="1">
-                <a:latin typeface="Times New Roman" panose="02020603050405020304" pitchFamily="18" charset="0"/>
-                <a:cs typeface="Times New Roman" panose="02020603050405020304" pitchFamily="18" charset="0"/>
-              </a:rPr>
-              <a:t>ChatGPT</a:t>
-            </a:r>
-            <a:endParaRPr lang="ru-RU" dirty="0">
-              <a:latin typeface="Times New Roman" panose="02020603050405020304" pitchFamily="18" charset="0"/>
-              <a:cs typeface="Times New Roman" panose="02020603050405020304" pitchFamily="18" charset="0"/>
-            </a:endParaRPr>
-          </a:p>
-          <a:p>
-            <a:pPr marL="0" indent="0" algn="just">
-              <a:buNone/>
-            </a:pPr>
             <a:endParaRPr lang="ru-RU" dirty="0">
               <a:latin typeface="Times New Roman" panose="02020603050405020304" pitchFamily="18" charset="0"/>
               <a:cs typeface="Times New Roman" panose="02020603050405020304" pitchFamily="18" charset="0"/>
@@ -13504,7 +13400,7 @@
         </p:blipFill>
         <p:spPr bwMode="auto">
           <a:xfrm>
-            <a:off x="9448951" y="1332633"/>
+            <a:off x="9274595" y="1358671"/>
             <a:ext cx="2743049" cy="2668661"/>
           </a:xfrm>
           <a:prstGeom prst="rect">
@@ -13551,8 +13447,8 @@
         </p:blipFill>
         <p:spPr bwMode="auto">
           <a:xfrm>
-            <a:off x="7065466" y="3429000"/>
-            <a:ext cx="2668661" cy="2668661"/>
+            <a:off x="9477798" y="4019706"/>
+            <a:ext cx="2336644" cy="2336644"/>
           </a:xfrm>
           <a:prstGeom prst="rect">
             <a:avLst/>
@@ -13569,6 +13465,1046 @@
           </a:extLst>
         </p:spPr>
       </p:pic>
+      <p:graphicFrame>
+        <p:nvGraphicFramePr>
+          <p:cNvPr id="6" name="Table 5">
+            <a:extLst>
+              <a:ext uri="{FF2B5EF4-FFF2-40B4-BE49-F238E27FC236}">
+                <a16:creationId xmlns:a16="http://schemas.microsoft.com/office/drawing/2014/main" id="{9F0F0FE0-D36E-F542-B106-008FF619B77F}"/>
+              </a:ext>
+            </a:extLst>
+          </p:cNvPr>
+          <p:cNvGraphicFramePr>
+            <a:graphicFrameLocks noGrp="1"/>
+          </p:cNvGraphicFramePr>
+          <p:nvPr>
+            <p:extLst>
+              <p:ext uri="{D42A27DB-BD31-4B8C-83A1-F6EECF244321}">
+                <p14:modId xmlns:p14="http://schemas.microsoft.com/office/powerpoint/2010/main" val="433947038"/>
+              </p:ext>
+            </p:extLst>
+          </p:nvPr>
+        </p:nvGraphicFramePr>
+        <p:xfrm>
+          <a:off x="560070" y="1888361"/>
+          <a:ext cx="8664993" cy="4726998"/>
+        </p:xfrm>
+        <a:graphic>
+          <a:graphicData uri="http://schemas.openxmlformats.org/drawingml/2006/table">
+            <a:tbl>
+              <a:tblPr firstRow="1" bandRow="1">
+                <a:effectLst>
+                  <a:innerShdw blurRad="63500" dist="50800" dir="13500000">
+                    <a:prstClr val="black">
+                      <a:alpha val="50000"/>
+                    </a:prstClr>
+                  </a:innerShdw>
+                </a:effectLst>
+                <a:tableStyleId>{5940675A-B579-460E-94D1-54222C63F5DA}</a:tableStyleId>
+              </a:tblPr>
+              <a:tblGrid>
+                <a:gridCol w="2114550">
+                  <a:extLst>
+                    <a:ext uri="{9D8B030D-6E8A-4147-A177-3AD203B41FA5}">
+                      <a16:colId xmlns:a16="http://schemas.microsoft.com/office/drawing/2014/main" val="3889561718"/>
+                    </a:ext>
+                  </a:extLst>
+                </a:gridCol>
+                <a:gridCol w="3662112">
+                  <a:extLst>
+                    <a:ext uri="{9D8B030D-6E8A-4147-A177-3AD203B41FA5}">
+                      <a16:colId xmlns:a16="http://schemas.microsoft.com/office/drawing/2014/main" val="619299706"/>
+                    </a:ext>
+                  </a:extLst>
+                </a:gridCol>
+                <a:gridCol w="2888331">
+                  <a:extLst>
+                    <a:ext uri="{9D8B030D-6E8A-4147-A177-3AD203B41FA5}">
+                      <a16:colId xmlns:a16="http://schemas.microsoft.com/office/drawing/2014/main" val="355849931"/>
+                    </a:ext>
+                  </a:extLst>
+                </a:gridCol>
+              </a:tblGrid>
+              <a:tr h="1067579">
+                <a:tc>
+                  <a:txBody>
+                    <a:bodyPr/>
+                    <a:lstStyle/>
+                    <a:p>
+                      <a:pPr algn="ctr"/>
+                      <a:r>
+                        <a:rPr lang="ru-RU" sz="2000" dirty="0">
+                          <a:latin typeface="Times New Roman" panose="02020603050405020304" pitchFamily="18" charset="0"/>
+                          <a:cs typeface="Times New Roman" panose="02020603050405020304" pitchFamily="18" charset="0"/>
+                        </a:rPr>
+                        <a:t>Наименование</a:t>
+                      </a:r>
+                    </a:p>
+                  </a:txBody>
+                  <a:tcPr>
+                    <a:lnL w="57150" cap="flat" cmpd="sng" algn="ctr">
+                      <a:solidFill>
+                        <a:schemeClr val="tx1"/>
+                      </a:solidFill>
+                      <a:prstDash val="solid"/>
+                      <a:round/>
+                      <a:headEnd type="none" w="med" len="med"/>
+                      <a:tailEnd type="none" w="med" len="med"/>
+                    </a:lnL>
+                    <a:lnT w="57150" cap="flat" cmpd="sng" algn="ctr">
+                      <a:solidFill>
+                        <a:schemeClr val="tx1"/>
+                      </a:solidFill>
+                      <a:prstDash val="solid"/>
+                      <a:round/>
+                      <a:headEnd type="none" w="med" len="med"/>
+                      <a:tailEnd type="none" w="med" len="med"/>
+                    </a:lnT>
+                    <a:lnB w="57150" cap="flat" cmpd="sng" algn="ctr">
+                      <a:solidFill>
+                        <a:schemeClr val="tx1"/>
+                      </a:solidFill>
+                      <a:prstDash val="solid"/>
+                      <a:round/>
+                      <a:headEnd type="none" w="med" len="med"/>
+                      <a:tailEnd type="none" w="med" len="med"/>
+                    </a:lnB>
+                  </a:tcPr>
+                </a:tc>
+                <a:tc>
+                  <a:txBody>
+                    <a:bodyPr/>
+                    <a:lstStyle/>
+                    <a:p>
+                      <a:pPr algn="ctr"/>
+                      <a:r>
+                        <a:rPr lang="ru-RU" sz="2000" dirty="0">
+                          <a:latin typeface="Times New Roman" panose="02020603050405020304" pitchFamily="18" charset="0"/>
+                          <a:cs typeface="Times New Roman" panose="02020603050405020304" pitchFamily="18" charset="0"/>
+                        </a:rPr>
+                        <a:t>Достоинства</a:t>
+                      </a:r>
+                      <a:endParaRPr lang="en-RU" sz="2000" dirty="0">
+                        <a:latin typeface="Times New Roman" panose="02020603050405020304" pitchFamily="18" charset="0"/>
+                        <a:cs typeface="Times New Roman" panose="02020603050405020304" pitchFamily="18" charset="0"/>
+                      </a:endParaRPr>
+                    </a:p>
+                  </a:txBody>
+                  <a:tcPr>
+                    <a:lnT w="57150" cap="flat" cmpd="sng" algn="ctr">
+                      <a:solidFill>
+                        <a:schemeClr val="tx1"/>
+                      </a:solidFill>
+                      <a:prstDash val="solid"/>
+                      <a:round/>
+                      <a:headEnd type="none" w="med" len="med"/>
+                      <a:tailEnd type="none" w="med" len="med"/>
+                    </a:lnT>
+                    <a:lnB w="57150" cap="flat" cmpd="sng" algn="ctr">
+                      <a:solidFill>
+                        <a:schemeClr val="tx1"/>
+                      </a:solidFill>
+                      <a:prstDash val="solid"/>
+                      <a:round/>
+                      <a:headEnd type="none" w="med" len="med"/>
+                      <a:tailEnd type="none" w="med" len="med"/>
+                    </a:lnB>
+                    <a:solidFill>
+                      <a:schemeClr val="accent6">
+                        <a:lumMod val="60000"/>
+                        <a:lumOff val="40000"/>
+                      </a:schemeClr>
+                    </a:solidFill>
+                  </a:tcPr>
+                </a:tc>
+                <a:tc>
+                  <a:txBody>
+                    <a:bodyPr/>
+                    <a:lstStyle/>
+                    <a:p>
+                      <a:pPr algn="ctr"/>
+                      <a:r>
+                        <a:rPr lang="ru-RU" sz="2000" dirty="0">
+                          <a:latin typeface="Times New Roman" panose="02020603050405020304" pitchFamily="18" charset="0"/>
+                          <a:cs typeface="Times New Roman" panose="02020603050405020304" pitchFamily="18" charset="0"/>
+                        </a:rPr>
+                        <a:t>Недостатки</a:t>
+                      </a:r>
+                      <a:endParaRPr lang="en-RU" sz="2000" dirty="0">
+                        <a:latin typeface="Times New Roman" panose="02020603050405020304" pitchFamily="18" charset="0"/>
+                        <a:cs typeface="Times New Roman" panose="02020603050405020304" pitchFamily="18" charset="0"/>
+                      </a:endParaRPr>
+                    </a:p>
+                  </a:txBody>
+                  <a:tcPr>
+                    <a:lnR w="57150" cap="flat" cmpd="sng" algn="ctr">
+                      <a:solidFill>
+                        <a:schemeClr val="tx1"/>
+                      </a:solidFill>
+                      <a:prstDash val="solid"/>
+                      <a:round/>
+                      <a:headEnd type="none" w="med" len="med"/>
+                      <a:tailEnd type="none" w="med" len="med"/>
+                    </a:lnR>
+                    <a:lnT w="57150" cap="flat" cmpd="sng" algn="ctr">
+                      <a:solidFill>
+                        <a:schemeClr val="tx1"/>
+                      </a:solidFill>
+                      <a:prstDash val="solid"/>
+                      <a:round/>
+                      <a:headEnd type="none" w="med" len="med"/>
+                      <a:tailEnd type="none" w="med" len="med"/>
+                    </a:lnT>
+                    <a:lnB w="57150" cap="flat" cmpd="sng" algn="ctr">
+                      <a:solidFill>
+                        <a:schemeClr val="tx1"/>
+                      </a:solidFill>
+                      <a:prstDash val="solid"/>
+                      <a:round/>
+                      <a:headEnd type="none" w="med" len="med"/>
+                      <a:tailEnd type="none" w="med" len="med"/>
+                    </a:lnB>
+                    <a:solidFill>
+                      <a:schemeClr val="accent2">
+                        <a:lumMod val="60000"/>
+                        <a:lumOff val="40000"/>
+                      </a:schemeClr>
+                    </a:solidFill>
+                  </a:tcPr>
+                </a:tc>
+                <a:extLst>
+                  <a:ext uri="{0D108BD9-81ED-4DB2-BD59-A6C34878D82A}">
+                    <a16:rowId xmlns:a16="http://schemas.microsoft.com/office/drawing/2014/main" val="2783782138"/>
+                  </a:ext>
+                </a:extLst>
+              </a:tr>
+              <a:tr h="411610">
+                <a:tc rowSpan="4">
+                  <a:txBody>
+                    <a:bodyPr/>
+                    <a:lstStyle/>
+                    <a:p>
+                      <a:r>
+                        <a:rPr lang="en-US" sz="2000" dirty="0">
+                          <a:latin typeface="Times New Roman" panose="02020603050405020304" pitchFamily="18" charset="0"/>
+                          <a:cs typeface="Times New Roman" panose="02020603050405020304" pitchFamily="18" charset="0"/>
+                        </a:rPr>
+                        <a:t>Facebook AI</a:t>
+                      </a:r>
+                      <a:endParaRPr lang="ru-RU" sz="2000" dirty="0">
+                        <a:latin typeface="Times New Roman" panose="02020603050405020304" pitchFamily="18" charset="0"/>
+                        <a:cs typeface="Times New Roman" panose="02020603050405020304" pitchFamily="18" charset="0"/>
+                      </a:endParaRPr>
+                    </a:p>
+                  </a:txBody>
+                  <a:tcPr>
+                    <a:lnL w="57150" cap="flat" cmpd="sng" algn="ctr">
+                      <a:solidFill>
+                        <a:schemeClr val="tx1"/>
+                      </a:solidFill>
+                      <a:prstDash val="solid"/>
+                      <a:round/>
+                      <a:headEnd type="none" w="med" len="med"/>
+                      <a:tailEnd type="none" w="med" len="med"/>
+                    </a:lnL>
+                    <a:lnT w="57150" cap="flat" cmpd="sng" algn="ctr">
+                      <a:solidFill>
+                        <a:schemeClr val="tx1"/>
+                      </a:solidFill>
+                      <a:prstDash val="solid"/>
+                      <a:round/>
+                      <a:headEnd type="none" w="med" len="med"/>
+                      <a:tailEnd type="none" w="med" len="med"/>
+                    </a:lnT>
+                    <a:lnB w="57150" cap="flat" cmpd="sng" algn="ctr">
+                      <a:solidFill>
+                        <a:schemeClr val="tx1"/>
+                      </a:solidFill>
+                      <a:prstDash val="solid"/>
+                      <a:round/>
+                      <a:headEnd type="none" w="med" len="med"/>
+                      <a:tailEnd type="none" w="med" len="med"/>
+                    </a:lnB>
+                  </a:tcPr>
+                </a:tc>
+                <a:tc rowSpan="2">
+                  <a:txBody>
+                    <a:bodyPr/>
+                    <a:lstStyle/>
+                    <a:p>
+                      <a:pPr marL="0" indent="0">
+                        <a:buNone/>
+                      </a:pPr>
+                      <a:r>
+                        <a:rPr lang="ru-RU" sz="2000" dirty="0">
+                          <a:latin typeface="Times New Roman" panose="02020603050405020304" pitchFamily="18" charset="0"/>
+                          <a:cs typeface="Times New Roman" panose="02020603050405020304" pitchFamily="18" charset="0"/>
+                        </a:rPr>
+                        <a:t>Автоматизированное средство</a:t>
+                      </a:r>
+                    </a:p>
+                  </a:txBody>
+                  <a:tcPr>
+                    <a:lnT w="57150" cap="flat" cmpd="sng" algn="ctr">
+                      <a:solidFill>
+                        <a:schemeClr val="tx1"/>
+                      </a:solidFill>
+                      <a:prstDash val="solid"/>
+                      <a:round/>
+                      <a:headEnd type="none" w="med" len="med"/>
+                      <a:tailEnd type="none" w="med" len="med"/>
+                    </a:lnT>
+                    <a:lnB w="12700" cap="flat" cmpd="sng" algn="ctr">
+                      <a:solidFill>
+                        <a:schemeClr val="tx1"/>
+                      </a:solidFill>
+                      <a:prstDash val="solid"/>
+                      <a:round/>
+                      <a:headEnd type="none" w="med" len="med"/>
+                      <a:tailEnd type="none" w="med" len="med"/>
+                    </a:lnB>
+                    <a:solidFill>
+                      <a:schemeClr val="accent6">
+                        <a:lumMod val="60000"/>
+                        <a:lumOff val="40000"/>
+                      </a:schemeClr>
+                    </a:solidFill>
+                  </a:tcPr>
+                </a:tc>
+                <a:tc>
+                  <a:txBody>
+                    <a:bodyPr/>
+                    <a:lstStyle/>
+                    <a:p>
+                      <a:r>
+                        <a:rPr lang="ru-RU" sz="2000" dirty="0">
+                          <a:latin typeface="Times New Roman" panose="02020603050405020304" pitchFamily="18" charset="0"/>
+                          <a:cs typeface="Times New Roman" panose="02020603050405020304" pitchFamily="18" charset="0"/>
+                        </a:rPr>
+                        <a:t>Закрытый исходный код</a:t>
+                      </a:r>
+                      <a:endParaRPr lang="en-RU" sz="2000" dirty="0">
+                        <a:latin typeface="Times New Roman" panose="02020603050405020304" pitchFamily="18" charset="0"/>
+                        <a:cs typeface="Times New Roman" panose="02020603050405020304" pitchFamily="18" charset="0"/>
+                      </a:endParaRPr>
+                    </a:p>
+                  </a:txBody>
+                  <a:tcPr>
+                    <a:lnR w="57150" cap="flat" cmpd="sng" algn="ctr">
+                      <a:solidFill>
+                        <a:schemeClr val="tx1"/>
+                      </a:solidFill>
+                      <a:prstDash val="solid"/>
+                      <a:round/>
+                      <a:headEnd type="none" w="med" len="med"/>
+                      <a:tailEnd type="none" w="med" len="med"/>
+                    </a:lnR>
+                    <a:lnT w="57150" cap="flat" cmpd="sng" algn="ctr">
+                      <a:solidFill>
+                        <a:schemeClr val="tx1"/>
+                      </a:solidFill>
+                      <a:prstDash val="solid"/>
+                      <a:round/>
+                      <a:headEnd type="none" w="med" len="med"/>
+                      <a:tailEnd type="none" w="med" len="med"/>
+                    </a:lnT>
+                    <a:lnB w="12700" cap="flat" cmpd="sng" algn="ctr">
+                      <a:solidFill>
+                        <a:schemeClr val="tx1"/>
+                      </a:solidFill>
+                      <a:prstDash val="solid"/>
+                      <a:round/>
+                      <a:headEnd type="none" w="med" len="med"/>
+                      <a:tailEnd type="none" w="med" len="med"/>
+                    </a:lnB>
+                    <a:solidFill>
+                      <a:schemeClr val="accent2">
+                        <a:lumMod val="60000"/>
+                        <a:lumOff val="40000"/>
+                      </a:schemeClr>
+                    </a:solidFill>
+                  </a:tcPr>
+                </a:tc>
+                <a:extLst>
+                  <a:ext uri="{0D108BD9-81ED-4DB2-BD59-A6C34878D82A}">
+                    <a16:rowId xmlns:a16="http://schemas.microsoft.com/office/drawing/2014/main" val="4179788428"/>
+                  </a:ext>
+                </a:extLst>
+              </a:tr>
+              <a:tr h="122180">
+                <a:tc vMerge="1">
+                  <a:txBody>
+                    <a:bodyPr/>
+                    <a:lstStyle/>
+                    <a:p>
+                      <a:endParaRPr lang="en-RU"/>
+                    </a:p>
+                  </a:txBody>
+                  <a:tcPr/>
+                </a:tc>
+                <a:tc vMerge="1">
+                  <a:txBody>
+                    <a:bodyPr/>
+                    <a:lstStyle/>
+                    <a:p>
+                      <a:endParaRPr lang="en-RU"/>
+                    </a:p>
+                  </a:txBody>
+                  <a:tcPr/>
+                </a:tc>
+                <a:tc rowSpan="2">
+                  <a:txBody>
+                    <a:bodyPr/>
+                    <a:lstStyle/>
+                    <a:p>
+                      <a:r>
+                        <a:rPr lang="ru-RU" sz="2000" dirty="0">
+                          <a:latin typeface="Times New Roman" panose="02020603050405020304" pitchFamily="18" charset="0"/>
+                          <a:cs typeface="Times New Roman" panose="02020603050405020304" pitchFamily="18" charset="0"/>
+                        </a:rPr>
+                        <a:t>Объект коммерческой тайны</a:t>
+                      </a:r>
+                      <a:endParaRPr lang="en-RU" sz="2000" dirty="0">
+                        <a:latin typeface="Times New Roman" panose="02020603050405020304" pitchFamily="18" charset="0"/>
+                        <a:cs typeface="Times New Roman" panose="02020603050405020304" pitchFamily="18" charset="0"/>
+                      </a:endParaRPr>
+                    </a:p>
+                  </a:txBody>
+                  <a:tcPr>
+                    <a:lnR w="57150" cap="flat" cmpd="sng" algn="ctr">
+                      <a:solidFill>
+                        <a:schemeClr val="tx1"/>
+                      </a:solidFill>
+                      <a:prstDash val="solid"/>
+                      <a:round/>
+                      <a:headEnd type="none" w="med" len="med"/>
+                      <a:tailEnd type="none" w="med" len="med"/>
+                    </a:lnR>
+                    <a:lnT w="12700" cap="flat" cmpd="sng" algn="ctr">
+                      <a:solidFill>
+                        <a:schemeClr val="tx1"/>
+                      </a:solidFill>
+                      <a:prstDash val="solid"/>
+                      <a:round/>
+                      <a:headEnd type="none" w="med" len="med"/>
+                      <a:tailEnd type="none" w="med" len="med"/>
+                    </a:lnT>
+                    <a:lnB w="12700" cap="flat" cmpd="sng" algn="ctr">
+                      <a:solidFill>
+                        <a:schemeClr val="tx1"/>
+                      </a:solidFill>
+                      <a:prstDash val="solid"/>
+                      <a:round/>
+                      <a:headEnd type="none" w="med" len="med"/>
+                      <a:tailEnd type="none" w="med" len="med"/>
+                    </a:lnB>
+                    <a:solidFill>
+                      <a:schemeClr val="accent2">
+                        <a:lumMod val="60000"/>
+                        <a:lumOff val="40000"/>
+                      </a:schemeClr>
+                    </a:solidFill>
+                  </a:tcPr>
+                </a:tc>
+                <a:extLst>
+                  <a:ext uri="{0D108BD9-81ED-4DB2-BD59-A6C34878D82A}">
+                    <a16:rowId xmlns:a16="http://schemas.microsoft.com/office/drawing/2014/main" val="271721013"/>
+                  </a:ext>
+                </a:extLst>
+              </a:tr>
+              <a:tr h="289430">
+                <a:tc vMerge="1">
+                  <a:txBody>
+                    <a:bodyPr/>
+                    <a:lstStyle/>
+                    <a:p>
+                      <a:endParaRPr lang="en-RU"/>
+                    </a:p>
+                  </a:txBody>
+                  <a:tcPr/>
+                </a:tc>
+                <a:tc rowSpan="2">
+                  <a:txBody>
+                    <a:bodyPr/>
+                    <a:lstStyle/>
+                    <a:p>
+                      <a:pPr marL="0" indent="0">
+                        <a:buNone/>
+                      </a:pPr>
+                      <a:r>
+                        <a:rPr lang="ru-RU" sz="2000" dirty="0">
+                          <a:latin typeface="Times New Roman" panose="02020603050405020304" pitchFamily="18" charset="0"/>
+                          <a:cs typeface="Times New Roman" panose="02020603050405020304" pitchFamily="18" charset="0"/>
+                        </a:rPr>
+                        <a:t>Обработка большого объема данных</a:t>
+                      </a:r>
+                    </a:p>
+                  </a:txBody>
+                  <a:tcPr>
+                    <a:lnT w="12700" cap="flat" cmpd="sng" algn="ctr">
+                      <a:solidFill>
+                        <a:schemeClr val="tx1"/>
+                      </a:solidFill>
+                      <a:prstDash val="solid"/>
+                      <a:round/>
+                      <a:headEnd type="none" w="med" len="med"/>
+                      <a:tailEnd type="none" w="med" len="med"/>
+                    </a:lnT>
+                    <a:lnB w="57150" cap="flat" cmpd="sng" algn="ctr">
+                      <a:solidFill>
+                        <a:schemeClr val="tx1"/>
+                      </a:solidFill>
+                      <a:prstDash val="solid"/>
+                      <a:round/>
+                      <a:headEnd type="none" w="med" len="med"/>
+                      <a:tailEnd type="none" w="med" len="med"/>
+                    </a:lnB>
+                    <a:solidFill>
+                      <a:schemeClr val="accent6">
+                        <a:lumMod val="60000"/>
+                        <a:lumOff val="40000"/>
+                      </a:schemeClr>
+                    </a:solidFill>
+                  </a:tcPr>
+                </a:tc>
+                <a:tc vMerge="1">
+                  <a:txBody>
+                    <a:bodyPr/>
+                    <a:lstStyle/>
+                    <a:p>
+                      <a:endParaRPr lang="en-RU"/>
+                    </a:p>
+                  </a:txBody>
+                  <a:tcPr/>
+                </a:tc>
+                <a:extLst>
+                  <a:ext uri="{0D108BD9-81ED-4DB2-BD59-A6C34878D82A}">
+                    <a16:rowId xmlns:a16="http://schemas.microsoft.com/office/drawing/2014/main" val="985642093"/>
+                  </a:ext>
+                </a:extLst>
+              </a:tr>
+              <a:tr h="411610">
+                <a:tc vMerge="1">
+                  <a:txBody>
+                    <a:bodyPr/>
+                    <a:lstStyle/>
+                    <a:p>
+                      <a:endParaRPr lang="en-RU"/>
+                    </a:p>
+                  </a:txBody>
+                  <a:tcPr/>
+                </a:tc>
+                <a:tc vMerge="1">
+                  <a:txBody>
+                    <a:bodyPr/>
+                    <a:lstStyle/>
+                    <a:p>
+                      <a:endParaRPr lang="en-RU"/>
+                    </a:p>
+                  </a:txBody>
+                  <a:tcPr/>
+                </a:tc>
+                <a:tc>
+                  <a:txBody>
+                    <a:bodyPr/>
+                    <a:lstStyle/>
+                    <a:p>
+                      <a:r>
+                        <a:rPr lang="ru-RU" sz="2000" dirty="0">
+                          <a:latin typeface="Times New Roman" panose="02020603050405020304" pitchFamily="18" charset="0"/>
+                          <a:cs typeface="Times New Roman" panose="02020603050405020304" pitchFamily="18" charset="0"/>
+                        </a:rPr>
+                        <a:t>Недоступно в РФ</a:t>
+                      </a:r>
+                      <a:endParaRPr lang="en-RU" sz="2000" dirty="0">
+                        <a:latin typeface="Times New Roman" panose="02020603050405020304" pitchFamily="18" charset="0"/>
+                        <a:cs typeface="Times New Roman" panose="02020603050405020304" pitchFamily="18" charset="0"/>
+                      </a:endParaRPr>
+                    </a:p>
+                  </a:txBody>
+                  <a:tcPr>
+                    <a:lnR w="57150" cap="flat" cmpd="sng" algn="ctr">
+                      <a:solidFill>
+                        <a:schemeClr val="tx1"/>
+                      </a:solidFill>
+                      <a:prstDash val="solid"/>
+                      <a:round/>
+                      <a:headEnd type="none" w="med" len="med"/>
+                      <a:tailEnd type="none" w="med" len="med"/>
+                    </a:lnR>
+                    <a:lnT w="12700" cap="flat" cmpd="sng" algn="ctr">
+                      <a:solidFill>
+                        <a:schemeClr val="tx1"/>
+                      </a:solidFill>
+                      <a:prstDash val="solid"/>
+                      <a:round/>
+                      <a:headEnd type="none" w="med" len="med"/>
+                      <a:tailEnd type="none" w="med" len="med"/>
+                    </a:lnT>
+                    <a:lnB w="57150" cap="flat" cmpd="sng" algn="ctr">
+                      <a:solidFill>
+                        <a:schemeClr val="tx1"/>
+                      </a:solidFill>
+                      <a:prstDash val="solid"/>
+                      <a:round/>
+                      <a:headEnd type="none" w="med" len="med"/>
+                      <a:tailEnd type="none" w="med" len="med"/>
+                    </a:lnB>
+                    <a:solidFill>
+                      <a:schemeClr val="accent2">
+                        <a:lumMod val="60000"/>
+                        <a:lumOff val="40000"/>
+                      </a:schemeClr>
+                    </a:solidFill>
+                  </a:tcPr>
+                </a:tc>
+                <a:extLst>
+                  <a:ext uri="{0D108BD9-81ED-4DB2-BD59-A6C34878D82A}">
+                    <a16:rowId xmlns:a16="http://schemas.microsoft.com/office/drawing/2014/main" val="780577299"/>
+                  </a:ext>
+                </a:extLst>
+              </a:tr>
+              <a:tr h="1067579">
+                <a:tc>
+                  <a:txBody>
+                    <a:bodyPr/>
+                    <a:lstStyle/>
+                    <a:p>
+                      <a:r>
+                        <a:rPr lang="en-US" sz="2000" dirty="0" err="1">
+                          <a:latin typeface="Times New Roman" panose="02020603050405020304" pitchFamily="18" charset="0"/>
+                          <a:cs typeface="Times New Roman" panose="02020603050405020304" pitchFamily="18" charset="0"/>
+                        </a:rPr>
+                        <a:t>Dostoesky</a:t>
+                      </a:r>
+                      <a:endParaRPr lang="ru-RU" sz="2000" dirty="0">
+                        <a:latin typeface="Times New Roman" panose="02020603050405020304" pitchFamily="18" charset="0"/>
+                        <a:cs typeface="Times New Roman" panose="02020603050405020304" pitchFamily="18" charset="0"/>
+                      </a:endParaRPr>
+                    </a:p>
+                  </a:txBody>
+                  <a:tcPr>
+                    <a:lnL w="57150" cap="flat" cmpd="sng" algn="ctr">
+                      <a:solidFill>
+                        <a:schemeClr val="tx1"/>
+                      </a:solidFill>
+                      <a:prstDash val="solid"/>
+                      <a:round/>
+                      <a:headEnd type="none" w="med" len="med"/>
+                      <a:tailEnd type="none" w="med" len="med"/>
+                    </a:lnL>
+                    <a:lnT w="57150" cap="flat" cmpd="sng" algn="ctr">
+                      <a:solidFill>
+                        <a:schemeClr val="tx1"/>
+                      </a:solidFill>
+                      <a:prstDash val="solid"/>
+                      <a:round/>
+                      <a:headEnd type="none" w="med" len="med"/>
+                      <a:tailEnd type="none" w="med" len="med"/>
+                    </a:lnT>
+                    <a:lnB w="57150" cap="flat" cmpd="sng" algn="ctr">
+                      <a:solidFill>
+                        <a:schemeClr val="tx1"/>
+                      </a:solidFill>
+                      <a:prstDash val="solid"/>
+                      <a:round/>
+                      <a:headEnd type="none" w="med" len="med"/>
+                      <a:tailEnd type="none" w="med" len="med"/>
+                    </a:lnB>
+                  </a:tcPr>
+                </a:tc>
+                <a:tc>
+                  <a:txBody>
+                    <a:bodyPr/>
+                    <a:lstStyle/>
+                    <a:p>
+                      <a:r>
+                        <a:rPr lang="ru-RU" sz="2000" dirty="0">
+                          <a:latin typeface="Times New Roman" panose="02020603050405020304" pitchFamily="18" charset="0"/>
+                          <a:cs typeface="Times New Roman" panose="02020603050405020304" pitchFamily="18" charset="0"/>
+                        </a:rPr>
+                        <a:t>Открытый исходный код</a:t>
+                      </a:r>
+                      <a:endParaRPr lang="en-RU" sz="2000" dirty="0">
+                        <a:latin typeface="Times New Roman" panose="02020603050405020304" pitchFamily="18" charset="0"/>
+                        <a:cs typeface="Times New Roman" panose="02020603050405020304" pitchFamily="18" charset="0"/>
+                      </a:endParaRPr>
+                    </a:p>
+                  </a:txBody>
+                  <a:tcPr>
+                    <a:lnT w="57150" cap="flat" cmpd="sng" algn="ctr">
+                      <a:solidFill>
+                        <a:schemeClr val="tx1"/>
+                      </a:solidFill>
+                      <a:prstDash val="solid"/>
+                      <a:round/>
+                      <a:headEnd type="none" w="med" len="med"/>
+                      <a:tailEnd type="none" w="med" len="med"/>
+                    </a:lnT>
+                    <a:lnB w="57150" cap="flat" cmpd="sng" algn="ctr">
+                      <a:solidFill>
+                        <a:schemeClr val="tx1"/>
+                      </a:solidFill>
+                      <a:prstDash val="solid"/>
+                      <a:round/>
+                      <a:headEnd type="none" w="med" len="med"/>
+                      <a:tailEnd type="none" w="med" len="med"/>
+                    </a:lnB>
+                    <a:solidFill>
+                      <a:schemeClr val="accent6">
+                        <a:lumMod val="60000"/>
+                        <a:lumOff val="40000"/>
+                      </a:schemeClr>
+                    </a:solidFill>
+                  </a:tcPr>
+                </a:tc>
+                <a:tc>
+                  <a:txBody>
+                    <a:bodyPr/>
+                    <a:lstStyle/>
+                    <a:p>
+                      <a:r>
+                        <a:rPr lang="ru-RU" sz="2000" dirty="0">
+                          <a:latin typeface="Times New Roman" panose="02020603050405020304" pitchFamily="18" charset="0"/>
+                          <a:cs typeface="Times New Roman" panose="02020603050405020304" pitchFamily="18" charset="0"/>
+                        </a:rPr>
+                        <a:t>Не предназначен для решения поставленной задачи</a:t>
+                      </a:r>
+                      <a:endParaRPr lang="en-RU" sz="2000" dirty="0">
+                        <a:latin typeface="Times New Roman" panose="02020603050405020304" pitchFamily="18" charset="0"/>
+                        <a:cs typeface="Times New Roman" panose="02020603050405020304" pitchFamily="18" charset="0"/>
+                      </a:endParaRPr>
+                    </a:p>
+                  </a:txBody>
+                  <a:tcPr>
+                    <a:lnR w="57150" cap="flat" cmpd="sng" algn="ctr">
+                      <a:solidFill>
+                        <a:schemeClr val="tx1"/>
+                      </a:solidFill>
+                      <a:prstDash val="solid"/>
+                      <a:round/>
+                      <a:headEnd type="none" w="med" len="med"/>
+                      <a:tailEnd type="none" w="med" len="med"/>
+                    </a:lnR>
+                    <a:lnT w="57150" cap="flat" cmpd="sng" algn="ctr">
+                      <a:solidFill>
+                        <a:schemeClr val="tx1"/>
+                      </a:solidFill>
+                      <a:prstDash val="solid"/>
+                      <a:round/>
+                      <a:headEnd type="none" w="med" len="med"/>
+                      <a:tailEnd type="none" w="med" len="med"/>
+                    </a:lnT>
+                    <a:lnB w="57150" cap="flat" cmpd="sng" algn="ctr">
+                      <a:solidFill>
+                        <a:schemeClr val="tx1"/>
+                      </a:solidFill>
+                      <a:prstDash val="solid"/>
+                      <a:round/>
+                      <a:headEnd type="none" w="med" len="med"/>
+                      <a:tailEnd type="none" w="med" len="med"/>
+                    </a:lnB>
+                    <a:solidFill>
+                      <a:schemeClr val="accent2">
+                        <a:lumMod val="60000"/>
+                        <a:lumOff val="40000"/>
+                      </a:schemeClr>
+                    </a:solidFill>
+                  </a:tcPr>
+                </a:tc>
+                <a:extLst>
+                  <a:ext uri="{0D108BD9-81ED-4DB2-BD59-A6C34878D82A}">
+                    <a16:rowId xmlns:a16="http://schemas.microsoft.com/office/drawing/2014/main" val="1340722892"/>
+                  </a:ext>
+                </a:extLst>
+              </a:tr>
+              <a:tr h="533790">
+                <a:tc rowSpan="2">
+                  <a:txBody>
+                    <a:bodyPr/>
+                    <a:lstStyle/>
+                    <a:p>
+                      <a:r>
+                        <a:rPr lang="en-US" sz="2000" dirty="0" err="1">
+                          <a:latin typeface="Times New Roman" panose="02020603050405020304" pitchFamily="18" charset="0"/>
+                          <a:cs typeface="Times New Roman" panose="02020603050405020304" pitchFamily="18" charset="0"/>
+                        </a:rPr>
+                        <a:t>ChatGPT</a:t>
+                      </a:r>
+                      <a:endParaRPr lang="ru-RU" sz="2000" dirty="0">
+                        <a:latin typeface="Times New Roman" panose="02020603050405020304" pitchFamily="18" charset="0"/>
+                        <a:cs typeface="Times New Roman" panose="02020603050405020304" pitchFamily="18" charset="0"/>
+                      </a:endParaRPr>
+                    </a:p>
+                  </a:txBody>
+                  <a:tcPr>
+                    <a:lnL w="57150" cap="flat" cmpd="sng" algn="ctr">
+                      <a:solidFill>
+                        <a:schemeClr val="tx1"/>
+                      </a:solidFill>
+                      <a:prstDash val="solid"/>
+                      <a:round/>
+                      <a:headEnd type="none" w="med" len="med"/>
+                      <a:tailEnd type="none" w="med" len="med"/>
+                    </a:lnL>
+                    <a:lnT w="57150" cap="flat" cmpd="sng" algn="ctr">
+                      <a:solidFill>
+                        <a:schemeClr val="tx1"/>
+                      </a:solidFill>
+                      <a:prstDash val="solid"/>
+                      <a:round/>
+                      <a:headEnd type="none" w="med" len="med"/>
+                      <a:tailEnd type="none" w="med" len="med"/>
+                    </a:lnT>
+                    <a:lnB w="57150" cap="flat" cmpd="sng" algn="ctr">
+                      <a:solidFill>
+                        <a:schemeClr val="tx1"/>
+                      </a:solidFill>
+                      <a:prstDash val="solid"/>
+                      <a:round/>
+                      <a:headEnd type="none" w="med" len="med"/>
+                      <a:tailEnd type="none" w="med" len="med"/>
+                    </a:lnB>
+                  </a:tcPr>
+                </a:tc>
+                <a:tc>
+                  <a:txBody>
+                    <a:bodyPr/>
+                    <a:lstStyle/>
+                    <a:p>
+                      <a:r>
+                        <a:rPr lang="ru-RU" sz="2000" dirty="0">
+                          <a:latin typeface="Times New Roman" panose="02020603050405020304" pitchFamily="18" charset="0"/>
+                          <a:cs typeface="Times New Roman" panose="02020603050405020304" pitchFamily="18" charset="0"/>
+                        </a:rPr>
+                        <a:t>Высокая точность</a:t>
+                      </a:r>
+                    </a:p>
+                  </a:txBody>
+                  <a:tcPr>
+                    <a:lnT w="57150" cap="flat" cmpd="sng" algn="ctr">
+                      <a:solidFill>
+                        <a:schemeClr val="tx1"/>
+                      </a:solidFill>
+                      <a:prstDash val="solid"/>
+                      <a:round/>
+                      <a:headEnd type="none" w="med" len="med"/>
+                      <a:tailEnd type="none" w="med" len="med"/>
+                    </a:lnT>
+                    <a:lnB w="12700" cap="flat" cmpd="sng" algn="ctr">
+                      <a:solidFill>
+                        <a:schemeClr val="tx1"/>
+                      </a:solidFill>
+                      <a:prstDash val="solid"/>
+                      <a:round/>
+                      <a:headEnd type="none" w="med" len="med"/>
+                      <a:tailEnd type="none" w="med" len="med"/>
+                    </a:lnB>
+                    <a:solidFill>
+                      <a:schemeClr val="accent6">
+                        <a:lumMod val="60000"/>
+                        <a:lumOff val="40000"/>
+                      </a:schemeClr>
+                    </a:solidFill>
+                  </a:tcPr>
+                </a:tc>
+                <a:tc>
+                  <a:txBody>
+                    <a:bodyPr/>
+                    <a:lstStyle/>
+                    <a:p>
+                      <a:r>
+                        <a:rPr lang="ru-RU" sz="2000" dirty="0">
+                          <a:latin typeface="Times New Roman" panose="02020603050405020304" pitchFamily="18" charset="0"/>
+                          <a:cs typeface="Times New Roman" panose="02020603050405020304" pitchFamily="18" charset="0"/>
+                        </a:rPr>
+                        <a:t>Дорогостоящая модель</a:t>
+                      </a:r>
+                      <a:endParaRPr lang="en-RU" sz="2000" dirty="0">
+                        <a:latin typeface="Times New Roman" panose="02020603050405020304" pitchFamily="18" charset="0"/>
+                        <a:cs typeface="Times New Roman" panose="02020603050405020304" pitchFamily="18" charset="0"/>
+                      </a:endParaRPr>
+                    </a:p>
+                  </a:txBody>
+                  <a:tcPr>
+                    <a:lnR w="57150" cap="flat" cmpd="sng" algn="ctr">
+                      <a:solidFill>
+                        <a:schemeClr val="tx1"/>
+                      </a:solidFill>
+                      <a:prstDash val="solid"/>
+                      <a:round/>
+                      <a:headEnd type="none" w="med" len="med"/>
+                      <a:tailEnd type="none" w="med" len="med"/>
+                    </a:lnR>
+                    <a:lnT w="57150" cap="flat" cmpd="sng" algn="ctr">
+                      <a:solidFill>
+                        <a:schemeClr val="tx1"/>
+                      </a:solidFill>
+                      <a:prstDash val="solid"/>
+                      <a:round/>
+                      <a:headEnd type="none" w="med" len="med"/>
+                      <a:tailEnd type="none" w="med" len="med"/>
+                    </a:lnT>
+                    <a:lnB w="12700" cap="flat" cmpd="sng" algn="ctr">
+                      <a:solidFill>
+                        <a:schemeClr val="tx1"/>
+                      </a:solidFill>
+                      <a:prstDash val="solid"/>
+                      <a:round/>
+                      <a:headEnd type="none" w="med" len="med"/>
+                      <a:tailEnd type="none" w="med" len="med"/>
+                    </a:lnB>
+                    <a:solidFill>
+                      <a:schemeClr val="accent2">
+                        <a:lumMod val="60000"/>
+                        <a:lumOff val="40000"/>
+                      </a:schemeClr>
+                    </a:solidFill>
+                  </a:tcPr>
+                </a:tc>
+                <a:extLst>
+                  <a:ext uri="{0D108BD9-81ED-4DB2-BD59-A6C34878D82A}">
+                    <a16:rowId xmlns:a16="http://schemas.microsoft.com/office/drawing/2014/main" val="485924465"/>
+                  </a:ext>
+                </a:extLst>
+              </a:tr>
+              <a:tr h="533790">
+                <a:tc vMerge="1">
+                  <a:txBody>
+                    <a:bodyPr/>
+                    <a:lstStyle/>
+                    <a:p>
+                      <a:endParaRPr lang="en-RU"/>
+                    </a:p>
+                  </a:txBody>
+                  <a:tcPr/>
+                </a:tc>
+                <a:tc>
+                  <a:txBody>
+                    <a:bodyPr/>
+                    <a:lstStyle/>
+                    <a:p>
+                      <a:pPr marL="0" marR="0" lvl="0" indent="0" algn="l" defTabSz="914400" rtl="0" eaLnBrk="1" fontAlgn="auto" latinLnBrk="0" hangingPunct="1">
+                        <a:lnSpc>
+                          <a:spcPct val="100000"/>
+                        </a:lnSpc>
+                        <a:spcBef>
+                          <a:spcPts val="0"/>
+                        </a:spcBef>
+                        <a:spcAft>
+                          <a:spcPts val="0"/>
+                        </a:spcAft>
+                        <a:buClrTx/>
+                        <a:buSzTx/>
+                        <a:buFontTx/>
+                        <a:buNone/>
+                        <a:tabLst/>
+                        <a:defRPr/>
+                      </a:pPr>
+                      <a:r>
+                        <a:rPr lang="ru-RU" sz="2000" dirty="0">
+                          <a:latin typeface="Times New Roman" panose="02020603050405020304" pitchFamily="18" charset="0"/>
+                          <a:cs typeface="Times New Roman" panose="02020603050405020304" pitchFamily="18" charset="0"/>
+                        </a:rPr>
+                        <a:t>Широкая сфера применения</a:t>
+                      </a:r>
+                      <a:endParaRPr lang="en-RU" sz="2000" dirty="0">
+                        <a:latin typeface="Times New Roman" panose="02020603050405020304" pitchFamily="18" charset="0"/>
+                        <a:cs typeface="Times New Roman" panose="02020603050405020304" pitchFamily="18" charset="0"/>
+                      </a:endParaRPr>
+                    </a:p>
+                  </a:txBody>
+                  <a:tcPr>
+                    <a:lnT w="12700" cap="flat" cmpd="sng" algn="ctr">
+                      <a:solidFill>
+                        <a:schemeClr val="tx1"/>
+                      </a:solidFill>
+                      <a:prstDash val="solid"/>
+                      <a:round/>
+                      <a:headEnd type="none" w="med" len="med"/>
+                      <a:tailEnd type="none" w="med" len="med"/>
+                    </a:lnT>
+                    <a:lnB w="57150" cap="flat" cmpd="sng" algn="ctr">
+                      <a:solidFill>
+                        <a:schemeClr val="tx1"/>
+                      </a:solidFill>
+                      <a:prstDash val="solid"/>
+                      <a:round/>
+                      <a:headEnd type="none" w="med" len="med"/>
+                      <a:tailEnd type="none" w="med" len="med"/>
+                    </a:lnB>
+                    <a:solidFill>
+                      <a:schemeClr val="accent6">
+                        <a:lumMod val="60000"/>
+                        <a:lumOff val="40000"/>
+                      </a:schemeClr>
+                    </a:solidFill>
+                  </a:tcPr>
+                </a:tc>
+                <a:tc>
+                  <a:txBody>
+                    <a:bodyPr/>
+                    <a:lstStyle/>
+                    <a:p>
+                      <a:r>
+                        <a:rPr lang="ru-RU" sz="2000" dirty="0">
+                          <a:latin typeface="Times New Roman" panose="02020603050405020304" pitchFamily="18" charset="0"/>
+                          <a:cs typeface="Times New Roman" panose="02020603050405020304" pitchFamily="18" charset="0"/>
+                        </a:rPr>
+                        <a:t>Недоступно в РФ</a:t>
+                      </a:r>
+                      <a:endParaRPr lang="en-RU" sz="2000" dirty="0">
+                        <a:latin typeface="Times New Roman" panose="02020603050405020304" pitchFamily="18" charset="0"/>
+                        <a:cs typeface="Times New Roman" panose="02020603050405020304" pitchFamily="18" charset="0"/>
+                      </a:endParaRPr>
+                    </a:p>
+                  </a:txBody>
+                  <a:tcPr>
+                    <a:lnR w="57150" cap="flat" cmpd="sng" algn="ctr">
+                      <a:solidFill>
+                        <a:schemeClr val="tx1"/>
+                      </a:solidFill>
+                      <a:prstDash val="solid"/>
+                      <a:round/>
+                      <a:headEnd type="none" w="med" len="med"/>
+                      <a:tailEnd type="none" w="med" len="med"/>
+                    </a:lnR>
+                    <a:lnT w="12700" cap="flat" cmpd="sng" algn="ctr">
+                      <a:solidFill>
+                        <a:schemeClr val="tx1"/>
+                      </a:solidFill>
+                      <a:prstDash val="solid"/>
+                      <a:round/>
+                      <a:headEnd type="none" w="med" len="med"/>
+                      <a:tailEnd type="none" w="med" len="med"/>
+                    </a:lnT>
+                    <a:lnB w="57150" cap="flat" cmpd="sng" algn="ctr">
+                      <a:solidFill>
+                        <a:schemeClr val="tx1"/>
+                      </a:solidFill>
+                      <a:prstDash val="solid"/>
+                      <a:round/>
+                      <a:headEnd type="none" w="med" len="med"/>
+                      <a:tailEnd type="none" w="med" len="med"/>
+                    </a:lnB>
+                    <a:solidFill>
+                      <a:schemeClr val="accent2">
+                        <a:lumMod val="60000"/>
+                        <a:lumOff val="40000"/>
+                      </a:schemeClr>
+                    </a:solidFill>
+                  </a:tcPr>
+                </a:tc>
+                <a:extLst>
+                  <a:ext uri="{0D108BD9-81ED-4DB2-BD59-A6C34878D82A}">
+                    <a16:rowId xmlns:a16="http://schemas.microsoft.com/office/drawing/2014/main" val="3093688468"/>
+                  </a:ext>
+                </a:extLst>
+              </a:tr>
+            </a:tbl>
+          </a:graphicData>
+        </a:graphic>
+      </p:graphicFrame>
     </p:spTree>
     <p:extLst>
       <p:ext uri="{BB962C8B-B14F-4D97-AF65-F5344CB8AC3E}">

</xml_diff>

<commit_message>
FIX: some shitty fixes by predefence or what i can't talk english i'm kandibober kurwa
</commit_message>
<xml_diff>
--- a/iWannaNote/iHatePresentations/presentation.pptx
+++ b/iWannaNote/iHatePresentations/presentation.pptx
@@ -213,7 +213,7 @@
           <a:p>
             <a:fld id="{9AD2A09B-D952-4383-A48E-27C117CB15C8}" type="datetimeFigureOut">
               <a:rPr lang="ru-RU" smtClean="0"/>
-              <a:t>26.05.2024</a:t>
+              <a:t>01.06.2024</a:t>
             </a:fld>
             <a:endParaRPr lang="ru-RU"/>
           </a:p>
@@ -912,7 +912,7 @@
             </a:r>
             <a:r>
               <a:rPr lang="ru-RU" dirty="0"/>
-              <a:t>матрица ошибок показывает, что метод в 1.5 раза чаще ошибочно классифицирует обычные сообщения как суицидальные, но данный факт нельзя интерпретировать как запрет на использования модели, так как ложные срабатывания здесь были бы опасны только в случае более частой классификации суицидальных сообщений как обычных.</a:t>
+              <a:t>матрица ошибок показывает, что метод в 1.5 раза чаще ошибочно классифицирует обычные сообщения как суицидальные.</a:t>
             </a:r>
           </a:p>
         </p:txBody>
@@ -1102,12 +1102,8 @@
               <a:defRPr/>
             </a:pPr>
             <a:r>
-              <a:rPr lang="ru-RU" dirty="0" err="1"/>
-              <a:t>Иииии</a:t>
-            </a:r>
-            <a:r>
               <a:rPr lang="ru-RU" dirty="0"/>
-              <a:t> на следующем слайде представлена матрица ошибок и значения метрик для логистической регрессии с использованием модели </a:t>
+              <a:t>Далее представлена матрица ошибок и значения метрик для логистической регрессии с использованием модели </a:t>
             </a:r>
             <a:r>
               <a:rPr lang="en-US" dirty="0"/>
@@ -2630,7 +2626,7 @@
           <a:p>
             <a:fld id="{15988D4F-E58D-4CDE-A3D0-F6AD327AEC56}" type="datetime1">
               <a:rPr lang="ru-RU" smtClean="0"/>
-              <a:t>26.05.2024</a:t>
+              <a:t>01.06.2024</a:t>
             </a:fld>
             <a:endParaRPr lang="ru-RU"/>
           </a:p>
@@ -2828,7 +2824,7 @@
           <a:p>
             <a:fld id="{CE1E2A47-57B7-4CF1-A92E-49D63AEE96D5}" type="datetime1">
               <a:rPr lang="ru-RU" smtClean="0"/>
-              <a:t>26.05.2024</a:t>
+              <a:t>01.06.2024</a:t>
             </a:fld>
             <a:endParaRPr lang="ru-RU"/>
           </a:p>
@@ -3036,7 +3032,7 @@
           <a:p>
             <a:fld id="{CA81ACF7-CEE3-4A9F-B718-A470CCA653C5}" type="datetime1">
               <a:rPr lang="ru-RU" smtClean="0"/>
-              <a:t>26.05.2024</a:t>
+              <a:t>01.06.2024</a:t>
             </a:fld>
             <a:endParaRPr lang="ru-RU"/>
           </a:p>
@@ -3234,7 +3230,7 @@
           <a:p>
             <a:fld id="{5E37AE04-DA44-410C-A175-FF6C781BC876}" type="datetime1">
               <a:rPr lang="ru-RU" smtClean="0"/>
-              <a:t>26.05.2024</a:t>
+              <a:t>01.06.2024</a:t>
             </a:fld>
             <a:endParaRPr lang="ru-RU"/>
           </a:p>
@@ -3509,7 +3505,7 @@
           <a:p>
             <a:fld id="{E32C54E3-AF17-448A-9297-44EF357EABC1}" type="datetime1">
               <a:rPr lang="ru-RU" smtClean="0"/>
-              <a:t>26.05.2024</a:t>
+              <a:t>01.06.2024</a:t>
             </a:fld>
             <a:endParaRPr lang="ru-RU"/>
           </a:p>
@@ -3774,7 +3770,7 @@
           <a:p>
             <a:fld id="{6955E014-4D2F-48F0-99F5-18541DD4F253}" type="datetime1">
               <a:rPr lang="ru-RU" smtClean="0"/>
-              <a:t>26.05.2024</a:t>
+              <a:t>01.06.2024</a:t>
             </a:fld>
             <a:endParaRPr lang="ru-RU"/>
           </a:p>
@@ -4186,7 +4182,7 @@
           <a:p>
             <a:fld id="{E7E8D56A-792C-4904-9EB1-6F8EF41EE765}" type="datetime1">
               <a:rPr lang="ru-RU" smtClean="0"/>
-              <a:t>26.05.2024</a:t>
+              <a:t>01.06.2024</a:t>
             </a:fld>
             <a:endParaRPr lang="ru-RU"/>
           </a:p>
@@ -4327,7 +4323,7 @@
           <a:p>
             <a:fld id="{7065F927-12B6-4A7B-B3A2-7352DF6A122F}" type="datetime1">
               <a:rPr lang="ru-RU" smtClean="0"/>
-              <a:t>26.05.2024</a:t>
+              <a:t>01.06.2024</a:t>
             </a:fld>
             <a:endParaRPr lang="ru-RU"/>
           </a:p>
@@ -4440,7 +4436,7 @@
           <a:p>
             <a:fld id="{AAFF6416-B84E-492F-BBC6-38E032565367}" type="datetime1">
               <a:rPr lang="ru-RU" smtClean="0"/>
-              <a:t>26.05.2024</a:t>
+              <a:t>01.06.2024</a:t>
             </a:fld>
             <a:endParaRPr lang="ru-RU"/>
           </a:p>
@@ -4751,7 +4747,7 @@
           <a:p>
             <a:fld id="{F0BD601D-7324-4D41-B3DA-86B4FCF095DB}" type="datetime1">
               <a:rPr lang="ru-RU" smtClean="0"/>
-              <a:t>26.05.2024</a:t>
+              <a:t>01.06.2024</a:t>
             </a:fld>
             <a:endParaRPr lang="ru-RU"/>
           </a:p>
@@ -5039,7 +5035,7 @@
           <a:p>
             <a:fld id="{91160DCC-CAF3-4180-8270-9561E69073DD}" type="datetime1">
               <a:rPr lang="ru-RU" smtClean="0"/>
-              <a:t>26.05.2024</a:t>
+              <a:t>01.06.2024</a:t>
             </a:fld>
             <a:endParaRPr lang="ru-RU"/>
           </a:p>
@@ -5280,7 +5276,7 @@
           <a:p>
             <a:fld id="{A366973F-C059-4909-8C8C-5ED2D1FD3A9E}" type="datetime1">
               <a:rPr lang="ru-RU" smtClean="0"/>
-              <a:t>26.05.2024</a:t>
+              <a:t>01.06.2024</a:t>
             </a:fld>
             <a:endParaRPr lang="ru-RU"/>
           </a:p>
@@ -13235,10 +13231,10 @@
       </p:sp>
       <p:pic>
         <p:nvPicPr>
-          <p:cNvPr id="6" name="Picture 5">
+          <p:cNvPr id="7" name="Picture 6">
             <a:extLst>
               <a:ext uri="{FF2B5EF4-FFF2-40B4-BE49-F238E27FC236}">
-                <a16:creationId xmlns:a16="http://schemas.microsoft.com/office/drawing/2014/main" id="{52ABBF56-BF34-E946-B802-B38D2A7AA472}"/>
+                <a16:creationId xmlns:a16="http://schemas.microsoft.com/office/drawing/2014/main" id="{BFB40435-C608-5C42-862B-A39F046A54F0}"/>
               </a:ext>
             </a:extLst>
           </p:cNvPr>
@@ -13261,8 +13257,8 @@
         </p:blipFill>
         <p:spPr>
           <a:xfrm>
-            <a:off x="6045200" y="1690688"/>
-            <a:ext cx="6146800" cy="4356100"/>
+            <a:off x="6051920" y="1690688"/>
+            <a:ext cx="6140080" cy="4351338"/>
           </a:xfrm>
           <a:prstGeom prst="rect">
             <a:avLst/>
@@ -13400,8 +13396,8 @@
         </p:blipFill>
         <p:spPr bwMode="auto">
           <a:xfrm>
-            <a:off x="9274595" y="1358671"/>
-            <a:ext cx="2743049" cy="2668661"/>
+            <a:off x="9721033" y="1506156"/>
+            <a:ext cx="1850174" cy="1800000"/>
           </a:xfrm>
           <a:prstGeom prst="rect">
             <a:avLst/>
@@ -13447,8 +13443,8 @@
         </p:blipFill>
         <p:spPr bwMode="auto">
           <a:xfrm>
-            <a:off x="9477798" y="4019706"/>
-            <a:ext cx="2336644" cy="2336644"/>
+            <a:off x="9746119" y="4143670"/>
+            <a:ext cx="1800000" cy="1800000"/>
           </a:xfrm>
           <a:prstGeom prst="rect">
             <a:avLst/>
@@ -13480,14 +13476,14 @@
           <p:nvPr>
             <p:extLst>
               <p:ext uri="{D42A27DB-BD31-4B8C-83A1-F6EECF244321}">
-                <p14:modId xmlns:p14="http://schemas.microsoft.com/office/powerpoint/2010/main" val="433947038"/>
+                <p14:modId xmlns:p14="http://schemas.microsoft.com/office/powerpoint/2010/main" val="2079117070"/>
               </p:ext>
             </p:extLst>
           </p:nvPr>
         </p:nvGraphicFramePr>
         <p:xfrm>
-          <a:off x="560070" y="1888361"/>
-          <a:ext cx="8664993" cy="4726998"/>
+          <a:off x="560439" y="1895735"/>
+          <a:ext cx="9010171" cy="4604818"/>
         </p:xfrm>
         <a:graphic>
           <a:graphicData uri="http://schemas.openxmlformats.org/drawingml/2006/table">
@@ -13503,21 +13499,21 @@
                 <a:tableStyleId>{5940675A-B579-460E-94D1-54222C63F5DA}</a:tableStyleId>
               </a:tblPr>
               <a:tblGrid>
-                <a:gridCol w="2114550">
+                <a:gridCol w="2109019">
                   <a:extLst>
                     <a:ext uri="{9D8B030D-6E8A-4147-A177-3AD203B41FA5}">
                       <a16:colId xmlns:a16="http://schemas.microsoft.com/office/drawing/2014/main" val="3889561718"/>
                     </a:ext>
                   </a:extLst>
                 </a:gridCol>
-                <a:gridCol w="3662112">
+                <a:gridCol w="3450576">
                   <a:extLst>
                     <a:ext uri="{9D8B030D-6E8A-4147-A177-3AD203B41FA5}">
                       <a16:colId xmlns:a16="http://schemas.microsoft.com/office/drawing/2014/main" val="619299706"/>
                     </a:ext>
                   </a:extLst>
                 </a:gridCol>
-                <a:gridCol w="2888331">
+                <a:gridCol w="3450576">
                   <a:extLst>
                     <a:ext uri="{9D8B030D-6E8A-4147-A177-3AD203B41FA5}">
                       <a16:colId xmlns:a16="http://schemas.microsoft.com/office/drawing/2014/main" val="355849931"/>
@@ -13666,8 +13662,7 @@
                     </a:lnB>
                     <a:solidFill>
                       <a:schemeClr val="accent2">
-                        <a:lumMod val="60000"/>
-                        <a:lumOff val="40000"/>
+                        <a:lumMod val="75000"/>
                       </a:schemeClr>
                     </a:solidFill>
                   </a:tcPr>
@@ -13819,8 +13814,7 @@
                     </a:lnB>
                     <a:solidFill>
                       <a:schemeClr val="accent2">
-                        <a:lumMod val="60000"/>
-                        <a:lumOff val="40000"/>
+                        <a:lumMod val="75000"/>
                       </a:schemeClr>
                     </a:solidFill>
                   </a:tcPr>
@@ -13900,8 +13894,7 @@
                     </a:lnB>
                     <a:solidFill>
                       <a:schemeClr val="accent2">
-                        <a:lumMod val="60000"/>
-                        <a:lumOff val="40000"/>
+                        <a:lumMod val="75000"/>
                       </a:schemeClr>
                     </a:solidFill>
                   </a:tcPr>
@@ -14052,8 +14045,7 @@
                     </a:lnB>
                     <a:solidFill>
                       <a:schemeClr val="accent2">
-                        <a:lumMod val="60000"/>
-                        <a:lumOff val="40000"/>
+                        <a:lumMod val="75000"/>
                       </a:schemeClr>
                     </a:solidFill>
                   </a:tcPr>
@@ -14206,8 +14198,7 @@
                     </a:lnB>
                     <a:solidFill>
                       <a:schemeClr val="accent2">
-                        <a:lumMod val="60000"/>
-                        <a:lumOff val="40000"/>
+                        <a:lumMod val="75000"/>
                       </a:schemeClr>
                     </a:solidFill>
                   </a:tcPr>
@@ -14356,8 +14347,7 @@
                     </a:lnB>
                     <a:solidFill>
                       <a:schemeClr val="accent2">
-                        <a:lumMod val="60000"/>
-                        <a:lumOff val="40000"/>
+                        <a:lumMod val="75000"/>
                       </a:schemeClr>
                     </a:solidFill>
                   </a:tcPr>
@@ -14489,8 +14479,7 @@
                     </a:lnB>
                     <a:solidFill>
                       <a:schemeClr val="accent2">
-                        <a:lumMod val="60000"/>
-                        <a:lumOff val="40000"/>
+                        <a:lumMod val="75000"/>
                       </a:schemeClr>
                     </a:solidFill>
                   </a:tcPr>
@@ -14505,6 +14494,78 @@
           </a:graphicData>
         </a:graphic>
       </p:graphicFrame>
+      <p:sp>
+        <p:nvSpPr>
+          <p:cNvPr id="3" name="TextBox 2">
+            <a:extLst>
+              <a:ext uri="{FF2B5EF4-FFF2-40B4-BE49-F238E27FC236}">
+                <a16:creationId xmlns:a16="http://schemas.microsoft.com/office/drawing/2014/main" id="{255729E1-9350-E24A-865A-A8A86DF6FEB8}"/>
+              </a:ext>
+            </a:extLst>
+          </p:cNvPr>
+          <p:cNvSpPr txBox="1"/>
+          <p:nvPr/>
+        </p:nvSpPr>
+        <p:spPr>
+          <a:xfrm>
+            <a:off x="10021878" y="3182513"/>
+            <a:ext cx="1248483" cy="369332"/>
+          </a:xfrm>
+          <a:prstGeom prst="rect">
+            <a:avLst/>
+          </a:prstGeom>
+          <a:noFill/>
+        </p:spPr>
+        <p:txBody>
+          <a:bodyPr wrap="none" rtlCol="0">
+            <a:spAutoFit/>
+          </a:bodyPr>
+          <a:lstStyle/>
+          <a:p>
+            <a:r>
+              <a:rPr lang="en-US" dirty="0"/>
+              <a:t>Dostoevsky</a:t>
+            </a:r>
+            <a:endParaRPr lang="en-RU" dirty="0"/>
+          </a:p>
+        </p:txBody>
+      </p:sp>
+      <p:sp>
+        <p:nvSpPr>
+          <p:cNvPr id="8" name="TextBox 7">
+            <a:extLst>
+              <a:ext uri="{FF2B5EF4-FFF2-40B4-BE49-F238E27FC236}">
+                <a16:creationId xmlns:a16="http://schemas.microsoft.com/office/drawing/2014/main" id="{B55406A9-2087-E14C-964D-C4AB15EB2AC1}"/>
+              </a:ext>
+            </a:extLst>
+          </p:cNvPr>
+          <p:cNvSpPr txBox="1"/>
+          <p:nvPr/>
+        </p:nvSpPr>
+        <p:spPr>
+          <a:xfrm>
+            <a:off x="10150598" y="5987018"/>
+            <a:ext cx="991041" cy="369332"/>
+          </a:xfrm>
+          <a:prstGeom prst="rect">
+            <a:avLst/>
+          </a:prstGeom>
+          <a:noFill/>
+        </p:spPr>
+        <p:txBody>
+          <a:bodyPr wrap="none" rtlCol="0">
+            <a:spAutoFit/>
+          </a:bodyPr>
+          <a:lstStyle/>
+          <a:p>
+            <a:r>
+              <a:rPr lang="en-US" dirty="0" err="1"/>
+              <a:t>ChatGPT</a:t>
+            </a:r>
+            <a:endParaRPr lang="en-RU" dirty="0"/>
+          </a:p>
+        </p:txBody>
+      </p:sp>
     </p:spTree>
     <p:extLst>
       <p:ext uri="{BB962C8B-B14F-4D97-AF65-F5344CB8AC3E}">
@@ -16563,7 +16624,7 @@
           </p:cNvPicPr>
           <p:nvPr/>
         </p:nvPicPr>
-        <p:blipFill>
+        <p:blipFill rotWithShape="1">
           <a:blip r:embed="rId3">
             <a:extLst>
               <a:ext uri="{28A0092B-C50C-407E-A947-70E740481C1C}">
@@ -16571,14 +16632,13 @@
               </a:ext>
             </a:extLst>
           </a:blip>
-          <a:stretch>
-            <a:fillRect/>
-          </a:stretch>
+          <a:srcRect l="4755" t="5294" r="6503" b="9371"/>
+          <a:stretch/>
         </p:blipFill>
         <p:spPr>
           <a:xfrm>
-            <a:off x="2590800" y="1720850"/>
-            <a:ext cx="7010400" cy="4635500"/>
+            <a:off x="2320413" y="1784555"/>
+            <a:ext cx="7978878" cy="5073445"/>
           </a:xfrm>
           <a:prstGeom prst="rect">
             <a:avLst/>
@@ -16637,13 +16697,13 @@
               </a:ext>
             </a:extLst>
           </a:blip>
-          <a:srcRect t="5389" b="4964"/>
+          <a:srcRect t="5389" r="2380" b="4964"/>
           <a:stretch/>
         </p:blipFill>
         <p:spPr>
           <a:xfrm>
-            <a:off x="0" y="1698339"/>
-            <a:ext cx="12192000" cy="4896196"/>
+            <a:off x="-1" y="1698338"/>
+            <a:ext cx="12210521" cy="5023137"/>
           </a:xfrm>
           <a:prstGeom prst="rect">
             <a:avLst/>
@@ -16888,7 +16948,7 @@
         </p:nvSpPr>
         <p:spPr>
           <a:xfrm>
-            <a:off x="838199" y="1009799"/>
+            <a:off x="838199" y="1100138"/>
             <a:ext cx="10515600" cy="1325563"/>
           </a:xfrm>
           <a:prstGeom prst="rect">
@@ -16897,7 +16957,7 @@
         </p:spPr>
         <p:txBody>
           <a:bodyPr vert="horz" lIns="91440" tIns="45720" rIns="91440" bIns="45720" rtlCol="0">
-            <a:normAutofit/>
+            <a:normAutofit lnSpcReduction="10000"/>
           </a:bodyPr>
           <a:lstStyle>
             <a:lvl1pPr marL="228600" indent="-228600" algn="l" defTabSz="914400" rtl="0" eaLnBrk="1" latinLnBrk="0" hangingPunct="1">
@@ -17064,16 +17124,30 @@
             </a:lvl9pPr>
           </a:lstStyle>
           <a:p>
-            <a:pPr marL="0" indent="0" algn="just">
-              <a:buFont typeface="Arial" panose="020B0604020202020204" pitchFamily="34" charset="0"/>
-              <a:buNone/>
-            </a:pPr>
+            <a:pPr algn="just"/>
             <a:r>
               <a:rPr lang="ru-RU" dirty="0">
                 <a:latin typeface="Times New Roman" panose="02020603050405020304" pitchFamily="18" charset="0"/>
                 <a:cs typeface="Times New Roman" panose="02020603050405020304" pitchFamily="18" charset="0"/>
               </a:rPr>
-              <a:t>Всего было собрано 1 000 суицидальных сообщений. К собранным данным было добавлено еще 1 000 </a:t>
+              <a:t>Собрано 1 000 суицидальных сообщений</a:t>
+            </a:r>
+            <a:r>
+              <a:rPr lang="en-US" dirty="0">
+                <a:latin typeface="Times New Roman" panose="02020603050405020304" pitchFamily="18" charset="0"/>
+                <a:cs typeface="Times New Roman" panose="02020603050405020304" pitchFamily="18" charset="0"/>
+              </a:rPr>
+              <a:t>;</a:t>
+            </a:r>
+          </a:p>
+          <a:p>
+            <a:pPr algn="just"/>
+            <a:r>
+              <a:rPr lang="ru-RU" dirty="0">
+                <a:latin typeface="Times New Roman" panose="02020603050405020304" pitchFamily="18" charset="0"/>
+                <a:cs typeface="Times New Roman" panose="02020603050405020304" pitchFamily="18" charset="0"/>
+              </a:rPr>
+              <a:t>Добавлено 1 000 </a:t>
             </a:r>
             <a:r>
               <a:rPr lang="ru-RU" dirty="0" err="1">
@@ -17142,10 +17216,10 @@
       </p:sp>
       <p:pic>
         <p:nvPicPr>
-          <p:cNvPr id="5" name="Picture 4">
+          <p:cNvPr id="15" name="Picture 14">
             <a:extLst>
               <a:ext uri="{FF2B5EF4-FFF2-40B4-BE49-F238E27FC236}">
-                <a16:creationId xmlns:a16="http://schemas.microsoft.com/office/drawing/2014/main" id="{66684D35-94DB-DC40-9BD0-241B9634E66F}"/>
+                <a16:creationId xmlns:a16="http://schemas.microsoft.com/office/drawing/2014/main" id="{E39C8F84-6DD0-2346-BA86-35D36C5D1228}"/>
               </a:ext>
             </a:extLst>
           </p:cNvPr>
@@ -17162,48 +17236,13 @@
               </a:ext>
             </a:extLst>
           </a:blip>
-          <a:srcRect b="13955"/>
+          <a:srcRect l="30107" b="12290"/>
           <a:stretch/>
         </p:blipFill>
         <p:spPr>
           <a:xfrm>
-            <a:off x="558009" y="2870263"/>
-            <a:ext cx="5397895" cy="3446238"/>
-          </a:xfrm>
-          <a:prstGeom prst="rect">
-            <a:avLst/>
-          </a:prstGeom>
-        </p:spPr>
-      </p:pic>
-      <p:pic>
-        <p:nvPicPr>
-          <p:cNvPr id="9" name="Picture 8">
-            <a:extLst>
-              <a:ext uri="{FF2B5EF4-FFF2-40B4-BE49-F238E27FC236}">
-                <a16:creationId xmlns:a16="http://schemas.microsoft.com/office/drawing/2014/main" id="{D620EE85-F9E5-DC4C-85CA-C95E40C7F9D3}"/>
-              </a:ext>
-            </a:extLst>
-          </p:cNvPr>
-          <p:cNvPicPr>
-            <a:picLocks noChangeAspect="1"/>
-          </p:cNvPicPr>
-          <p:nvPr/>
-        </p:nvPicPr>
-        <p:blipFill rotWithShape="1">
-          <a:blip r:embed="rId4">
-            <a:extLst>
-              <a:ext uri="{28A0092B-C50C-407E-A947-70E740481C1C}">
-                <a14:useLocalDpi xmlns:a14="http://schemas.microsoft.com/office/drawing/2010/main" val="0"/>
-              </a:ext>
-            </a:extLst>
-          </a:blip>
-          <a:srcRect b="13358"/>
-          <a:stretch/>
-        </p:blipFill>
-        <p:spPr>
-          <a:xfrm>
-            <a:off x="5955904" y="2886234"/>
-            <a:ext cx="5397895" cy="3470116"/>
+            <a:off x="6192667" y="3013659"/>
+            <a:ext cx="4924367" cy="3707816"/>
           </a:xfrm>
           <a:prstGeom prst="rect">
             <a:avLst/>
@@ -17295,6 +17334,76 @@
           </a:p>
         </p:txBody>
       </p:sp>
+      <p:pic>
+        <p:nvPicPr>
+          <p:cNvPr id="17" name="Picture 16">
+            <a:extLst>
+              <a:ext uri="{FF2B5EF4-FFF2-40B4-BE49-F238E27FC236}">
+                <a16:creationId xmlns:a16="http://schemas.microsoft.com/office/drawing/2014/main" id="{40208B07-ECF6-1242-9886-6A252F1AACBB}"/>
+              </a:ext>
+            </a:extLst>
+          </p:cNvPr>
+          <p:cNvPicPr>
+            <a:picLocks noChangeAspect="1"/>
+          </p:cNvPicPr>
+          <p:nvPr/>
+        </p:nvPicPr>
+        <p:blipFill rotWithShape="1">
+          <a:blip r:embed="rId4">
+            <a:extLst>
+              <a:ext uri="{28A0092B-C50C-407E-A947-70E740481C1C}">
+                <a14:useLocalDpi xmlns:a14="http://schemas.microsoft.com/office/drawing/2010/main" val="0"/>
+              </a:ext>
+            </a:extLst>
+          </a:blip>
+          <a:srcRect l="30107" b="12290"/>
+          <a:stretch/>
+        </p:blipFill>
+        <p:spPr>
+          <a:xfrm>
+            <a:off x="794773" y="2962693"/>
+            <a:ext cx="4924367" cy="3707817"/>
+          </a:xfrm>
+          <a:prstGeom prst="rect">
+            <a:avLst/>
+          </a:prstGeom>
+        </p:spPr>
+      </p:pic>
+      <p:pic>
+        <p:nvPicPr>
+          <p:cNvPr id="18" name="Picture 17">
+            <a:extLst>
+              <a:ext uri="{FF2B5EF4-FFF2-40B4-BE49-F238E27FC236}">
+                <a16:creationId xmlns:a16="http://schemas.microsoft.com/office/drawing/2014/main" id="{10C3BA01-F054-824A-A46D-FD2BA04B5EF2}"/>
+              </a:ext>
+            </a:extLst>
+          </p:cNvPr>
+          <p:cNvPicPr>
+            <a:picLocks noChangeAspect="1"/>
+          </p:cNvPicPr>
+          <p:nvPr/>
+        </p:nvPicPr>
+        <p:blipFill rotWithShape="1">
+          <a:blip r:embed="rId4">
+            <a:extLst>
+              <a:ext uri="{28A0092B-C50C-407E-A947-70E740481C1C}">
+                <a14:useLocalDpi xmlns:a14="http://schemas.microsoft.com/office/drawing/2010/main" val="0"/>
+              </a:ext>
+            </a:extLst>
+          </a:blip>
+          <a:srcRect l="72362" b="12290"/>
+          <a:stretch/>
+        </p:blipFill>
+        <p:spPr>
+          <a:xfrm>
+            <a:off x="9169794" y="2962692"/>
+            <a:ext cx="1947240" cy="3707817"/>
+          </a:xfrm>
+          <a:prstGeom prst="rect">
+            <a:avLst/>
+          </a:prstGeom>
+        </p:spPr>
+      </p:pic>
     </p:spTree>
     <p:extLst>
       <p:ext uri="{BB962C8B-B14F-4D97-AF65-F5344CB8AC3E}">

</xml_diff>

<commit_message>
FUCK: FUCK FUCK FUCK FUCK FUCK FUCK
</commit_message>
<xml_diff>
--- a/iWannaNote/iHatePresentations/presentation.pptx
+++ b/iWannaNote/iHatePresentations/presentation.pptx
@@ -214,7 +214,7 @@
           <a:p>
             <a:fld id="{9AD2A09B-D952-4383-A48E-27C117CB15C8}" type="datetimeFigureOut">
               <a:rPr lang="ru-RU" smtClean="0"/>
-              <a:t>04.06.2024</a:t>
+              <a:t>09.06.2024</a:t>
             </a:fld>
             <a:endParaRPr lang="ru-RU"/>
           </a:p>
@@ -878,25 +878,40 @@
               <a:rPr lang="en-US" dirty="0"/>
               <a:t>BERT</a:t>
             </a:r>
-            <a:r>
-              <a:rPr lang="ru-RU" sz="1200" dirty="0">
-                <a:latin typeface="Times New Roman" panose="02020603050405020304" pitchFamily="18" charset="0"/>
-                <a:cs typeface="Times New Roman" panose="02020603050405020304" pitchFamily="18" charset="0"/>
-              </a:rPr>
-              <a:t>. Для каждого разбиения строится матрица ошибок, для каждой модели приводится график значений исследуемых метрик.</a:t>
-            </a:r>
-            <a:endParaRPr lang="en-RU" sz="1200" dirty="0">
-              <a:latin typeface="Times New Roman" panose="02020603050405020304" pitchFamily="18" charset="0"/>
-              <a:cs typeface="Times New Roman" panose="02020603050405020304" pitchFamily="18" charset="0"/>
-            </a:endParaRPr>
-          </a:p>
-          <a:p>
             <a:endParaRPr lang="ru-RU" dirty="0"/>
           </a:p>
           <a:p>
+            <a:pPr marL="0" marR="0" lvl="0" indent="0" algn="l" defTabSz="914400" rtl="0" eaLnBrk="1" fontAlgn="auto" latinLnBrk="0" hangingPunct="1">
+              <a:lnSpc>
+                <a:spcPct val="100000"/>
+              </a:lnSpc>
+              <a:spcBef>
+                <a:spcPts val="0"/>
+              </a:spcBef>
+              <a:spcAft>
+                <a:spcPts val="0"/>
+              </a:spcAft>
+              <a:buClrTx/>
+              <a:buSzTx/>
+              <a:buFontTx/>
+              <a:buNone/>
+              <a:tabLst/>
+              <a:defRPr/>
+            </a:pPr>
+            <a:endParaRPr lang="ru-RU" dirty="0"/>
+          </a:p>
+          <a:p>
             <a:r>
               <a:rPr lang="ru-RU" dirty="0"/>
-              <a:t>Результат исследования представлен на слайде, значения метрик определены средним из 4-х запусков на разных тестовых выборках. Было получено, что лучшим средним показателем всех метрик обладает метод случайного леса с использованием </a:t>
+              <a:t>Результат исследования представлен в таблице, значения метрик определены средним из 4-х запусков на разных тестовых и обучающих выборках. Было </a:t>
+            </a:r>
+            <a:r>
+              <a:rPr lang="ru-RU" dirty="0" err="1"/>
+              <a:t>определно</a:t>
+            </a:r>
+            <a:r>
+              <a:rPr lang="ru-RU" dirty="0"/>
+              <a:t>, что лучшим средним показателем всех метрик обладает метод случайного леса с использованием </a:t>
             </a:r>
             <a:r>
               <a:rPr lang="en-US" dirty="0"/>
@@ -904,7 +919,7 @@
             </a:r>
             <a:r>
               <a:rPr lang="ru-RU" dirty="0"/>
-              <a:t>векторизации, второе место занимает тот же метод, но с использованием векторизации «Мешок слов», а на третьем месте располагается логистическая регрессия.</a:t>
+              <a:t>векторизации.</a:t>
             </a:r>
             <a:endParaRPr lang="en-US" dirty="0"/>
           </a:p>
@@ -1896,7 +1911,15 @@
           <a:p>
             <a:r>
               <a:rPr lang="ru-RU" dirty="0"/>
-              <a:t>В период с 2010 по 2021 год уровень самоубийств увеличился примерно на 36%. В 2021 году самоубийства стали причиной 48 183 смертей. На каждую смерть от самоубийства в 2021 году 38 попыток самоубийства. В условиях современной </a:t>
+              <a:t>В период с 2010 по 2021 год уровень самоубийств увеличился примерно на 36%. По данным ВОЗ в год совершается около 703 тысяч самоубийств. В 2021 году самоубийства стали причиной 48 183 смертей</a:t>
+            </a:r>
+            <a:r>
+              <a:rPr lang="en-US" dirty="0"/>
+              <a:t> </a:t>
+            </a:r>
+            <a:r>
+              <a:rPr lang="ru-RU" dirty="0"/>
+              <a:t>в США. На каждую смерть от самоубийства в 2021 году приходилось 38 попыток самоубийства. В условиях современной </a:t>
             </a:r>
             <a:r>
               <a:rPr lang="ru-RU" dirty="0" err="1"/>
@@ -1904,7 +1927,7 @@
             </a:r>
             <a:r>
               <a:rPr lang="ru-RU" dirty="0"/>
-              <a:t> медицины представляется возможным автоматизировать обнаружение паттернов суицидального поведения.</a:t>
+              <a:t> медицины представляется возможным автоматизировать обнаружение паттернов суицидального поведения человека.</a:t>
             </a:r>
           </a:p>
         </p:txBody>
@@ -1991,7 +2014,7 @@
           <a:p>
             <a:r>
               <a:rPr lang="ru-RU" dirty="0"/>
-              <a:t>В настоящий момент известно о наличии в некоторых социальных сетях искусственного интеллекта, предназначенного для обнаружения людей с высоким суицидальным риском, однако исходники данного ПО не представлены в открытом доступе, а все наработки по данной теме являются объектом коммерческой тайны. Кроме того, свое распространение получили и средства классификации тональности сообщений, такие как </a:t>
+              <a:t>В настоящий момент известно о существовании в некоторых социальных сетях искусственного интеллекта, предназначенного для обнаружения индивидов с высоким суицидальным риском, однако исходники данного ПО не представлены в открытом доступе, а все наработки по данной теме являются объектом коммерческой тайны. Кроме того, свое распространение получили и средства классификации тональности сообщений, такие как </a:t>
             </a:r>
             <a:r>
               <a:rPr lang="en-US" dirty="0"/>
@@ -1999,7 +2022,7 @@
             </a:r>
             <a:r>
               <a:rPr lang="ru-RU" dirty="0"/>
-              <a:t>однако в данном случае классификация направлена на определение положительной или отрицательной окраски и не может быть задействована в целях диагностики психических заболеваний.</a:t>
+              <a:t>однако в данном случае классификация направлена на определение положительной или отрицательной эмоциональной окраски текста и не может быть задействована в целях диагностики психических заболеваний.</a:t>
             </a:r>
             <a:r>
               <a:rPr lang="en-US" dirty="0"/>
@@ -2106,7 +2129,7 @@
           <a:p>
             <a:r>
               <a:rPr lang="ru-RU" dirty="0"/>
-              <a:t>Были рассмотрены методы, позволяющие распознавать паттерны суицидального поведения с использованием аудиальных, текстовых, пространственно-временных, визуальных, физиологических и биологических признаков. Каждый признак может быть задействован обособленно, либо в синтезе с другим. Так, например, биологические признаки позволяют сужать область поиска в группах риска.</a:t>
+              <a:t>Были рассмотрены методы, позволяющие распознавать паттерны суицидальное поведения с использованием аудиальных, текстовых, пространственно-временных, визуальных, физиологических и биологических признаков. Каждый признак может быть задействован обособленно, либо в синтезе с другим. Так, например, биологические признаки позволяют сужать область поиска по группам риска.</a:t>
             </a:r>
             <a:endParaRPr lang="en-US" dirty="0"/>
           </a:p>
@@ -2526,7 +2549,7 @@
                 <a:latin typeface="Times New Roman" panose="02020603050405020304" pitchFamily="18" charset="0"/>
                 <a:cs typeface="Times New Roman" panose="02020603050405020304" pitchFamily="18" charset="0"/>
               </a:rPr>
-              <a:t>На слайде представлена визуализация собранных данных класса суицидальных сообщений. Чаще всего в суицидальных сообщениях фигурируют слова «жизнь», «хотеть», «человек» и «мочь», каждое не более 600 раз. Стоит обратить внимание на присутствие слов «суицид», «страдать», «депрессия», «смерть» и «ад».</a:t>
+              <a:t>На слайде представлена визуализация данных класса суицидальных сообщений. Чаще всего в суицидальных сообщениях фигурируют слова «жизнь», «хотеть», «человек» и «мочь», каждое не более 600 раз. Стоит обратить внимание на присутствие слов «суицид», «страдать», «депрессия», «смерть» и «ад».</a:t>
             </a:r>
           </a:p>
         </p:txBody>
@@ -2714,7 +2737,7 @@
           <a:p>
             <a:fld id="{15988D4F-E58D-4CDE-A3D0-F6AD327AEC56}" type="datetime1">
               <a:rPr lang="ru-RU" smtClean="0"/>
-              <a:t>04.06.2024</a:t>
+              <a:t>09.06.2024</a:t>
             </a:fld>
             <a:endParaRPr lang="ru-RU"/>
           </a:p>
@@ -2912,7 +2935,7 @@
           <a:p>
             <a:fld id="{CE1E2A47-57B7-4CF1-A92E-49D63AEE96D5}" type="datetime1">
               <a:rPr lang="ru-RU" smtClean="0"/>
-              <a:t>04.06.2024</a:t>
+              <a:t>09.06.2024</a:t>
             </a:fld>
             <a:endParaRPr lang="ru-RU"/>
           </a:p>
@@ -3120,7 +3143,7 @@
           <a:p>
             <a:fld id="{CA81ACF7-CEE3-4A9F-B718-A470CCA653C5}" type="datetime1">
               <a:rPr lang="ru-RU" smtClean="0"/>
-              <a:t>04.06.2024</a:t>
+              <a:t>09.06.2024</a:t>
             </a:fld>
             <a:endParaRPr lang="ru-RU"/>
           </a:p>
@@ -3318,7 +3341,7 @@
           <a:p>
             <a:fld id="{5E37AE04-DA44-410C-A175-FF6C781BC876}" type="datetime1">
               <a:rPr lang="ru-RU" smtClean="0"/>
-              <a:t>04.06.2024</a:t>
+              <a:t>09.06.2024</a:t>
             </a:fld>
             <a:endParaRPr lang="ru-RU"/>
           </a:p>
@@ -3593,7 +3616,7 @@
           <a:p>
             <a:fld id="{E32C54E3-AF17-448A-9297-44EF357EABC1}" type="datetime1">
               <a:rPr lang="ru-RU" smtClean="0"/>
-              <a:t>04.06.2024</a:t>
+              <a:t>09.06.2024</a:t>
             </a:fld>
             <a:endParaRPr lang="ru-RU"/>
           </a:p>
@@ -3858,7 +3881,7 @@
           <a:p>
             <a:fld id="{6955E014-4D2F-48F0-99F5-18541DD4F253}" type="datetime1">
               <a:rPr lang="ru-RU" smtClean="0"/>
-              <a:t>04.06.2024</a:t>
+              <a:t>09.06.2024</a:t>
             </a:fld>
             <a:endParaRPr lang="ru-RU"/>
           </a:p>
@@ -4270,7 +4293,7 @@
           <a:p>
             <a:fld id="{E7E8D56A-792C-4904-9EB1-6F8EF41EE765}" type="datetime1">
               <a:rPr lang="ru-RU" smtClean="0"/>
-              <a:t>04.06.2024</a:t>
+              <a:t>09.06.2024</a:t>
             </a:fld>
             <a:endParaRPr lang="ru-RU"/>
           </a:p>
@@ -4411,7 +4434,7 @@
           <a:p>
             <a:fld id="{7065F927-12B6-4A7B-B3A2-7352DF6A122F}" type="datetime1">
               <a:rPr lang="ru-RU" smtClean="0"/>
-              <a:t>04.06.2024</a:t>
+              <a:t>09.06.2024</a:t>
             </a:fld>
             <a:endParaRPr lang="ru-RU"/>
           </a:p>
@@ -4524,7 +4547,7 @@
           <a:p>
             <a:fld id="{AAFF6416-B84E-492F-BBC6-38E032565367}" type="datetime1">
               <a:rPr lang="ru-RU" smtClean="0"/>
-              <a:t>04.06.2024</a:t>
+              <a:t>09.06.2024</a:t>
             </a:fld>
             <a:endParaRPr lang="ru-RU"/>
           </a:p>
@@ -4835,7 +4858,7 @@
           <a:p>
             <a:fld id="{F0BD601D-7324-4D41-B3DA-86B4FCF095DB}" type="datetime1">
               <a:rPr lang="ru-RU" smtClean="0"/>
-              <a:t>04.06.2024</a:t>
+              <a:t>09.06.2024</a:t>
             </a:fld>
             <a:endParaRPr lang="ru-RU"/>
           </a:p>
@@ -5123,7 +5146,7 @@
           <a:p>
             <a:fld id="{91160DCC-CAF3-4180-8270-9561E69073DD}" type="datetime1">
               <a:rPr lang="ru-RU" smtClean="0"/>
-              <a:t>04.06.2024</a:t>
+              <a:t>09.06.2024</a:t>
             </a:fld>
             <a:endParaRPr lang="ru-RU"/>
           </a:p>
@@ -5364,7 +5387,7 @@
           <a:p>
             <a:fld id="{A366973F-C059-4909-8C8C-5ED2D1FD3A9E}" type="datetime1">
               <a:rPr lang="ru-RU" smtClean="0"/>
-              <a:t>04.06.2024</a:t>
+              <a:t>09.06.2024</a:t>
             </a:fld>
             <a:endParaRPr lang="ru-RU"/>
           </a:p>
@@ -13583,7 +13606,7 @@
               <a:rPr lang="ru-RU" smtClean="0"/>
               <a:t>4</a:t>
             </a:fld>
-            <a:endParaRPr lang="ru-RU"/>
+            <a:endParaRPr lang="ru-RU" dirty="0"/>
           </a:p>
         </p:txBody>
       </p:sp>
@@ -13696,7 +13719,7 @@
           <p:nvPr>
             <p:extLst>
               <p:ext uri="{D42A27DB-BD31-4B8C-83A1-F6EECF244321}">
-                <p14:modId xmlns:p14="http://schemas.microsoft.com/office/powerpoint/2010/main" val="2079117070"/>
+                <p14:modId xmlns:p14="http://schemas.microsoft.com/office/powerpoint/2010/main" val="562216050"/>
               </p:ext>
             </p:extLst>
           </p:nvPr>
@@ -13904,7 +13927,7 @@
                           <a:latin typeface="Times New Roman" panose="02020603050405020304" pitchFamily="18" charset="0"/>
                           <a:cs typeface="Times New Roman" panose="02020603050405020304" pitchFamily="18" charset="0"/>
                         </a:rPr>
-                        <a:t>Facebook AI</a:t>
+                        <a:t>Facebook* AI</a:t>
                       </a:r>
                       <a:endParaRPr lang="ru-RU" sz="2000" dirty="0">
                         <a:latin typeface="Times New Roman" panose="02020603050405020304" pitchFamily="18" charset="0"/>
@@ -14783,6 +14806,73 @@
               <a:t>ChatGPT</a:t>
             </a:r>
             <a:endParaRPr lang="en-RU" dirty="0"/>
+          </a:p>
+        </p:txBody>
+      </p:sp>
+      <p:sp>
+        <p:nvSpPr>
+          <p:cNvPr id="10" name="TextBox 9">
+            <a:extLst>
+              <a:ext uri="{FF2B5EF4-FFF2-40B4-BE49-F238E27FC236}">
+                <a16:creationId xmlns:a16="http://schemas.microsoft.com/office/drawing/2014/main" id="{A465977E-0129-C04C-B7C7-34E9E33FFCB3}"/>
+              </a:ext>
+            </a:extLst>
+          </p:cNvPr>
+          <p:cNvSpPr txBox="1"/>
+          <p:nvPr/>
+        </p:nvSpPr>
+        <p:spPr>
+          <a:xfrm>
+            <a:off x="556891" y="6590877"/>
+            <a:ext cx="10089227" cy="276999"/>
+          </a:xfrm>
+          <a:prstGeom prst="rect">
+            <a:avLst/>
+          </a:prstGeom>
+          <a:noFill/>
+        </p:spPr>
+        <p:txBody>
+          <a:bodyPr wrap="square">
+            <a:spAutoFit/>
+          </a:bodyPr>
+          <a:lstStyle/>
+          <a:p>
+            <a:r>
+              <a:rPr lang="ru-RU" sz="1200" dirty="0">
+                <a:latin typeface="Times New Roman" panose="02020603050405020304" pitchFamily="18" charset="0"/>
+                <a:cs typeface="Times New Roman" panose="02020603050405020304" pitchFamily="18" charset="0"/>
+              </a:rPr>
+              <a:t>* сервис, принадлежащий </a:t>
+            </a:r>
+            <a:r>
+              <a:rPr lang="en-US" sz="1200" dirty="0">
+                <a:latin typeface="Times New Roman" panose="02020603050405020304" pitchFamily="18" charset="0"/>
+                <a:cs typeface="Times New Roman" panose="02020603050405020304" pitchFamily="18" charset="0"/>
+              </a:rPr>
+              <a:t>Meta, </a:t>
+            </a:r>
+            <a:r>
+              <a:rPr lang="ru-RU" sz="1200" dirty="0">
+                <a:latin typeface="Times New Roman" panose="02020603050405020304" pitchFamily="18" charset="0"/>
+                <a:cs typeface="Times New Roman" panose="02020603050405020304" pitchFamily="18" charset="0"/>
+              </a:rPr>
+              <a:t>признанной в РФ экстремисткой </a:t>
+            </a:r>
+            <a:r>
+              <a:rPr lang="ru-RU" sz="1200" dirty="0" err="1">
+                <a:latin typeface="Times New Roman" panose="02020603050405020304" pitchFamily="18" charset="0"/>
+                <a:cs typeface="Times New Roman" panose="02020603050405020304" pitchFamily="18" charset="0"/>
+              </a:rPr>
+              <a:t>орнанизацией</a:t>
+            </a:r>
+            <a:r>
+              <a:rPr lang="ru-RU" sz="1200" dirty="0">
+                <a:latin typeface="Times New Roman" panose="02020603050405020304" pitchFamily="18" charset="0"/>
+                <a:cs typeface="Times New Roman" panose="02020603050405020304" pitchFamily="18" charset="0"/>
+              </a:rPr>
+              <a:t>, деятельность которой запрещена на территории РФ</a:t>
+            </a:r>
+            <a:endParaRPr lang="en-RU" sz="1200" dirty="0"/>
           </a:p>
         </p:txBody>
       </p:sp>

</xml_diff>

<commit_message>
ADD: fuck it's too late
</commit_message>
<xml_diff>
--- a/iWannaNote/iHatePresentations/presentation.pptx
+++ b/iWannaNote/iHatePresentations/presentation.pptx
@@ -214,7 +214,7 @@
           <a:p>
             <a:fld id="{9AD2A09B-D952-4383-A48E-27C117CB15C8}" type="datetimeFigureOut">
               <a:rPr lang="ru-RU" smtClean="0"/>
-              <a:t>12.06.2024</a:t>
+              <a:t>17.06.2024</a:t>
             </a:fld>
             <a:endParaRPr lang="ru-RU"/>
           </a:p>
@@ -760,7 +760,7 @@
           <a:p>
             <a:r>
               <a:rPr lang="ru-RU" dirty="0"/>
-              <a:t>В системе было определено 4 модуля, все они представлены на слайде. Модуль клиента взаимодействует с модулями анализа и сбора данных, так как от первого он получает данные модели, а от второго – текстовые сообщения для анализа.</a:t>
+              <a:t>В системе было определено 4 модуля, все они представлены на слайде. Модуль клиента взаимодействует с модулями анализа и обработки данных.</a:t>
             </a:r>
           </a:p>
         </p:txBody>
@@ -878,40 +878,9 @@
               <a:rPr lang="en-US" dirty="0"/>
               <a:t>BERT</a:t>
             </a:r>
-            <a:endParaRPr lang="ru-RU" dirty="0"/>
-          </a:p>
-          <a:p>
-            <a:pPr marL="0" marR="0" lvl="0" indent="0" algn="l" defTabSz="914400" rtl="0" eaLnBrk="1" fontAlgn="auto" latinLnBrk="0" hangingPunct="1">
-              <a:lnSpc>
-                <a:spcPct val="100000"/>
-              </a:lnSpc>
-              <a:spcBef>
-                <a:spcPts val="0"/>
-              </a:spcBef>
-              <a:spcAft>
-                <a:spcPts val="0"/>
-              </a:spcAft>
-              <a:buClrTx/>
-              <a:buSzTx/>
-              <a:buFontTx/>
-              <a:buNone/>
-              <a:tabLst/>
-              <a:defRPr/>
-            </a:pPr>
-            <a:endParaRPr lang="ru-RU" dirty="0"/>
-          </a:p>
-          <a:p>
             <a:r>
               <a:rPr lang="ru-RU" dirty="0"/>
-              <a:t>Результат исследования представлен в таблице, значения метрик определены средним из 4-х запусков на разных тестовых и обучающих выборках. Было </a:t>
-            </a:r>
-            <a:r>
-              <a:rPr lang="ru-RU" dirty="0" err="1"/>
-              <a:t>определно</a:t>
-            </a:r>
-            <a:r>
-              <a:rPr lang="ru-RU" dirty="0"/>
-              <a:t>, что лучшим средним показателем всех метрик обладает метод случайного леса с использованием </a:t>
+              <a:t>. Результат исследования представлен в таблице, значения метрик определены средним из 4-х запусков на разных тестовых и обучающих выборках. В результате, лучшим средним показателем всех метрик обладает метод случайного леса с использованием </a:t>
             </a:r>
             <a:r>
               <a:rPr lang="en-US" dirty="0"/>
@@ -1339,113 +1308,16 @@
             </a:r>
             <a:r>
               <a:rPr lang="ru-RU" dirty="0"/>
-              <a:t>0.949. Метрика точности случайного леса с использованием «мешка слов» достигла значения 0.885</a:t>
+              <a:t>0.949. Случайный лес с использованием "Мешка слов" отстает от лидирующего алгоритма по точности и </a:t>
             </a:r>
             <a:r>
               <a:rPr lang="en-US" dirty="0"/>
-              <a:t>, F1-</a:t>
+              <a:t>f1-</a:t>
             </a:r>
             <a:r>
               <a:rPr lang="ru-RU" dirty="0"/>
-              <a:t>мера – 0.873, </a:t>
-            </a:r>
-            <a:r>
-              <a:rPr lang="en-US" dirty="0"/>
-              <a:t>ROC-AUC – </a:t>
-            </a:r>
-            <a:r>
-              <a:rPr lang="ru-RU" dirty="0"/>
-              <a:t>0.947. Заметно, что разница по сравнению с предыдущим алгоритмом по точности и </a:t>
-            </a:r>
-            <a:r>
-              <a:rPr lang="en-US" dirty="0"/>
-              <a:t>ROC-AUC </a:t>
-            </a:r>
-            <a:r>
-              <a:rPr lang="ru-RU" dirty="0"/>
-              <a:t>не так велика, однако </a:t>
-            </a:r>
-            <a:r>
-              <a:rPr lang="en-US" dirty="0"/>
-              <a:t>F1-</a:t>
-            </a:r>
-            <a:r>
-              <a:rPr lang="ru-RU" dirty="0"/>
-              <a:t>мера здесь уже примерно на 1.4</a:t>
-            </a:r>
-            <a:r>
-              <a:rPr lang="en-US" dirty="0"/>
-              <a:t>% </a:t>
-            </a:r>
-            <a:r>
-              <a:rPr lang="ru-RU" dirty="0"/>
-              <a:t>ниже. Метрика точности логистической регрессии с использованием </a:t>
-            </a:r>
-            <a:r>
-              <a:rPr lang="en-US" dirty="0"/>
-              <a:t>BERT-</a:t>
-            </a:r>
-            <a:r>
-              <a:rPr lang="ru-RU" dirty="0"/>
-              <a:t>векторизации достигла значения 0.874</a:t>
-            </a:r>
-            <a:r>
-              <a:rPr lang="en-US" dirty="0"/>
-              <a:t>, F1-</a:t>
-            </a:r>
-            <a:r>
-              <a:rPr lang="ru-RU" dirty="0"/>
-              <a:t>мера – 0.869, </a:t>
-            </a:r>
-            <a:r>
-              <a:rPr lang="en-US" dirty="0"/>
-              <a:t>ROC-AUC – </a:t>
-            </a:r>
-            <a:r>
-              <a:rPr lang="ru-RU" dirty="0"/>
-              <a:t>0.942. Разница по сравнению с лидирующим алгоритмом по точности и </a:t>
-            </a:r>
-            <a:r>
-              <a:rPr lang="en-US" dirty="0"/>
-              <a:t>F</a:t>
-            </a:r>
-            <a:r>
-              <a:rPr lang="ru-RU" dirty="0"/>
-              <a:t>1</a:t>
-            </a:r>
-            <a:r>
-              <a:rPr lang="en-US" dirty="0"/>
-              <a:t>-</a:t>
-            </a:r>
-            <a:r>
-              <a:rPr lang="ru-RU" dirty="0"/>
-              <a:t>мере уже приближается к 2</a:t>
-            </a:r>
-            <a:r>
-              <a:rPr lang="en-US" dirty="0"/>
-              <a:t>%.</a:t>
-            </a:r>
-            <a:endParaRPr lang="ru-RU" dirty="0"/>
-          </a:p>
-          <a:p>
-            <a:pPr marL="0" marR="0" lvl="0" indent="0" algn="l" defTabSz="914400" rtl="0" eaLnBrk="1" fontAlgn="auto" latinLnBrk="0" hangingPunct="1">
-              <a:lnSpc>
-                <a:spcPct val="100000"/>
-              </a:lnSpc>
-              <a:spcBef>
-                <a:spcPts val="0"/>
-              </a:spcBef>
-              <a:spcAft>
-                <a:spcPts val="0"/>
-              </a:spcAft>
-              <a:buClrTx/>
-              <a:buSzTx/>
-              <a:buFontTx/>
-              <a:buNone/>
-              <a:tabLst/>
-              <a:defRPr/>
-            </a:pPr>
-            <a:endParaRPr lang="ru-RU" dirty="0"/>
+              <a:t>мере примерно на 1.4%, а логистическая регрессия с использованием берт-векторизации -- на 2%.</a:t>
+            </a:r>
           </a:p>
           <a:p>
             <a:pPr marL="0" marR="0" lvl="0" indent="0" algn="l" defTabSz="914400" rtl="0" eaLnBrk="1" fontAlgn="auto" latinLnBrk="0" hangingPunct="1">
@@ -1911,7 +1783,7 @@
           <a:p>
             <a:r>
               <a:rPr lang="ru-RU" dirty="0"/>
-              <a:t>В период с 2010 по 2021 год уровень количества самоубийств вырос примерно на 36%. По данным ВОЗ в год совершается около 703 тысяч самоубийств. В 2021 году самоубийства стали причиной 48 183 смертей</a:t>
+              <a:t>В период с 2010 по 2021 год уровень самоубийств вырос примерно на 36%. В 2021 году самоубийства стали причиной 48 183 смертей</a:t>
             </a:r>
             <a:r>
               <a:rPr lang="en-US" dirty="0"/>
@@ -2745,7 +2617,7 @@
           <a:p>
             <a:fld id="{15988D4F-E58D-4CDE-A3D0-F6AD327AEC56}" type="datetime1">
               <a:rPr lang="ru-RU" smtClean="0"/>
-              <a:t>12.06.2024</a:t>
+              <a:t>17.06.2024</a:t>
             </a:fld>
             <a:endParaRPr lang="ru-RU"/>
           </a:p>
@@ -2943,7 +2815,7 @@
           <a:p>
             <a:fld id="{CE1E2A47-57B7-4CF1-A92E-49D63AEE96D5}" type="datetime1">
               <a:rPr lang="ru-RU" smtClean="0"/>
-              <a:t>12.06.2024</a:t>
+              <a:t>17.06.2024</a:t>
             </a:fld>
             <a:endParaRPr lang="ru-RU"/>
           </a:p>
@@ -3151,7 +3023,7 @@
           <a:p>
             <a:fld id="{CA81ACF7-CEE3-4A9F-B718-A470CCA653C5}" type="datetime1">
               <a:rPr lang="ru-RU" smtClean="0"/>
-              <a:t>12.06.2024</a:t>
+              <a:t>17.06.2024</a:t>
             </a:fld>
             <a:endParaRPr lang="ru-RU"/>
           </a:p>
@@ -3349,7 +3221,7 @@
           <a:p>
             <a:fld id="{5E37AE04-DA44-410C-A175-FF6C781BC876}" type="datetime1">
               <a:rPr lang="ru-RU" smtClean="0"/>
-              <a:t>12.06.2024</a:t>
+              <a:t>17.06.2024</a:t>
             </a:fld>
             <a:endParaRPr lang="ru-RU"/>
           </a:p>
@@ -3624,7 +3496,7 @@
           <a:p>
             <a:fld id="{E32C54E3-AF17-448A-9297-44EF357EABC1}" type="datetime1">
               <a:rPr lang="ru-RU" smtClean="0"/>
-              <a:t>12.06.2024</a:t>
+              <a:t>17.06.2024</a:t>
             </a:fld>
             <a:endParaRPr lang="ru-RU"/>
           </a:p>
@@ -3889,7 +3761,7 @@
           <a:p>
             <a:fld id="{6955E014-4D2F-48F0-99F5-18541DD4F253}" type="datetime1">
               <a:rPr lang="ru-RU" smtClean="0"/>
-              <a:t>12.06.2024</a:t>
+              <a:t>17.06.2024</a:t>
             </a:fld>
             <a:endParaRPr lang="ru-RU"/>
           </a:p>
@@ -4301,7 +4173,7 @@
           <a:p>
             <a:fld id="{E7E8D56A-792C-4904-9EB1-6F8EF41EE765}" type="datetime1">
               <a:rPr lang="ru-RU" smtClean="0"/>
-              <a:t>12.06.2024</a:t>
+              <a:t>17.06.2024</a:t>
             </a:fld>
             <a:endParaRPr lang="ru-RU"/>
           </a:p>
@@ -4442,7 +4314,7 @@
           <a:p>
             <a:fld id="{7065F927-12B6-4A7B-B3A2-7352DF6A122F}" type="datetime1">
               <a:rPr lang="ru-RU" smtClean="0"/>
-              <a:t>12.06.2024</a:t>
+              <a:t>17.06.2024</a:t>
             </a:fld>
             <a:endParaRPr lang="ru-RU"/>
           </a:p>
@@ -4555,7 +4427,7 @@
           <a:p>
             <a:fld id="{AAFF6416-B84E-492F-BBC6-38E032565367}" type="datetime1">
               <a:rPr lang="ru-RU" smtClean="0"/>
-              <a:t>12.06.2024</a:t>
+              <a:t>17.06.2024</a:t>
             </a:fld>
             <a:endParaRPr lang="ru-RU"/>
           </a:p>
@@ -4866,7 +4738,7 @@
           <a:p>
             <a:fld id="{F0BD601D-7324-4D41-B3DA-86B4FCF095DB}" type="datetime1">
               <a:rPr lang="ru-RU" smtClean="0"/>
-              <a:t>12.06.2024</a:t>
+              <a:t>17.06.2024</a:t>
             </a:fld>
             <a:endParaRPr lang="ru-RU"/>
           </a:p>
@@ -5154,7 +5026,7 @@
           <a:p>
             <a:fld id="{91160DCC-CAF3-4180-8270-9561E69073DD}" type="datetime1">
               <a:rPr lang="ru-RU" smtClean="0"/>
-              <a:t>12.06.2024</a:t>
+              <a:t>17.06.2024</a:t>
             </a:fld>
             <a:endParaRPr lang="ru-RU"/>
           </a:p>
@@ -5395,7 +5267,7 @@
           <a:p>
             <a:fld id="{A366973F-C059-4909-8C8C-5ED2D1FD3A9E}" type="datetime1">
               <a:rPr lang="ru-RU" smtClean="0"/>
-              <a:t>12.06.2024</a:t>
+              <a:t>17.06.2024</a:t>
             </a:fld>
             <a:endParaRPr lang="ru-RU"/>
           </a:p>

</xml_diff>